<commit_message>
reworded conclusion in presentation
</commit_message>
<xml_diff>
--- a/Resources/Project1_Presentation.pptx
+++ b/Resources/Project1_Presentation.pptx
@@ -116,6 +116,11 @@
       </a:defRPr>
     </a:lvl9pPr>
   </p:defaultTextStyle>
+  <p:extLst>
+    <p:ext uri="{EFAFB233-063F-42B5-8137-9DF3F51BA10A}">
+      <p15:sldGuideLst xmlns:p15="http://schemas.microsoft.com/office/powerpoint/2012/main"/>
+    </p:ext>
+  </p:extLst>
 </p:presentation>
 </file>
 
@@ -125,6 +130,35 @@
     <p1510:client id="{B725A593-9317-4AC4-90F7-9DC88AA4AC22}" v="14" dt="2024-01-05T04:03:37.021"/>
   </p1510:revLst>
 </p1510:revInfo>
+</file>
+
+<file path=ppt/changesInfos/changesInfo1.xml><?xml version="1.0" encoding="utf-8"?>
+<pc:chgInfo xmlns:a="http://schemas.openxmlformats.org/drawingml/2006/main" xmlns:r="http://schemas.openxmlformats.org/officeDocument/2006/relationships" xmlns:ac="http://schemas.microsoft.com/office/drawing/2013/main/command" xmlns:pc="http://schemas.microsoft.com/office/powerpoint/2013/main/command">
+  <pc:docChgLst>
+    <pc:chgData name="Clayton Graves" userId="3223012b48fe14f7" providerId="LiveId" clId="{561EC942-CAEB-4FA9-8C6A-D1A1D87D5A05}"/>
+    <pc:docChg chg="undo custSel modSld">
+      <pc:chgData name="Clayton Graves" userId="3223012b48fe14f7" providerId="LiveId" clId="{561EC942-CAEB-4FA9-8C6A-D1A1D87D5A05}" dt="2024-01-05T04:22:31.329" v="327" actId="20577"/>
+      <pc:docMkLst>
+        <pc:docMk/>
+      </pc:docMkLst>
+      <pc:sldChg chg="modSp mod">
+        <pc:chgData name="Clayton Graves" userId="3223012b48fe14f7" providerId="LiveId" clId="{561EC942-CAEB-4FA9-8C6A-D1A1D87D5A05}" dt="2024-01-05T04:22:31.329" v="327" actId="20577"/>
+        <pc:sldMkLst>
+          <pc:docMk/>
+          <pc:sldMk cId="4204088968" sldId="269"/>
+        </pc:sldMkLst>
+        <pc:spChg chg="mod">
+          <ac:chgData name="Clayton Graves" userId="3223012b48fe14f7" providerId="LiveId" clId="{561EC942-CAEB-4FA9-8C6A-D1A1D87D5A05}" dt="2024-01-05T04:22:31.329" v="327" actId="20577"/>
+          <ac:spMkLst>
+            <pc:docMk/>
+            <pc:sldMk cId="4204088968" sldId="269"/>
+            <ac:spMk id="3" creationId="{DA5702B5-3424-000B-7452-F4E3A91461B7}"/>
+          </ac:spMkLst>
+        </pc:spChg>
+      </pc:sldChg>
+    </pc:docChg>
+  </pc:docChgLst>
+</pc:chgInfo>
 </file>
 
 <file path=ppt/slideLayouts/slideLayout1.xml><?xml version="1.0" encoding="utf-8"?>
@@ -6337,7 +6371,7 @@
         </p:spPr>
         <p:txBody>
           <a:bodyPr>
-            <a:normAutofit fontScale="92500"/>
+            <a:normAutofit fontScale="92500" lnSpcReduction="20000"/>
           </a:bodyPr>
           <a:lstStyle/>
           <a:p>
@@ -6351,6 +6385,17 @@
               <a:rPr lang="en-US" sz="2800" dirty="0"/>
               <a:t>There appears to be an inverse correlation between median household incomes and children in foster care/high school dropouts</a:t>
             </a:r>
+          </a:p>
+          <a:p>
+            <a:r>
+              <a:rPr lang="en-US" sz="2800" dirty="0"/>
+              <a:t>While we were not able to find a definitive correlation between the original three datasets, we do believe there is sufficient evidence to warrant </a:t>
+            </a:r>
+            <a:r>
+              <a:rPr lang="en-US" sz="2800"/>
+              <a:t>further study. </a:t>
+            </a:r>
+            <a:endParaRPr lang="en-US" sz="2800" dirty="0"/>
           </a:p>
           <a:p>
             <a:r>

</xml_diff>

<commit_message>
Added Table of Contents and Sources
</commit_message>
<xml_diff>
--- a/Resources/Project1_Presentation.pptx
+++ b/Resources/Project1_Presentation.pptx
@@ -6,18 +6,20 @@
   </p:sldMasterIdLst>
   <p:sldIdLst>
     <p:sldId id="256" r:id="rId2"/>
-    <p:sldId id="259" r:id="rId3"/>
-    <p:sldId id="257" r:id="rId4"/>
-    <p:sldId id="258" r:id="rId5"/>
-    <p:sldId id="260" r:id="rId6"/>
-    <p:sldId id="261" r:id="rId7"/>
-    <p:sldId id="262" r:id="rId8"/>
-    <p:sldId id="263" r:id="rId9"/>
-    <p:sldId id="266" r:id="rId10"/>
-    <p:sldId id="264" r:id="rId11"/>
-    <p:sldId id="265" r:id="rId12"/>
-    <p:sldId id="268" r:id="rId13"/>
-    <p:sldId id="269" r:id="rId14"/>
+    <p:sldId id="270" r:id="rId3"/>
+    <p:sldId id="259" r:id="rId4"/>
+    <p:sldId id="257" r:id="rId5"/>
+    <p:sldId id="258" r:id="rId6"/>
+    <p:sldId id="260" r:id="rId7"/>
+    <p:sldId id="261" r:id="rId8"/>
+    <p:sldId id="262" r:id="rId9"/>
+    <p:sldId id="263" r:id="rId10"/>
+    <p:sldId id="266" r:id="rId11"/>
+    <p:sldId id="264" r:id="rId12"/>
+    <p:sldId id="265" r:id="rId13"/>
+    <p:sldId id="268" r:id="rId14"/>
+    <p:sldId id="269" r:id="rId15"/>
+    <p:sldId id="271" r:id="rId16"/>
   </p:sldIdLst>
   <p:sldSz cx="12192000" cy="6858000"/>
   <p:notesSz cx="6858000" cy="9144000"/>
@@ -132,35 +134,6 @@
 </p1510:revInfo>
 </file>
 
-<file path=ppt/changesInfos/changesInfo1.xml><?xml version="1.0" encoding="utf-8"?>
-<pc:chgInfo xmlns:a="http://schemas.openxmlformats.org/drawingml/2006/main" xmlns:r="http://schemas.openxmlformats.org/officeDocument/2006/relationships" xmlns:ac="http://schemas.microsoft.com/office/drawing/2013/main/command" xmlns:pc="http://schemas.microsoft.com/office/powerpoint/2013/main/command">
-  <pc:docChgLst>
-    <pc:chgData name="Clayton Graves" userId="3223012b48fe14f7" providerId="LiveId" clId="{561EC942-CAEB-4FA9-8C6A-D1A1D87D5A05}"/>
-    <pc:docChg chg="undo custSel modSld">
-      <pc:chgData name="Clayton Graves" userId="3223012b48fe14f7" providerId="LiveId" clId="{561EC942-CAEB-4FA9-8C6A-D1A1D87D5A05}" dt="2024-01-05T04:22:31.329" v="327" actId="20577"/>
-      <pc:docMkLst>
-        <pc:docMk/>
-      </pc:docMkLst>
-      <pc:sldChg chg="modSp mod">
-        <pc:chgData name="Clayton Graves" userId="3223012b48fe14f7" providerId="LiveId" clId="{561EC942-CAEB-4FA9-8C6A-D1A1D87D5A05}" dt="2024-01-05T04:22:31.329" v="327" actId="20577"/>
-        <pc:sldMkLst>
-          <pc:docMk/>
-          <pc:sldMk cId="4204088968" sldId="269"/>
-        </pc:sldMkLst>
-        <pc:spChg chg="mod">
-          <ac:chgData name="Clayton Graves" userId="3223012b48fe14f7" providerId="LiveId" clId="{561EC942-CAEB-4FA9-8C6A-D1A1D87D5A05}" dt="2024-01-05T04:22:31.329" v="327" actId="20577"/>
-          <ac:spMkLst>
-            <pc:docMk/>
-            <pc:sldMk cId="4204088968" sldId="269"/>
-            <ac:spMk id="3" creationId="{DA5702B5-3424-000B-7452-F4E3A91461B7}"/>
-          </ac:spMkLst>
-        </pc:spChg>
-      </pc:sldChg>
-    </pc:docChg>
-  </pc:docChgLst>
-</pc:chgInfo>
-</file>
-
 <file path=ppt/slideLayouts/slideLayout1.xml><?xml version="1.0" encoding="utf-8"?>
 <p:sldLayout xmlns:a="http://schemas.openxmlformats.org/drawingml/2006/main" xmlns:r="http://schemas.openxmlformats.org/officeDocument/2006/relationships" xmlns:p="http://schemas.openxmlformats.org/presentationml/2006/main" showMasterSp="0" type="title" preserve="1">
   <p:cSld name="Title Slide">
@@ -582,7 +555,7 @@
           <a:p>
             <a:fld id="{53BEF823-48A5-43FC-BE03-E79964288B41}" type="datetimeFigureOut">
               <a:rPr lang="en-US" smtClean="0"/>
-              <a:t>1/4/2024</a:t>
+              <a:t>1/8/24</a:t>
             </a:fld>
             <a:endParaRPr lang="en-US" dirty="0"/>
           </a:p>
@@ -793,7 +766,7 @@
             <a:fld id="{53BEF823-48A5-43FC-BE03-E79964288B41}" type="datetimeFigureOut">
               <a:rPr lang="en-US" smtClean="0"/>
               <a:pPr algn="r"/>
-              <a:t>1/4/2024</a:t>
+              <a:t>1/8/24</a:t>
             </a:fld>
             <a:endParaRPr lang="en-US" dirty="0"/>
           </a:p>
@@ -1008,7 +981,7 @@
             <a:fld id="{53BEF823-48A5-43FC-BE03-E79964288B41}" type="datetimeFigureOut">
               <a:rPr lang="en-US" smtClean="0"/>
               <a:pPr algn="r"/>
-              <a:t>1/4/2024</a:t>
+              <a:t>1/8/24</a:t>
             </a:fld>
             <a:endParaRPr lang="en-US" dirty="0"/>
           </a:p>
@@ -1211,7 +1184,7 @@
             <a:fld id="{53BEF823-48A5-43FC-BE03-E79964288B41}" type="datetimeFigureOut">
               <a:rPr lang="en-US" smtClean="0"/>
               <a:pPr algn="r"/>
-              <a:t>1/4/2024</a:t>
+              <a:t>1/8/24</a:t>
             </a:fld>
             <a:endParaRPr lang="en-US" dirty="0"/>
           </a:p>
@@ -1495,7 +1468,7 @@
             <a:fld id="{53BEF823-48A5-43FC-BE03-E79964288B41}" type="datetimeFigureOut">
               <a:rPr lang="en-US" smtClean="0"/>
               <a:pPr algn="r"/>
-              <a:t>1/4/2024</a:t>
+              <a:t>1/8/24</a:t>
             </a:fld>
             <a:endParaRPr lang="en-US" dirty="0"/>
           </a:p>
@@ -1739,7 +1712,7 @@
             <a:fld id="{53BEF823-48A5-43FC-BE03-E79964288B41}" type="datetimeFigureOut">
               <a:rPr lang="en-US" smtClean="0"/>
               <a:pPr algn="r"/>
-              <a:t>1/4/2024</a:t>
+              <a:t>1/8/24</a:t>
             </a:fld>
             <a:endParaRPr lang="en-US" dirty="0"/>
           </a:p>
@@ -2182,7 +2155,7 @@
             <a:fld id="{53BEF823-48A5-43FC-BE03-E79964288B41}" type="datetimeFigureOut">
               <a:rPr lang="en-US" smtClean="0"/>
               <a:pPr algn="r"/>
-              <a:t>1/4/2024</a:t>
+              <a:t>1/8/24</a:t>
             </a:fld>
             <a:endParaRPr lang="en-US" dirty="0"/>
           </a:p>
@@ -2328,7 +2301,7 @@
             <a:fld id="{53BEF823-48A5-43FC-BE03-E79964288B41}" type="datetimeFigureOut">
               <a:rPr lang="en-US" smtClean="0"/>
               <a:pPr algn="r"/>
-              <a:t>1/4/2024</a:t>
+              <a:t>1/8/24</a:t>
             </a:fld>
             <a:endParaRPr lang="en-US" dirty="0"/>
           </a:p>
@@ -2446,7 +2419,7 @@
             <a:fld id="{53BEF823-48A5-43FC-BE03-E79964288B41}" type="datetimeFigureOut">
               <a:rPr lang="en-US" smtClean="0"/>
               <a:pPr algn="r"/>
-              <a:t>1/4/2024</a:t>
+              <a:t>1/8/24</a:t>
             </a:fld>
             <a:endParaRPr lang="en-US" dirty="0"/>
           </a:p>
@@ -2730,7 +2703,7 @@
             <a:fld id="{53BEF823-48A5-43FC-BE03-E79964288B41}" type="datetimeFigureOut">
               <a:rPr lang="en-US" smtClean="0"/>
               <a:pPr algn="r"/>
-              <a:t>1/4/2024</a:t>
+              <a:t>1/8/24</a:t>
             </a:fld>
             <a:endParaRPr lang="en-US" dirty="0"/>
           </a:p>
@@ -3025,7 +2998,7 @@
             <a:fld id="{53BEF823-48A5-43FC-BE03-E79964288B41}" type="datetimeFigureOut">
               <a:rPr lang="en-US" smtClean="0"/>
               <a:pPr algn="r"/>
-              <a:t>1/4/2024</a:t>
+              <a:t>1/8/24</a:t>
             </a:fld>
             <a:endParaRPr lang="en-US" dirty="0"/>
           </a:p>
@@ -3520,7 +3493,7 @@
             <a:fld id="{53BEF823-48A5-43FC-BE03-E79964288B41}" type="datetimeFigureOut">
               <a:rPr lang="en-US" smtClean="0"/>
               <a:pPr algn="r"/>
-              <a:t>1/4/2024</a:t>
+              <a:t>1/8/24</a:t>
             </a:fld>
             <a:endParaRPr lang="en-US" dirty="0"/>
           </a:p>
@@ -4555,8 +4528,8 @@
           <a:lstStyle/>
           <a:p>
             <a:r>
-              <a:rPr lang="en-US"/>
-              <a:t>Analysis</a:t>
+              <a:rPr lang="en-US" dirty="0"/>
+              <a:t>Dropouts</a:t>
             </a:r>
           </a:p>
         </p:txBody>
@@ -4645,12 +4618,22 @@
           <a:lstStyle/>
           <a:p>
             <a:r>
+              <a:rPr lang="en-US" sz="2000" dirty="0"/>
+              <a:t>We pulled the data from datacenter.aef.org.</a:t>
+            </a:r>
+          </a:p>
+          <a:p>
+            <a:r>
+              <a:rPr lang="en-US" sz="2000" dirty="0"/>
+              <a:t>Data was presented by state and year. </a:t>
+            </a:r>
+            <a:endParaRPr lang="en-US" dirty="0"/>
+          </a:p>
+          <a:p>
+            <a:r>
               <a:rPr lang="en-US" dirty="0"/>
-              <a:t>Initial comparison of data shows no correlation at all between median household income and they other datasets. </a:t>
-            </a:r>
-          </a:p>
-          <a:p>
-            <a:endParaRPr lang="en-US" dirty="0"/>
+              <a:t>Dropout rates appear to be trending downward over the last 16 years and are expected to continue to do so throughout 2024.</a:t>
+            </a:r>
           </a:p>
         </p:txBody>
       </p:sp>
@@ -4792,10 +4775,10 @@
       </p:sp>
       <p:pic>
         <p:nvPicPr>
-          <p:cNvPr id="6" name="Picture 5" descr="A graph of the number of people in the number of years&#10;&#10;Description automatically generated">
-            <a:extLst>
-              <a:ext uri="{FF2B5EF4-FFF2-40B4-BE49-F238E27FC236}">
-                <a16:creationId xmlns:a16="http://schemas.microsoft.com/office/drawing/2014/main" id="{5D76AFA3-2DD9-8123-0E57-EFAE18E4E64C}"/>
+          <p:cNvPr id="6" name="Picture 5" descr="A graph with a line graph&#10;&#10;Description automatically generated with medium confidence">
+            <a:extLst>
+              <a:ext uri="{FF2B5EF4-FFF2-40B4-BE49-F238E27FC236}">
+                <a16:creationId xmlns:a16="http://schemas.microsoft.com/office/drawing/2014/main" id="{80A92F9F-7B7A-27DC-A092-A614B43DF693}"/>
               </a:ext>
             </a:extLst>
           </p:cNvPr>
@@ -4818,8 +4801,8 @@
         </p:blipFill>
         <p:spPr>
           <a:xfrm>
-            <a:off x="7333114" y="2307946"/>
-            <a:ext cx="4713573" cy="2945982"/>
+            <a:off x="7199135" y="2363763"/>
+            <a:ext cx="4923466" cy="2917153"/>
           </a:xfrm>
           <a:prstGeom prst="rect">
             <a:avLst/>
@@ -5053,7 +5036,7 @@
     </p:spTree>
     <p:extLst>
       <p:ext uri="{BB962C8B-B14F-4D97-AF65-F5344CB8AC3E}">
-        <p14:creationId xmlns:p14="http://schemas.microsoft.com/office/powerpoint/2010/main" val="4098626013"/>
+        <p14:creationId xmlns:p14="http://schemas.microsoft.com/office/powerpoint/2010/main" val="3127629541"/>
       </p:ext>
     </p:extLst>
   </p:cSld>
@@ -5090,7 +5073,7 @@
       </p:grpSpPr>
       <p:sp useBgFill="1">
         <p:nvSpPr>
-          <p:cNvPr id="10" name="Rectangle 9">
+          <p:cNvPr id="11" name="Rectangle 10">
             <a:extLst>
               <a:ext uri="{FF2B5EF4-FFF2-40B4-BE49-F238E27FC236}">
                 <a16:creationId xmlns:a16="http://schemas.microsoft.com/office/drawing/2014/main" id="{C5176844-69C3-4F79-BE38-EA5BDDF4FEA4}"/>
@@ -5177,7 +5160,7 @@
           <a:lstStyle/>
           <a:p>
             <a:r>
-              <a:rPr lang="en-US" dirty="0"/>
+              <a:rPr lang="en-US"/>
               <a:t>Analysis</a:t>
             </a:r>
           </a:p>
@@ -5185,7 +5168,7 @@
       </p:sp>
       <p:cxnSp>
         <p:nvCxnSpPr>
-          <p:cNvPr id="12" name="Straight Connector 11">
+          <p:cNvPr id="13" name="Straight Connector 12">
             <a:extLst>
               <a:ext uri="{FF2B5EF4-FFF2-40B4-BE49-F238E27FC236}">
                 <a16:creationId xmlns:a16="http://schemas.microsoft.com/office/drawing/2014/main" id="{33862825-C012-4895-A17E-F3D1F62D89DD}"/>
@@ -5268,20 +5251,17 @@
           <a:p>
             <a:r>
               <a:rPr lang="en-US" dirty="0"/>
-              <a:t>However, when viewing the data in a normalized format, a relationship does begin to materialize. </a:t>
-            </a:r>
-          </a:p>
-          <a:p>
-            <a:r>
-              <a:rPr lang="en-US" dirty="0"/>
-              <a:t>We are able to see an inverse correlation where the household income increased, and the number of children in foster care and dropouts decreased. </a:t>
-            </a:r>
-          </a:p>
-        </p:txBody>
-      </p:sp>
-      <p:sp>
-        <p:nvSpPr>
-          <p:cNvPr id="14" name="Freeform: Shape 13">
+              <a:t>Initial comparison of data shows no correlation at all between median household income and they other datasets. </a:t>
+            </a:r>
+          </a:p>
+          <a:p>
+            <a:endParaRPr lang="en-US" dirty="0"/>
+          </a:p>
+        </p:txBody>
+      </p:sp>
+      <p:sp>
+        <p:nvSpPr>
+          <p:cNvPr id="15" name="Freeform: Shape 14">
             <a:extLst>
               <a:ext uri="{FF2B5EF4-FFF2-40B4-BE49-F238E27FC236}">
                 <a16:creationId xmlns:a16="http://schemas.microsoft.com/office/drawing/2014/main" id="{F76C355F-28BE-46B1-9B8D-5D71A48155D3}"/>
@@ -5417,10 +5397,10 @@
       </p:sp>
       <p:pic>
         <p:nvPicPr>
-          <p:cNvPr id="5" name="Picture 4">
-            <a:extLst>
-              <a:ext uri="{FF2B5EF4-FFF2-40B4-BE49-F238E27FC236}">
-                <a16:creationId xmlns:a16="http://schemas.microsoft.com/office/drawing/2014/main" id="{90EE862F-27D2-BE07-52A4-D362E657E6BA}"/>
+          <p:cNvPr id="6" name="Picture 5" descr="A graph of the number of people in the number of years&#10;&#10;Description automatically generated">
+            <a:extLst>
+              <a:ext uri="{FF2B5EF4-FFF2-40B4-BE49-F238E27FC236}">
+                <a16:creationId xmlns:a16="http://schemas.microsoft.com/office/drawing/2014/main" id="{5D76AFA3-2DD9-8123-0E57-EFAE18E4E64C}"/>
               </a:ext>
             </a:extLst>
           </p:cNvPr>
@@ -5430,15 +5410,21 @@
           <p:nvPr/>
         </p:nvPicPr>
         <p:blipFill>
-          <a:blip r:embed="rId2"/>
+          <a:blip r:embed="rId2">
+            <a:extLst>
+              <a:ext uri="{28A0092B-C50C-407E-A947-70E740481C1C}">
+                <a14:useLocalDpi xmlns:a14="http://schemas.microsoft.com/office/drawing/2010/main" val="0"/>
+              </a:ext>
+            </a:extLst>
+          </a:blip>
           <a:stretch>
             <a:fillRect/>
           </a:stretch>
         </p:blipFill>
         <p:spPr>
           <a:xfrm>
-            <a:off x="7321462" y="2374397"/>
-            <a:ext cx="4870537" cy="2885794"/>
+            <a:off x="7333114" y="2307946"/>
+            <a:ext cx="4713573" cy="2945982"/>
           </a:xfrm>
           <a:prstGeom prst="rect">
             <a:avLst/>
@@ -5447,7 +5433,7 @@
       </p:pic>
       <p:sp>
         <p:nvSpPr>
-          <p:cNvPr id="16" name="Freeform 6">
+          <p:cNvPr id="17" name="Freeform 6">
             <a:extLst>
               <a:ext uri="{FF2B5EF4-FFF2-40B4-BE49-F238E27FC236}">
                 <a16:creationId xmlns:a16="http://schemas.microsoft.com/office/drawing/2014/main" id="{A101E513-AF74-4E9D-A31F-99664250722D}"/>
@@ -5672,7 +5658,7 @@
     </p:spTree>
     <p:extLst>
       <p:ext uri="{BB962C8B-B14F-4D97-AF65-F5344CB8AC3E}">
-        <p14:creationId xmlns:p14="http://schemas.microsoft.com/office/powerpoint/2010/main" val="3180970557"/>
+        <p14:creationId xmlns:p14="http://schemas.microsoft.com/office/powerpoint/2010/main" val="4098626013"/>
       </p:ext>
     </p:extLst>
   </p:cSld>
@@ -5709,7 +5695,7 @@
       </p:grpSpPr>
       <p:sp useBgFill="1">
         <p:nvSpPr>
-          <p:cNvPr id="11" name="Rectangle 10">
+          <p:cNvPr id="10" name="Rectangle 9">
             <a:extLst>
               <a:ext uri="{FF2B5EF4-FFF2-40B4-BE49-F238E27FC236}">
                 <a16:creationId xmlns:a16="http://schemas.microsoft.com/office/drawing/2014/main" id="{C5176844-69C3-4F79-BE38-EA5BDDF4FEA4}"/>
@@ -5804,7 +5790,7 @@
       </p:sp>
       <p:cxnSp>
         <p:nvCxnSpPr>
-          <p:cNvPr id="13" name="Straight Connector 12">
+          <p:cNvPr id="12" name="Straight Connector 11">
             <a:extLst>
               <a:ext uri="{FF2B5EF4-FFF2-40B4-BE49-F238E27FC236}">
                 <a16:creationId xmlns:a16="http://schemas.microsoft.com/office/drawing/2014/main" id="{33862825-C012-4895-A17E-F3D1F62D89DD}"/>
@@ -5887,14 +5873,20 @@
           <a:p>
             <a:r>
               <a:rPr lang="en-US" dirty="0"/>
-              <a:t>When we dive deeper into the analysis of the number of children in foster care and the number of dropouts for the same time period, we do see evidence of a relationship. </a:t>
-            </a:r>
-          </a:p>
-        </p:txBody>
-      </p:sp>
-      <p:sp>
-        <p:nvSpPr>
-          <p:cNvPr id="15" name="Freeform: Shape 14">
+              <a:t>However, when viewing the data in a normalized format, a relationship does begin to materialize. </a:t>
+            </a:r>
+          </a:p>
+          <a:p>
+            <a:r>
+              <a:rPr lang="en-US" dirty="0"/>
+              <a:t>We are able to see an inverse correlation where the household income increased, and the number of children in foster care and dropouts decreased. </a:t>
+            </a:r>
+          </a:p>
+        </p:txBody>
+      </p:sp>
+      <p:sp>
+        <p:nvSpPr>
+          <p:cNvPr id="14" name="Freeform: Shape 13">
             <a:extLst>
               <a:ext uri="{FF2B5EF4-FFF2-40B4-BE49-F238E27FC236}">
                 <a16:creationId xmlns:a16="http://schemas.microsoft.com/office/drawing/2014/main" id="{F76C355F-28BE-46B1-9B8D-5D71A48155D3}"/>
@@ -6030,10 +6022,10 @@
       </p:sp>
       <p:pic>
         <p:nvPicPr>
-          <p:cNvPr id="6" name="Picture 5">
-            <a:extLst>
-              <a:ext uri="{FF2B5EF4-FFF2-40B4-BE49-F238E27FC236}">
-                <a16:creationId xmlns:a16="http://schemas.microsoft.com/office/drawing/2014/main" id="{4270BAC7-947C-E78A-382A-45C29F2534D1}"/>
+          <p:cNvPr id="5" name="Picture 4">
+            <a:extLst>
+              <a:ext uri="{FF2B5EF4-FFF2-40B4-BE49-F238E27FC236}">
+                <a16:creationId xmlns:a16="http://schemas.microsoft.com/office/drawing/2014/main" id="{90EE862F-27D2-BE07-52A4-D362E657E6BA}"/>
               </a:ext>
             </a:extLst>
           </p:cNvPr>
@@ -6050,8 +6042,8 @@
         </p:blipFill>
         <p:spPr>
           <a:xfrm>
-            <a:off x="7357730" y="2299358"/>
-            <a:ext cx="4738133" cy="2985023"/>
+            <a:off x="7321462" y="2374397"/>
+            <a:ext cx="4870537" cy="2885794"/>
           </a:xfrm>
           <a:prstGeom prst="rect">
             <a:avLst/>
@@ -6060,7 +6052,7 @@
       </p:pic>
       <p:sp>
         <p:nvSpPr>
-          <p:cNvPr id="17" name="Freeform 6">
+          <p:cNvPr id="16" name="Freeform 6">
             <a:extLst>
               <a:ext uri="{FF2B5EF4-FFF2-40B4-BE49-F238E27FC236}">
                 <a16:creationId xmlns:a16="http://schemas.microsoft.com/office/drawing/2014/main" id="{A101E513-AF74-4E9D-A31F-99664250722D}"/>
@@ -6285,7 +6277,7 @@
     </p:spTree>
     <p:extLst>
       <p:ext uri="{BB962C8B-B14F-4D97-AF65-F5344CB8AC3E}">
-        <p14:creationId xmlns:p14="http://schemas.microsoft.com/office/powerpoint/2010/main" val="1693051255"/>
+        <p14:creationId xmlns:p14="http://schemas.microsoft.com/office/powerpoint/2010/main" val="3180970557"/>
       </p:ext>
     </p:extLst>
   </p:cSld>
@@ -6296,634 +6288,6 @@
 </file>
 
 <file path=ppt/slides/slide13.xml><?xml version="1.0" encoding="utf-8"?>
-<p:sld xmlns:a="http://schemas.openxmlformats.org/drawingml/2006/main" xmlns:r="http://schemas.openxmlformats.org/officeDocument/2006/relationships" xmlns:p="http://schemas.openxmlformats.org/presentationml/2006/main">
-  <p:cSld>
-    <p:spTree>
-      <p:nvGrpSpPr>
-        <p:cNvPr id="1" name=""/>
-        <p:cNvGrpSpPr/>
-        <p:nvPr/>
-      </p:nvGrpSpPr>
-      <p:grpSpPr>
-        <a:xfrm>
-          <a:off x="0" y="0"/>
-          <a:ext cx="0" cy="0"/>
-          <a:chOff x="0" y="0"/>
-          <a:chExt cx="0" cy="0"/>
-        </a:xfrm>
-      </p:grpSpPr>
-      <p:sp>
-        <p:nvSpPr>
-          <p:cNvPr id="2" name="Title 1">
-            <a:extLst>
-              <a:ext uri="{FF2B5EF4-FFF2-40B4-BE49-F238E27FC236}">
-                <a16:creationId xmlns:a16="http://schemas.microsoft.com/office/drawing/2014/main" id="{48BBF077-D08B-9768-51AF-26A60C35BB5E}"/>
-              </a:ext>
-            </a:extLst>
-          </p:cNvPr>
-          <p:cNvSpPr>
-            <a:spLocks noGrp="1"/>
-          </p:cNvSpPr>
-          <p:nvPr>
-            <p:ph type="title"/>
-          </p:nvPr>
-        </p:nvSpPr>
-        <p:spPr>
-          <a:xfrm>
-            <a:off x="758952" y="758952"/>
-            <a:ext cx="10946945" cy="786069"/>
-          </a:xfrm>
-        </p:spPr>
-        <p:txBody>
-          <a:bodyPr>
-            <a:normAutofit fontScale="90000"/>
-          </a:bodyPr>
-          <a:lstStyle/>
-          <a:p>
-            <a:r>
-              <a:rPr lang="en-US" dirty="0"/>
-              <a:t>Conclusion</a:t>
-            </a:r>
-          </a:p>
-        </p:txBody>
-      </p:sp>
-      <p:sp>
-        <p:nvSpPr>
-          <p:cNvPr id="3" name="Content Placeholder 2">
-            <a:extLst>
-              <a:ext uri="{FF2B5EF4-FFF2-40B4-BE49-F238E27FC236}">
-                <a16:creationId xmlns:a16="http://schemas.microsoft.com/office/drawing/2014/main" id="{DA5702B5-3424-000B-7452-F4E3A91461B7}"/>
-              </a:ext>
-            </a:extLst>
-          </p:cNvPr>
-          <p:cNvSpPr>
-            <a:spLocks noGrp="1"/>
-          </p:cNvSpPr>
-          <p:nvPr>
-            <p:ph idx="1"/>
-          </p:nvPr>
-        </p:nvSpPr>
-        <p:spPr>
-          <a:xfrm>
-            <a:off x="758952" y="1726324"/>
-            <a:ext cx="10946944" cy="4372724"/>
-          </a:xfrm>
-        </p:spPr>
-        <p:txBody>
-          <a:bodyPr>
-            <a:normAutofit fontScale="92500" lnSpcReduction="20000"/>
-          </a:bodyPr>
-          <a:lstStyle/>
-          <a:p>
-            <a:r>
-              <a:rPr lang="en-US" sz="2800" dirty="0"/>
-              <a:t>Median household income is reported to be increasing overtime, although our data doesn’t account for inflation. </a:t>
-            </a:r>
-          </a:p>
-          <a:p>
-            <a:r>
-              <a:rPr lang="en-US" sz="2800" dirty="0"/>
-              <a:t>There appears to be an inverse correlation between median household incomes and children in foster care/high school dropouts</a:t>
-            </a:r>
-          </a:p>
-          <a:p>
-            <a:r>
-              <a:rPr lang="en-US" sz="2800" dirty="0"/>
-              <a:t>While we were not able to find a definitive correlation between the original three datasets, we do believe there is sufficient evidence to warrant </a:t>
-            </a:r>
-            <a:r>
-              <a:rPr lang="en-US" sz="2800"/>
-              <a:t>further study. </a:t>
-            </a:r>
-            <a:endParaRPr lang="en-US" sz="2800" dirty="0"/>
-          </a:p>
-          <a:p>
-            <a:r>
-              <a:rPr lang="en-US" sz="2800" dirty="0"/>
-              <a:t>The appearance of a correlation between the rates of children in foster care and dropouts presents an opportunity to directly focus on the dropout rates of children in foster care. There is also an opportunity to look into how best to allocate federal funds for maximum impact. </a:t>
-            </a:r>
-          </a:p>
-        </p:txBody>
-      </p:sp>
-    </p:spTree>
-    <p:extLst>
-      <p:ext uri="{BB962C8B-B14F-4D97-AF65-F5344CB8AC3E}">
-        <p14:creationId xmlns:p14="http://schemas.microsoft.com/office/powerpoint/2010/main" val="4204088968"/>
-      </p:ext>
-    </p:extLst>
-  </p:cSld>
-  <p:clrMapOvr>
-    <a:masterClrMapping/>
-  </p:clrMapOvr>
-</p:sld>
-</file>
-
-<file path=ppt/slides/slide2.xml><?xml version="1.0" encoding="utf-8"?>
-<p:sld xmlns:a="http://schemas.openxmlformats.org/drawingml/2006/main" xmlns:r="http://schemas.openxmlformats.org/officeDocument/2006/relationships" xmlns:p="http://schemas.openxmlformats.org/presentationml/2006/main">
-  <p:cSld>
-    <p:spTree>
-      <p:nvGrpSpPr>
-        <p:cNvPr id="1" name=""/>
-        <p:cNvGrpSpPr/>
-        <p:nvPr/>
-      </p:nvGrpSpPr>
-      <p:grpSpPr>
-        <a:xfrm>
-          <a:off x="0" y="0"/>
-          <a:ext cx="0" cy="0"/>
-          <a:chOff x="0" y="0"/>
-          <a:chExt cx="0" cy="0"/>
-        </a:xfrm>
-      </p:grpSpPr>
-      <p:sp>
-        <p:nvSpPr>
-          <p:cNvPr id="2" name="Title 1">
-            <a:extLst>
-              <a:ext uri="{FF2B5EF4-FFF2-40B4-BE49-F238E27FC236}">
-                <a16:creationId xmlns:a16="http://schemas.microsoft.com/office/drawing/2014/main" id="{C04D3C63-6DEF-5EBD-DBE3-7DDBBC809D54}"/>
-              </a:ext>
-            </a:extLst>
-          </p:cNvPr>
-          <p:cNvSpPr>
-            <a:spLocks noGrp="1"/>
-          </p:cNvSpPr>
-          <p:nvPr>
-            <p:ph type="title"/>
-          </p:nvPr>
-        </p:nvSpPr>
-        <p:spPr>
-          <a:xfrm>
-            <a:off x="758952" y="758952"/>
-            <a:ext cx="10671048" cy="983138"/>
-          </a:xfrm>
-        </p:spPr>
-        <p:txBody>
-          <a:bodyPr/>
-          <a:lstStyle/>
-          <a:p>
-            <a:r>
-              <a:rPr lang="en-US" dirty="0"/>
-              <a:t>A story about a boy…</a:t>
-            </a:r>
-          </a:p>
-        </p:txBody>
-      </p:sp>
-      <p:sp>
-        <p:nvSpPr>
-          <p:cNvPr id="3" name="Content Placeholder 2">
-            <a:extLst>
-              <a:ext uri="{FF2B5EF4-FFF2-40B4-BE49-F238E27FC236}">
-                <a16:creationId xmlns:a16="http://schemas.microsoft.com/office/drawing/2014/main" id="{D93625C8-830F-C8F0-F19E-5054C905A9DB}"/>
-              </a:ext>
-            </a:extLst>
-          </p:cNvPr>
-          <p:cNvSpPr>
-            <a:spLocks noGrp="1"/>
-          </p:cNvSpPr>
-          <p:nvPr>
-            <p:ph idx="1"/>
-          </p:nvPr>
-        </p:nvSpPr>
-        <p:spPr>
-          <a:xfrm>
-            <a:off x="758952" y="2159876"/>
-            <a:ext cx="10671048" cy="3353955"/>
-          </a:xfrm>
-        </p:spPr>
-        <p:txBody>
-          <a:bodyPr/>
-          <a:lstStyle/>
-          <a:p>
-            <a:r>
-              <a:rPr lang="en-US" dirty="0"/>
-              <a:t>Clayton Graves aged out of the foster care system in 1991. </a:t>
-            </a:r>
-          </a:p>
-          <a:p>
-            <a:r>
-              <a:rPr lang="en-US" dirty="0"/>
-              <a:t>During his early years, Clayton was a bright student who was inquisitive and engaging. </a:t>
-            </a:r>
-          </a:p>
-          <a:p>
-            <a:r>
-              <a:rPr lang="en-US" dirty="0"/>
-              <a:t>Starting his first year of high school, Clayton quickly fell behind the rest of his class. </a:t>
-            </a:r>
-          </a:p>
-          <a:p>
-            <a:r>
-              <a:rPr lang="en-US" dirty="0"/>
-              <a:t>Moving from home to home made it difficult for him to keep up with his peers as he changed schools. </a:t>
-            </a:r>
-          </a:p>
-          <a:p>
-            <a:r>
-              <a:rPr lang="en-US" dirty="0"/>
-              <a:t>By the time he turned he turned 18, Clayton was homeless and had dropped out of high school. He would remain homeless for the next 10 years. </a:t>
-            </a:r>
-          </a:p>
-        </p:txBody>
-      </p:sp>
-    </p:spTree>
-    <p:extLst>
-      <p:ext uri="{BB962C8B-B14F-4D97-AF65-F5344CB8AC3E}">
-        <p14:creationId xmlns:p14="http://schemas.microsoft.com/office/powerpoint/2010/main" val="459855756"/>
-      </p:ext>
-    </p:extLst>
-  </p:cSld>
-  <p:clrMapOvr>
-    <a:masterClrMapping/>
-  </p:clrMapOvr>
-</p:sld>
-</file>
-
-<file path=ppt/slides/slide3.xml><?xml version="1.0" encoding="utf-8"?>
-<p:sld xmlns:a="http://schemas.openxmlformats.org/drawingml/2006/main" xmlns:r="http://schemas.openxmlformats.org/officeDocument/2006/relationships" xmlns:p="http://schemas.openxmlformats.org/presentationml/2006/main">
-  <p:cSld>
-    <p:spTree>
-      <p:nvGrpSpPr>
-        <p:cNvPr id="1" name=""/>
-        <p:cNvGrpSpPr/>
-        <p:nvPr/>
-      </p:nvGrpSpPr>
-      <p:grpSpPr>
-        <a:xfrm>
-          <a:off x="0" y="0"/>
-          <a:ext cx="0" cy="0"/>
-          <a:chOff x="0" y="0"/>
-          <a:chExt cx="0" cy="0"/>
-        </a:xfrm>
-      </p:grpSpPr>
-      <p:sp>
-        <p:nvSpPr>
-          <p:cNvPr id="2" name="Title 1">
-            <a:extLst>
-              <a:ext uri="{FF2B5EF4-FFF2-40B4-BE49-F238E27FC236}">
-                <a16:creationId xmlns:a16="http://schemas.microsoft.com/office/drawing/2014/main" id="{D36E70D3-E641-1515-82CA-8247C136CB67}"/>
-              </a:ext>
-            </a:extLst>
-          </p:cNvPr>
-          <p:cNvSpPr>
-            <a:spLocks noGrp="1"/>
-          </p:cNvSpPr>
-          <p:nvPr>
-            <p:ph type="title"/>
-          </p:nvPr>
-        </p:nvSpPr>
-        <p:spPr/>
-        <p:txBody>
-          <a:bodyPr>
-            <a:noAutofit/>
-          </a:bodyPr>
-          <a:lstStyle/>
-          <a:p>
-            <a:r>
-              <a:rPr lang="en-US" sz="2800" dirty="0"/>
-              <a:t>“In Colorado, only one in four students who experience foster care during high school graduate with their class.”</a:t>
-            </a:r>
-            <a:br>
-              <a:rPr lang="en-US" sz="2800" dirty="0"/>
-            </a:br>
-            <a:br>
-              <a:rPr lang="en-US" sz="2800" dirty="0"/>
-            </a:br>
-            <a:r>
-              <a:rPr lang="en-US" sz="2800" dirty="0"/>
-              <a:t>-Colorado Department of Human Services</a:t>
-            </a:r>
-          </a:p>
-        </p:txBody>
-      </p:sp>
-      <p:sp>
-        <p:nvSpPr>
-          <p:cNvPr id="3" name="Content Placeholder 2">
-            <a:extLst>
-              <a:ext uri="{FF2B5EF4-FFF2-40B4-BE49-F238E27FC236}">
-                <a16:creationId xmlns:a16="http://schemas.microsoft.com/office/drawing/2014/main" id="{42699A2A-9F5D-A3BC-ED26-28E5E8F2118E}"/>
-              </a:ext>
-            </a:extLst>
-          </p:cNvPr>
-          <p:cNvSpPr>
-            <a:spLocks noGrp="1"/>
-          </p:cNvSpPr>
-          <p:nvPr>
-            <p:ph idx="1"/>
-          </p:nvPr>
-        </p:nvSpPr>
-        <p:spPr/>
-        <p:txBody>
-          <a:bodyPr/>
-          <a:lstStyle/>
-          <a:p>
-            <a:r>
-              <a:rPr lang="en-US" dirty="0"/>
-              <a:t>It is no secret that foster kids struggle in school.</a:t>
-            </a:r>
-          </a:p>
-          <a:p>
-            <a:pPr marL="0" indent="0">
-              <a:buNone/>
-            </a:pPr>
-            <a:endParaRPr lang="en-US" dirty="0"/>
-          </a:p>
-          <a:p>
-            <a:r>
-              <a:rPr lang="en-US" dirty="0"/>
-              <a:t>In an annual report to the Colorado Legislature, students in out-of-home placement noted significantly higher truancy rates than students in more conventional households. </a:t>
-            </a:r>
-          </a:p>
-          <a:p>
-            <a:pPr marL="0" indent="0">
-              <a:buNone/>
-            </a:pPr>
-            <a:endParaRPr lang="en-US" dirty="0"/>
-          </a:p>
-          <a:p>
-            <a:r>
-              <a:rPr lang="en-US" dirty="0"/>
-              <a:t>We decided to take a look at the problem from a national perspective in order to determine how wide-spread the problem is. </a:t>
-            </a:r>
-          </a:p>
-        </p:txBody>
-      </p:sp>
-    </p:spTree>
-    <p:extLst>
-      <p:ext uri="{BB962C8B-B14F-4D97-AF65-F5344CB8AC3E}">
-        <p14:creationId xmlns:p14="http://schemas.microsoft.com/office/powerpoint/2010/main" val="3291610367"/>
-      </p:ext>
-    </p:extLst>
-  </p:cSld>
-  <p:clrMapOvr>
-    <a:masterClrMapping/>
-  </p:clrMapOvr>
-</p:sld>
-</file>
-
-<file path=ppt/slides/slide4.xml><?xml version="1.0" encoding="utf-8"?>
-<p:sld xmlns:a="http://schemas.openxmlformats.org/drawingml/2006/main" xmlns:r="http://schemas.openxmlformats.org/officeDocument/2006/relationships" xmlns:p="http://schemas.openxmlformats.org/presentationml/2006/main">
-  <p:cSld>
-    <p:spTree>
-      <p:nvGrpSpPr>
-        <p:cNvPr id="1" name=""/>
-        <p:cNvGrpSpPr/>
-        <p:nvPr/>
-      </p:nvGrpSpPr>
-      <p:grpSpPr>
-        <a:xfrm>
-          <a:off x="0" y="0"/>
-          <a:ext cx="0" cy="0"/>
-          <a:chOff x="0" y="0"/>
-          <a:chExt cx="0" cy="0"/>
-        </a:xfrm>
-      </p:grpSpPr>
-      <p:sp>
-        <p:nvSpPr>
-          <p:cNvPr id="2" name="Title 1">
-            <a:extLst>
-              <a:ext uri="{FF2B5EF4-FFF2-40B4-BE49-F238E27FC236}">
-                <a16:creationId xmlns:a16="http://schemas.microsoft.com/office/drawing/2014/main" id="{48BBF077-D08B-9768-51AF-26A60C35BB5E}"/>
-              </a:ext>
-            </a:extLst>
-          </p:cNvPr>
-          <p:cNvSpPr>
-            <a:spLocks noGrp="1"/>
-          </p:cNvSpPr>
-          <p:nvPr>
-            <p:ph type="title"/>
-          </p:nvPr>
-        </p:nvSpPr>
-        <p:spPr>
-          <a:xfrm>
-            <a:off x="758952" y="758952"/>
-            <a:ext cx="10946945" cy="786069"/>
-          </a:xfrm>
-        </p:spPr>
-        <p:txBody>
-          <a:bodyPr>
-            <a:normAutofit fontScale="90000"/>
-          </a:bodyPr>
-          <a:lstStyle/>
-          <a:p>
-            <a:r>
-              <a:rPr lang="en-US" dirty="0"/>
-              <a:t>Hypothesis</a:t>
-            </a:r>
-          </a:p>
-        </p:txBody>
-      </p:sp>
-      <p:sp>
-        <p:nvSpPr>
-          <p:cNvPr id="3" name="Content Placeholder 2">
-            <a:extLst>
-              <a:ext uri="{FF2B5EF4-FFF2-40B4-BE49-F238E27FC236}">
-                <a16:creationId xmlns:a16="http://schemas.microsoft.com/office/drawing/2014/main" id="{DA5702B5-3424-000B-7452-F4E3A91461B7}"/>
-              </a:ext>
-            </a:extLst>
-          </p:cNvPr>
-          <p:cNvSpPr>
-            <a:spLocks noGrp="1"/>
-          </p:cNvSpPr>
-          <p:nvPr>
-            <p:ph idx="1"/>
-          </p:nvPr>
-        </p:nvSpPr>
-        <p:spPr>
-          <a:xfrm>
-            <a:off x="758952" y="1726324"/>
-            <a:ext cx="10946944" cy="4372724"/>
-          </a:xfrm>
-        </p:spPr>
-        <p:txBody>
-          <a:bodyPr/>
-          <a:lstStyle/>
-          <a:p>
-            <a:r>
-              <a:rPr lang="en-US" sz="2800" dirty="0"/>
-              <a:t>Based on Clayton’s experience, we believe that there is a direct correlation between poverty level, number of children in foster care, and the number of high school dropouts. </a:t>
-            </a:r>
-          </a:p>
-          <a:p>
-            <a:pPr marL="0" indent="0">
-              <a:buNone/>
-            </a:pPr>
-            <a:endParaRPr lang="en-US" sz="2800" dirty="0"/>
-          </a:p>
-          <a:p>
-            <a:r>
-              <a:rPr lang="en-US" sz="2800" dirty="0"/>
-              <a:t>The lower the median household income, the higher the number of children in foster care and thus the higher the number of children who do not finish high school </a:t>
-            </a:r>
-          </a:p>
-        </p:txBody>
-      </p:sp>
-    </p:spTree>
-    <p:extLst>
-      <p:ext uri="{BB962C8B-B14F-4D97-AF65-F5344CB8AC3E}">
-        <p14:creationId xmlns:p14="http://schemas.microsoft.com/office/powerpoint/2010/main" val="126401352"/>
-      </p:ext>
-    </p:extLst>
-  </p:cSld>
-  <p:clrMapOvr>
-    <a:masterClrMapping/>
-  </p:clrMapOvr>
-</p:sld>
-</file>
-
-<file path=ppt/slides/slide5.xml><?xml version="1.0" encoding="utf-8"?>
-<p:sld xmlns:a="http://schemas.openxmlformats.org/drawingml/2006/main" xmlns:r="http://schemas.openxmlformats.org/officeDocument/2006/relationships" xmlns:p="http://schemas.openxmlformats.org/presentationml/2006/main">
-  <p:cSld>
-    <p:spTree>
-      <p:nvGrpSpPr>
-        <p:cNvPr id="1" name=""/>
-        <p:cNvGrpSpPr/>
-        <p:nvPr/>
-      </p:nvGrpSpPr>
-      <p:grpSpPr>
-        <a:xfrm>
-          <a:off x="0" y="0"/>
-          <a:ext cx="0" cy="0"/>
-          <a:chOff x="0" y="0"/>
-          <a:chExt cx="0" cy="0"/>
-        </a:xfrm>
-      </p:grpSpPr>
-      <p:sp>
-        <p:nvSpPr>
-          <p:cNvPr id="2" name="Title 1">
-            <a:extLst>
-              <a:ext uri="{FF2B5EF4-FFF2-40B4-BE49-F238E27FC236}">
-                <a16:creationId xmlns:a16="http://schemas.microsoft.com/office/drawing/2014/main" id="{48BBF077-D08B-9768-51AF-26A60C35BB5E}"/>
-              </a:ext>
-            </a:extLst>
-          </p:cNvPr>
-          <p:cNvSpPr>
-            <a:spLocks noGrp="1"/>
-          </p:cNvSpPr>
-          <p:nvPr>
-            <p:ph type="title"/>
-          </p:nvPr>
-        </p:nvSpPr>
-        <p:spPr>
-          <a:xfrm>
-            <a:off x="758952" y="758952"/>
-            <a:ext cx="10946945" cy="786069"/>
-          </a:xfrm>
-        </p:spPr>
-        <p:txBody>
-          <a:bodyPr>
-            <a:normAutofit fontScale="90000"/>
-          </a:bodyPr>
-          <a:lstStyle/>
-          <a:p>
-            <a:r>
-              <a:rPr lang="en-US" dirty="0"/>
-              <a:t>Method</a:t>
-            </a:r>
-          </a:p>
-        </p:txBody>
-      </p:sp>
-      <p:sp>
-        <p:nvSpPr>
-          <p:cNvPr id="3" name="Content Placeholder 2">
-            <a:extLst>
-              <a:ext uri="{FF2B5EF4-FFF2-40B4-BE49-F238E27FC236}">
-                <a16:creationId xmlns:a16="http://schemas.microsoft.com/office/drawing/2014/main" id="{DA5702B5-3424-000B-7452-F4E3A91461B7}"/>
-              </a:ext>
-            </a:extLst>
-          </p:cNvPr>
-          <p:cNvSpPr>
-            <a:spLocks noGrp="1"/>
-          </p:cNvSpPr>
-          <p:nvPr>
-            <p:ph idx="1"/>
-          </p:nvPr>
-        </p:nvSpPr>
-        <p:spPr>
-          <a:xfrm>
-            <a:off x="758952" y="1726324"/>
-            <a:ext cx="10946944" cy="4372724"/>
-          </a:xfrm>
-        </p:spPr>
-        <p:txBody>
-          <a:bodyPr/>
-          <a:lstStyle/>
-          <a:p>
-            <a:r>
-              <a:rPr lang="en-US" dirty="0"/>
-              <a:t> In order to properly test our hypothesis, we needed to gather 3 data sets on a national level:</a:t>
-            </a:r>
-          </a:p>
-          <a:p>
-            <a:pPr marL="697230" lvl="1" indent="-514350">
-              <a:buFont typeface="+mj-lt"/>
-              <a:buAutoNum type="arabicPeriod"/>
-            </a:pPr>
-            <a:r>
-              <a:rPr lang="en-US" dirty="0"/>
-              <a:t>Median household income by state</a:t>
-            </a:r>
-          </a:p>
-          <a:p>
-            <a:pPr marL="697230" lvl="1" indent="-514350">
-              <a:buFont typeface="+mj-lt"/>
-              <a:buAutoNum type="arabicPeriod"/>
-            </a:pPr>
-            <a:r>
-              <a:rPr lang="en-US" dirty="0"/>
-              <a:t>Number of children in foster care by state</a:t>
-            </a:r>
-          </a:p>
-          <a:p>
-            <a:pPr marL="697230" lvl="1" indent="-514350">
-              <a:buFont typeface="+mj-lt"/>
-              <a:buAutoNum type="arabicPeriod"/>
-            </a:pPr>
-            <a:r>
-              <a:rPr lang="en-US" dirty="0"/>
-              <a:t>Number of foster children who successfully graduated high school and/or completed post secondary degrees</a:t>
-            </a:r>
-          </a:p>
-          <a:p>
-            <a:r>
-              <a:rPr lang="en-US" sz="2000" i="0" dirty="0"/>
-              <a:t>We were unable to find the third dataset and had to substitute in a different dataset</a:t>
-            </a:r>
-          </a:p>
-          <a:p>
-            <a:r>
-              <a:rPr lang="en-US" dirty="0"/>
-              <a:t>T</a:t>
-            </a:r>
-            <a:r>
-              <a:rPr lang="en-US" sz="2000" i="0" dirty="0"/>
-              <a:t>he number of high school drop-outs was available by state and could still potentially show a correlation. We will explore this more in later slides. </a:t>
-            </a:r>
-          </a:p>
-          <a:p>
-            <a:pPr marL="0" indent="0">
-              <a:buNone/>
-            </a:pPr>
-            <a:endParaRPr lang="en-US" dirty="0"/>
-          </a:p>
-          <a:p>
-            <a:endParaRPr lang="en-US" dirty="0"/>
-          </a:p>
-        </p:txBody>
-      </p:sp>
-    </p:spTree>
-    <p:extLst>
-      <p:ext uri="{BB962C8B-B14F-4D97-AF65-F5344CB8AC3E}">
-        <p14:creationId xmlns:p14="http://schemas.microsoft.com/office/powerpoint/2010/main" val="1421390050"/>
-      </p:ext>
-    </p:extLst>
-  </p:cSld>
-  <p:clrMapOvr>
-    <a:masterClrMapping/>
-  </p:clrMapOvr>
-</p:sld>
-</file>
-
-<file path=ppt/slides/slide6.xml><?xml version="1.0" encoding="utf-8"?>
 <p:sld xmlns:a="http://schemas.openxmlformats.org/drawingml/2006/main" xmlns:r="http://schemas.openxmlformats.org/officeDocument/2006/relationships" xmlns:p="http://schemas.openxmlformats.org/presentationml/2006/main">
   <p:cSld>
     <p:bg>
@@ -6950,7 +6314,7 @@
       </p:grpSpPr>
       <p:sp useBgFill="1">
         <p:nvSpPr>
-          <p:cNvPr id="19" name="Rectangle 18">
+          <p:cNvPr id="11" name="Rectangle 10">
             <a:extLst>
               <a:ext uri="{FF2B5EF4-FFF2-40B4-BE49-F238E27FC236}">
                 <a16:creationId xmlns:a16="http://schemas.microsoft.com/office/drawing/2014/main" id="{C5176844-69C3-4F79-BE38-EA5BDDF4FEA4}"/>
@@ -7037,15 +6401,15 @@
           <a:lstStyle/>
           <a:p>
             <a:r>
-              <a:rPr lang="en-US" sz="5100"/>
-              <a:t>Median Household Income</a:t>
+              <a:rPr lang="en-US" dirty="0"/>
+              <a:t>Analysis</a:t>
             </a:r>
           </a:p>
         </p:txBody>
       </p:sp>
       <p:cxnSp>
         <p:nvCxnSpPr>
-          <p:cNvPr id="21" name="Straight Connector 20">
+          <p:cNvPr id="13" name="Straight Connector 12">
             <a:extLst>
               <a:ext uri="{FF2B5EF4-FFF2-40B4-BE49-F238E27FC236}">
                 <a16:creationId xmlns:a16="http://schemas.microsoft.com/office/drawing/2014/main" id="{33862825-C012-4895-A17E-F3D1F62D89DD}"/>
@@ -7128,35 +6492,14 @@
           <a:p>
             <a:r>
               <a:rPr lang="en-US" dirty="0"/>
-              <a:t>We pulled the data from datacenter.aef.org.</a:t>
-            </a:r>
-          </a:p>
-          <a:p>
-            <a:r>
-              <a:rPr lang="en-US" dirty="0"/>
-              <a:t>Data was presented by state and year. </a:t>
-            </a:r>
-          </a:p>
-          <a:p>
-            <a:r>
-              <a:rPr lang="en-US" dirty="0"/>
-              <a:t>Despite the impact of the 2008 housing crises, initial graph data showed a steady increase in household income from 2005 to 2021</a:t>
-            </a:r>
-          </a:p>
-          <a:p>
-            <a:endParaRPr lang="en-US" dirty="0"/>
-          </a:p>
-          <a:p>
-            <a:endParaRPr lang="en-US" dirty="0"/>
-          </a:p>
-          <a:p>
-            <a:endParaRPr lang="en-US" dirty="0"/>
-          </a:p>
-        </p:txBody>
-      </p:sp>
-      <p:sp>
-        <p:nvSpPr>
-          <p:cNvPr id="23" name="Freeform: Shape 22">
+              <a:t>When we dive deeper into the analysis of the number of children in foster care and the number of dropouts for the same time period, we do see evidence of a relationship. </a:t>
+            </a:r>
+          </a:p>
+        </p:txBody>
+      </p:sp>
+      <p:sp>
+        <p:nvSpPr>
+          <p:cNvPr id="15" name="Freeform: Shape 14">
             <a:extLst>
               <a:ext uri="{FF2B5EF4-FFF2-40B4-BE49-F238E27FC236}">
                 <a16:creationId xmlns:a16="http://schemas.microsoft.com/office/drawing/2014/main" id="{F76C355F-28BE-46B1-9B8D-5D71A48155D3}"/>
@@ -7290,9 +6633,39 @@
           </a:p>
         </p:txBody>
       </p:sp>
-      <p:sp>
-        <p:nvSpPr>
-          <p:cNvPr id="25" name="Freeform 6">
+      <p:pic>
+        <p:nvPicPr>
+          <p:cNvPr id="6" name="Picture 5">
+            <a:extLst>
+              <a:ext uri="{FF2B5EF4-FFF2-40B4-BE49-F238E27FC236}">
+                <a16:creationId xmlns:a16="http://schemas.microsoft.com/office/drawing/2014/main" id="{4270BAC7-947C-E78A-382A-45C29F2534D1}"/>
+              </a:ext>
+            </a:extLst>
+          </p:cNvPr>
+          <p:cNvPicPr>
+            <a:picLocks noChangeAspect="1"/>
+          </p:cNvPicPr>
+          <p:nvPr/>
+        </p:nvPicPr>
+        <p:blipFill>
+          <a:blip r:embed="rId2"/>
+          <a:stretch>
+            <a:fillRect/>
+          </a:stretch>
+        </p:blipFill>
+        <p:spPr>
+          <a:xfrm>
+            <a:off x="7357730" y="2299358"/>
+            <a:ext cx="4738133" cy="2985023"/>
+          </a:xfrm>
+          <a:prstGeom prst="rect">
+            <a:avLst/>
+          </a:prstGeom>
+        </p:spPr>
+      </p:pic>
+      <p:sp>
+        <p:nvSpPr>
+          <p:cNvPr id="17" name="Freeform 6">
             <a:extLst>
               <a:ext uri="{FF2B5EF4-FFF2-40B4-BE49-F238E27FC236}">
                 <a16:creationId xmlns:a16="http://schemas.microsoft.com/office/drawing/2014/main" id="{A101E513-AF74-4E9D-A31F-99664250722D}"/>
@@ -7514,46 +6887,1023 @@
           </a:p>
         </p:txBody>
       </p:sp>
-      <p:pic>
-        <p:nvPicPr>
-          <p:cNvPr id="7" name="Picture 6" descr="A graph with a line graph&#10;&#10;Description automatically generated with medium confidence">
-            <a:extLst>
-              <a:ext uri="{FF2B5EF4-FFF2-40B4-BE49-F238E27FC236}">
-                <a16:creationId xmlns:a16="http://schemas.microsoft.com/office/drawing/2014/main" id="{7BD2D744-C4B7-055B-8644-2D51A753D1F6}"/>
-              </a:ext>
-            </a:extLst>
-          </p:cNvPr>
-          <p:cNvPicPr>
-            <a:picLocks noChangeAspect="1"/>
-          </p:cNvPicPr>
-          <p:nvPr/>
-        </p:nvPicPr>
-        <p:blipFill>
-          <a:blip r:embed="rId2">
-            <a:extLst>
-              <a:ext uri="{28A0092B-C50C-407E-A947-70E740481C1C}">
-                <a14:useLocalDpi xmlns:a14="http://schemas.microsoft.com/office/drawing/2010/main" val="0"/>
-              </a:ext>
-            </a:extLst>
-          </a:blip>
-          <a:stretch>
-            <a:fillRect/>
-          </a:stretch>
-        </p:blipFill>
+    </p:spTree>
+    <p:extLst>
+      <p:ext uri="{BB962C8B-B14F-4D97-AF65-F5344CB8AC3E}">
+        <p14:creationId xmlns:p14="http://schemas.microsoft.com/office/powerpoint/2010/main" val="1693051255"/>
+      </p:ext>
+    </p:extLst>
+  </p:cSld>
+  <p:clrMapOvr>
+    <a:masterClrMapping/>
+  </p:clrMapOvr>
+</p:sld>
+</file>
+
+<file path=ppt/slides/slide14.xml><?xml version="1.0" encoding="utf-8"?>
+<p:sld xmlns:a="http://schemas.openxmlformats.org/drawingml/2006/main" xmlns:r="http://schemas.openxmlformats.org/officeDocument/2006/relationships" xmlns:p="http://schemas.openxmlformats.org/presentationml/2006/main">
+  <p:cSld>
+    <p:spTree>
+      <p:nvGrpSpPr>
+        <p:cNvPr id="1" name=""/>
+        <p:cNvGrpSpPr/>
+        <p:nvPr/>
+      </p:nvGrpSpPr>
+      <p:grpSpPr>
+        <a:xfrm>
+          <a:off x="0" y="0"/>
+          <a:ext cx="0" cy="0"/>
+          <a:chOff x="0" y="0"/>
+          <a:chExt cx="0" cy="0"/>
+        </a:xfrm>
+      </p:grpSpPr>
+      <p:sp>
+        <p:nvSpPr>
+          <p:cNvPr id="2" name="Title 1">
+            <a:extLst>
+              <a:ext uri="{FF2B5EF4-FFF2-40B4-BE49-F238E27FC236}">
+                <a16:creationId xmlns:a16="http://schemas.microsoft.com/office/drawing/2014/main" id="{48BBF077-D08B-9768-51AF-26A60C35BB5E}"/>
+              </a:ext>
+            </a:extLst>
+          </p:cNvPr>
+          <p:cNvSpPr>
+            <a:spLocks noGrp="1"/>
+          </p:cNvSpPr>
+          <p:nvPr>
+            <p:ph type="title"/>
+          </p:nvPr>
+        </p:nvSpPr>
         <p:spPr>
           <a:xfrm>
-            <a:off x="7449248" y="2065116"/>
-            <a:ext cx="4468774" cy="3463162"/>
+            <a:off x="758952" y="758952"/>
+            <a:ext cx="10946945" cy="786069"/>
+          </a:xfrm>
+        </p:spPr>
+        <p:txBody>
+          <a:bodyPr>
+            <a:normAutofit fontScale="90000"/>
+          </a:bodyPr>
+          <a:lstStyle/>
+          <a:p>
+            <a:r>
+              <a:rPr lang="en-US" dirty="0"/>
+              <a:t>Conclusion</a:t>
+            </a:r>
+          </a:p>
+        </p:txBody>
+      </p:sp>
+      <p:sp>
+        <p:nvSpPr>
+          <p:cNvPr id="3" name="Content Placeholder 2">
+            <a:extLst>
+              <a:ext uri="{FF2B5EF4-FFF2-40B4-BE49-F238E27FC236}">
+                <a16:creationId xmlns:a16="http://schemas.microsoft.com/office/drawing/2014/main" id="{DA5702B5-3424-000B-7452-F4E3A91461B7}"/>
+              </a:ext>
+            </a:extLst>
+          </p:cNvPr>
+          <p:cNvSpPr>
+            <a:spLocks noGrp="1"/>
+          </p:cNvSpPr>
+          <p:nvPr>
+            <p:ph idx="1"/>
+          </p:nvPr>
+        </p:nvSpPr>
+        <p:spPr>
+          <a:xfrm>
+            <a:off x="758952" y="1726324"/>
+            <a:ext cx="10946944" cy="4372724"/>
+          </a:xfrm>
+        </p:spPr>
+        <p:txBody>
+          <a:bodyPr>
+            <a:normAutofit fontScale="92500"/>
+          </a:bodyPr>
+          <a:lstStyle/>
+          <a:p>
+            <a:r>
+              <a:rPr lang="en-US" sz="2800" dirty="0"/>
+              <a:t>Median household income is reported to be increasing overtime, although our data doesn’t account for inflation. </a:t>
+            </a:r>
+          </a:p>
+          <a:p>
+            <a:r>
+              <a:rPr lang="en-US" sz="2800" dirty="0"/>
+              <a:t>There appears to be an inverse correlation between median household incomes and children in foster care/high school dropouts</a:t>
+            </a:r>
+          </a:p>
+          <a:p>
+            <a:r>
+              <a:rPr lang="en-US" sz="2800" dirty="0"/>
+              <a:t>The appearance of a correlation between the rates of children in foster care and dropouts presents an opportunity to directly focus on the dropout rates of children in foster care. There is also an opportunity to look into how best to allocate federal funds for maximum impact. </a:t>
+            </a:r>
+          </a:p>
+        </p:txBody>
+      </p:sp>
+    </p:spTree>
+    <p:extLst>
+      <p:ext uri="{BB962C8B-B14F-4D97-AF65-F5344CB8AC3E}">
+        <p14:creationId xmlns:p14="http://schemas.microsoft.com/office/powerpoint/2010/main" val="4204088968"/>
+      </p:ext>
+    </p:extLst>
+  </p:cSld>
+  <p:clrMapOvr>
+    <a:masterClrMapping/>
+  </p:clrMapOvr>
+</p:sld>
+</file>
+
+<file path=ppt/slides/slide15.xml><?xml version="1.0" encoding="utf-8"?>
+<p:sld xmlns:a="http://schemas.openxmlformats.org/drawingml/2006/main" xmlns:r="http://schemas.openxmlformats.org/officeDocument/2006/relationships" xmlns:p="http://schemas.openxmlformats.org/presentationml/2006/main">
+  <p:cSld>
+    <p:spTree>
+      <p:nvGrpSpPr>
+        <p:cNvPr id="1" name=""/>
+        <p:cNvGrpSpPr/>
+        <p:nvPr/>
+      </p:nvGrpSpPr>
+      <p:grpSpPr>
+        <a:xfrm>
+          <a:off x="0" y="0"/>
+          <a:ext cx="0" cy="0"/>
+          <a:chOff x="0" y="0"/>
+          <a:chExt cx="0" cy="0"/>
+        </a:xfrm>
+      </p:grpSpPr>
+      <p:sp>
+        <p:nvSpPr>
+          <p:cNvPr id="4" name="TextBox 3">
+            <a:extLst>
+              <a:ext uri="{FF2B5EF4-FFF2-40B4-BE49-F238E27FC236}">
+                <a16:creationId xmlns:a16="http://schemas.microsoft.com/office/drawing/2014/main" id="{52E4618E-8CEA-763B-2DA8-6579EC23C36C}"/>
+              </a:ext>
+            </a:extLst>
+          </p:cNvPr>
+          <p:cNvSpPr txBox="1"/>
+          <p:nvPr/>
+        </p:nvSpPr>
+        <p:spPr>
+          <a:xfrm>
+            <a:off x="1143000" y="1013790"/>
+            <a:ext cx="10793896" cy="2339102"/>
           </a:xfrm>
           <a:prstGeom prst="rect">
             <a:avLst/>
           </a:prstGeom>
+          <a:noFill/>
         </p:spPr>
-      </p:pic>
+        <p:txBody>
+          <a:bodyPr wrap="square" rtlCol="0">
+            <a:spAutoFit/>
+          </a:bodyPr>
+          <a:lstStyle/>
+          <a:p>
+            <a:r>
+              <a:rPr lang="en-US" dirty="0"/>
+              <a:t>Sources</a:t>
+            </a:r>
+          </a:p>
+          <a:p>
+            <a:pPr marL="228600" indent="-228600">
+              <a:buFontTx/>
+              <a:buAutoNum type="arabicPeriod"/>
+            </a:pPr>
+            <a:r>
+              <a:rPr lang="en-US" sz="1100" dirty="0"/>
+              <a:t>Project </a:t>
+            </a:r>
+            <a:r>
+              <a:rPr lang="en-GB" sz="1100" dirty="0">
+                <a:effectLst/>
+                <a:latin typeface="Helvetica Neue" panose="02000503000000020004" pitchFamily="2" charset="0"/>
+                <a:hlinkClick r:id="rId2"/>
+              </a:rPr>
+              <a:t>Github</a:t>
+            </a:r>
+            <a:endParaRPr lang="en-US" sz="1100" dirty="0"/>
+          </a:p>
+          <a:p>
+            <a:pPr marL="228600" indent="-228600">
+              <a:buFontTx/>
+              <a:buAutoNum type="arabicPeriod"/>
+            </a:pPr>
+            <a:r>
+              <a:rPr lang="en-US" sz="1100" dirty="0"/>
+              <a:t>Project </a:t>
+            </a:r>
+            <a:r>
+              <a:rPr lang="en-US" sz="1100" dirty="0" err="1"/>
+              <a:t>Github</a:t>
+            </a:r>
+            <a:r>
+              <a:rPr lang="en-US" sz="1100" dirty="0"/>
+              <a:t> </a:t>
+            </a:r>
+            <a:r>
+              <a:rPr lang="en-GB" sz="1100" dirty="0">
+                <a:effectLst/>
+                <a:latin typeface="Helvetica Neue" panose="02000503000000020004" pitchFamily="2" charset="0"/>
+                <a:hlinkClick r:id="rId3"/>
+              </a:rPr>
+              <a:t>README</a:t>
+            </a:r>
+            <a:endParaRPr lang="en-GB" sz="1100" dirty="0">
+              <a:effectLst/>
+              <a:latin typeface="Helvetica Neue" panose="02000503000000020004" pitchFamily="2" charset="0"/>
+            </a:endParaRPr>
+          </a:p>
+          <a:p>
+            <a:pPr marL="228600" indent="-228600">
+              <a:buFontTx/>
+              <a:buAutoNum type="arabicPeriod"/>
+            </a:pPr>
+            <a:r>
+              <a:rPr lang="en-GB" sz="1100" dirty="0">
+                <a:latin typeface="Helvetica Neue" panose="02000503000000020004" pitchFamily="2" charset="0"/>
+              </a:rPr>
+              <a:t>Quote from </a:t>
+            </a:r>
+            <a:r>
+              <a:rPr lang="en-GB" sz="1100" dirty="0">
+                <a:effectLst/>
+                <a:latin typeface="Helvetica Neue" panose="02000503000000020004" pitchFamily="2" charset="0"/>
+                <a:hlinkClick r:id="rId4"/>
+              </a:rPr>
+              <a:t>Colorado Department of Health</a:t>
+            </a:r>
+            <a:endParaRPr lang="en-GB" sz="1100" dirty="0">
+              <a:latin typeface="Helvetica Neue" panose="02000503000000020004" pitchFamily="2" charset="0"/>
+            </a:endParaRPr>
+          </a:p>
+          <a:p>
+            <a:pPr marL="228600" indent="-228600">
+              <a:buFontTx/>
+              <a:buAutoNum type="arabicPeriod"/>
+            </a:pPr>
+            <a:r>
+              <a:rPr lang="en-GB" sz="1100" dirty="0">
+                <a:latin typeface="Helvetica Neue" panose="02000503000000020004" pitchFamily="2" charset="0"/>
+                <a:hlinkClick r:id="rId5"/>
+              </a:rPr>
+              <a:t>Median Household Income Data </a:t>
+            </a:r>
+            <a:endParaRPr lang="en-GB" sz="1100" dirty="0">
+              <a:latin typeface="Helvetica Neue" panose="02000503000000020004" pitchFamily="2" charset="0"/>
+            </a:endParaRPr>
+          </a:p>
+          <a:p>
+            <a:pPr marL="228600" indent="-228600">
+              <a:buFontTx/>
+              <a:buAutoNum type="arabicPeriod"/>
+            </a:pPr>
+            <a:r>
+              <a:rPr lang="en-GB" sz="1100" dirty="0">
+                <a:latin typeface="Helvetica Neue" panose="02000503000000020004" pitchFamily="2" charset="0"/>
+                <a:hlinkClick r:id="rId6"/>
+              </a:rPr>
+              <a:t>Children in Foster Care Data Source </a:t>
+            </a:r>
+            <a:endParaRPr lang="en-GB" sz="1100" dirty="0">
+              <a:latin typeface="Helvetica Neue" panose="02000503000000020004" pitchFamily="2" charset="0"/>
+            </a:endParaRPr>
+          </a:p>
+          <a:p>
+            <a:pPr marL="228600" indent="-228600">
+              <a:buFontTx/>
+              <a:buAutoNum type="arabicPeriod"/>
+            </a:pPr>
+            <a:r>
+              <a:rPr lang="en-GB" sz="1100" dirty="0">
+                <a:latin typeface="Helvetica Neue" panose="02000503000000020004" pitchFamily="2" charset="0"/>
+                <a:hlinkClick r:id="rId7"/>
+              </a:rPr>
+              <a:t>Dropouts Data</a:t>
+            </a:r>
+            <a:endParaRPr lang="en-GB" sz="1100" dirty="0">
+              <a:effectLst/>
+              <a:latin typeface="Helvetica Neue" panose="02000503000000020004" pitchFamily="2" charset="0"/>
+            </a:endParaRPr>
+          </a:p>
+          <a:p>
+            <a:pPr marL="228600" indent="-228600">
+              <a:buFontTx/>
+              <a:buAutoNum type="arabicPeriod"/>
+            </a:pPr>
+            <a:endParaRPr lang="en-US" sz="1100" dirty="0"/>
+          </a:p>
+          <a:p>
+            <a:pPr marL="228600" indent="-228600">
+              <a:buAutoNum type="arabicPeriod"/>
+            </a:pPr>
+            <a:endParaRPr lang="en-US" sz="1100" dirty="0"/>
+          </a:p>
+          <a:p>
+            <a:pPr marL="228600" indent="-228600">
+              <a:buAutoNum type="arabicPeriod"/>
+            </a:pPr>
+            <a:endParaRPr lang="en-US" sz="1100" dirty="0"/>
+          </a:p>
+          <a:p>
+            <a:pPr marL="228600" indent="-228600">
+              <a:buAutoNum type="arabicPeriod"/>
+            </a:pPr>
+            <a:endParaRPr lang="en-US" sz="1100" dirty="0"/>
+          </a:p>
+          <a:p>
+            <a:endParaRPr lang="en-US" dirty="0"/>
+          </a:p>
+        </p:txBody>
+      </p:sp>
     </p:spTree>
     <p:extLst>
       <p:ext uri="{BB962C8B-B14F-4D97-AF65-F5344CB8AC3E}">
-        <p14:creationId xmlns:p14="http://schemas.microsoft.com/office/powerpoint/2010/main" val="4014408675"/>
+        <p14:creationId xmlns:p14="http://schemas.microsoft.com/office/powerpoint/2010/main" val="790865366"/>
+      </p:ext>
+    </p:extLst>
+  </p:cSld>
+  <p:clrMapOvr>
+    <a:masterClrMapping/>
+  </p:clrMapOvr>
+</p:sld>
+</file>
+
+<file path=ppt/slides/slide2.xml><?xml version="1.0" encoding="utf-8"?>
+<p:sld xmlns:a="http://schemas.openxmlformats.org/drawingml/2006/main" xmlns:r="http://schemas.openxmlformats.org/officeDocument/2006/relationships" xmlns:p="http://schemas.openxmlformats.org/presentationml/2006/main">
+  <p:cSld>
+    <p:spTree>
+      <p:nvGrpSpPr>
+        <p:cNvPr id="1" name=""/>
+        <p:cNvGrpSpPr/>
+        <p:nvPr/>
+      </p:nvGrpSpPr>
+      <p:grpSpPr>
+        <a:xfrm>
+          <a:off x="0" y="0"/>
+          <a:ext cx="0" cy="0"/>
+          <a:chOff x="0" y="0"/>
+          <a:chExt cx="0" cy="0"/>
+        </a:xfrm>
+      </p:grpSpPr>
+      <p:sp>
+        <p:nvSpPr>
+          <p:cNvPr id="8" name="TextBox 7">
+            <a:extLst>
+              <a:ext uri="{FF2B5EF4-FFF2-40B4-BE49-F238E27FC236}">
+                <a16:creationId xmlns:a16="http://schemas.microsoft.com/office/drawing/2014/main" id="{1C8C6BB4-B8E2-963D-AF48-BCC09660AE4C}"/>
+              </a:ext>
+            </a:extLst>
+          </p:cNvPr>
+          <p:cNvSpPr txBox="1"/>
+          <p:nvPr/>
+        </p:nvSpPr>
+        <p:spPr>
+          <a:xfrm>
+            <a:off x="716692" y="630195"/>
+            <a:ext cx="10997513" cy="3416320"/>
+          </a:xfrm>
+          <a:prstGeom prst="rect">
+            <a:avLst/>
+          </a:prstGeom>
+          <a:noFill/>
+        </p:spPr>
+        <p:txBody>
+          <a:bodyPr wrap="square" rtlCol="0">
+            <a:spAutoFit/>
+          </a:bodyPr>
+          <a:lstStyle/>
+          <a:p>
+            <a:r>
+              <a:rPr lang="en-US" dirty="0"/>
+              <a:t>Table of Content:</a:t>
+            </a:r>
+          </a:p>
+          <a:p>
+            <a:endParaRPr lang="en-US" dirty="0"/>
+          </a:p>
+          <a:p>
+            <a:pPr marL="342900" indent="-342900">
+              <a:buAutoNum type="arabicPeriod"/>
+            </a:pPr>
+            <a:r>
+              <a:rPr lang="en-US" dirty="0">
+                <a:hlinkClick r:id="rId2" action="ppaction://hlinksldjump"/>
+              </a:rPr>
+              <a:t>Overview</a:t>
+            </a:r>
+            <a:endParaRPr lang="en-US" dirty="0"/>
+          </a:p>
+          <a:p>
+            <a:pPr marL="342900" indent="-342900">
+              <a:buAutoNum type="arabicPeriod"/>
+            </a:pPr>
+            <a:r>
+              <a:rPr lang="en-US" dirty="0">
+                <a:hlinkClick r:id="rId3" action="ppaction://hlinksldjump"/>
+              </a:rPr>
+              <a:t>Hypothesis</a:t>
+            </a:r>
+            <a:endParaRPr lang="en-US" dirty="0"/>
+          </a:p>
+          <a:p>
+            <a:pPr marL="342900" indent="-342900">
+              <a:buAutoNum type="arabicPeriod"/>
+            </a:pPr>
+            <a:r>
+              <a:rPr lang="en-US" dirty="0">
+                <a:hlinkClick r:id="rId4" action="ppaction://hlinksldjump"/>
+              </a:rPr>
+              <a:t>Method</a:t>
+            </a:r>
+            <a:endParaRPr lang="en-US" dirty="0"/>
+          </a:p>
+          <a:p>
+            <a:pPr marL="342900" indent="-342900">
+              <a:buAutoNum type="arabicPeriod"/>
+            </a:pPr>
+            <a:r>
+              <a:rPr lang="en-US" dirty="0">
+                <a:hlinkClick r:id="rId5" action="ppaction://hlinksldjump"/>
+              </a:rPr>
+              <a:t>Median Household Income</a:t>
+            </a:r>
+            <a:endParaRPr lang="en-US" dirty="0"/>
+          </a:p>
+          <a:p>
+            <a:pPr marL="342900" indent="-342900">
+              <a:buAutoNum type="arabicPeriod"/>
+            </a:pPr>
+            <a:r>
+              <a:rPr lang="en-US" dirty="0">
+                <a:hlinkClick r:id="rId6" action="ppaction://hlinksldjump"/>
+              </a:rPr>
+              <a:t>Children in Foster Care</a:t>
+            </a:r>
+            <a:endParaRPr lang="en-US" dirty="0"/>
+          </a:p>
+          <a:p>
+            <a:pPr marL="342900" indent="-342900">
+              <a:buAutoNum type="arabicPeriod"/>
+            </a:pPr>
+            <a:r>
+              <a:rPr lang="en-US" dirty="0">
+                <a:hlinkClick r:id="rId7" action="ppaction://hlinksldjump"/>
+              </a:rPr>
+              <a:t>Dropouts</a:t>
+            </a:r>
+            <a:endParaRPr lang="en-US" dirty="0"/>
+          </a:p>
+          <a:p>
+            <a:pPr marL="342900" indent="-342900">
+              <a:buAutoNum type="arabicPeriod"/>
+            </a:pPr>
+            <a:r>
+              <a:rPr lang="en-US" dirty="0">
+                <a:hlinkClick r:id="rId8" action="ppaction://hlinksldjump"/>
+              </a:rPr>
+              <a:t>Analysis</a:t>
+            </a:r>
+            <a:endParaRPr lang="en-US" dirty="0"/>
+          </a:p>
+          <a:p>
+            <a:pPr marL="342900" indent="-342900">
+              <a:buAutoNum type="arabicPeriod"/>
+            </a:pPr>
+            <a:r>
+              <a:rPr lang="en-US" dirty="0">
+                <a:hlinkClick r:id="rId9" action="ppaction://hlinksldjump"/>
+              </a:rPr>
+              <a:t>Conclusion</a:t>
+            </a:r>
+            <a:endParaRPr lang="en-US" dirty="0"/>
+          </a:p>
+          <a:p>
+            <a:pPr marL="342900" indent="-342900">
+              <a:buAutoNum type="arabicPeriod"/>
+            </a:pPr>
+            <a:r>
+              <a:rPr lang="en-US" dirty="0">
+                <a:hlinkClick r:id="rId10" action="ppaction://hlinksldjump"/>
+              </a:rPr>
+              <a:t>Sources</a:t>
+            </a:r>
+            <a:endParaRPr lang="en-US" dirty="0"/>
+          </a:p>
+          <a:p>
+            <a:pPr marL="342900" indent="-342900">
+              <a:buAutoNum type="arabicPeriod"/>
+            </a:pPr>
+            <a:endParaRPr lang="en-US" dirty="0"/>
+          </a:p>
+        </p:txBody>
+      </p:sp>
+    </p:spTree>
+    <p:extLst>
+      <p:ext uri="{BB962C8B-B14F-4D97-AF65-F5344CB8AC3E}">
+        <p14:creationId xmlns:p14="http://schemas.microsoft.com/office/powerpoint/2010/main" val="101181284"/>
+      </p:ext>
+    </p:extLst>
+  </p:cSld>
+  <p:clrMapOvr>
+    <a:masterClrMapping/>
+  </p:clrMapOvr>
+</p:sld>
+</file>
+
+<file path=ppt/slides/slide3.xml><?xml version="1.0" encoding="utf-8"?>
+<p:sld xmlns:a="http://schemas.openxmlformats.org/drawingml/2006/main" xmlns:r="http://schemas.openxmlformats.org/officeDocument/2006/relationships" xmlns:p="http://schemas.openxmlformats.org/presentationml/2006/main">
+  <p:cSld>
+    <p:spTree>
+      <p:nvGrpSpPr>
+        <p:cNvPr id="1" name=""/>
+        <p:cNvGrpSpPr/>
+        <p:nvPr/>
+      </p:nvGrpSpPr>
+      <p:grpSpPr>
+        <a:xfrm>
+          <a:off x="0" y="0"/>
+          <a:ext cx="0" cy="0"/>
+          <a:chOff x="0" y="0"/>
+          <a:chExt cx="0" cy="0"/>
+        </a:xfrm>
+      </p:grpSpPr>
+      <p:sp>
+        <p:nvSpPr>
+          <p:cNvPr id="2" name="Title 1">
+            <a:extLst>
+              <a:ext uri="{FF2B5EF4-FFF2-40B4-BE49-F238E27FC236}">
+                <a16:creationId xmlns:a16="http://schemas.microsoft.com/office/drawing/2014/main" id="{C04D3C63-6DEF-5EBD-DBE3-7DDBBC809D54}"/>
+              </a:ext>
+            </a:extLst>
+          </p:cNvPr>
+          <p:cNvSpPr>
+            <a:spLocks noGrp="1"/>
+          </p:cNvSpPr>
+          <p:nvPr>
+            <p:ph type="title"/>
+          </p:nvPr>
+        </p:nvSpPr>
+        <p:spPr>
+          <a:xfrm>
+            <a:off x="758952" y="758952"/>
+            <a:ext cx="10671048" cy="983138"/>
+          </a:xfrm>
+        </p:spPr>
+        <p:txBody>
+          <a:bodyPr/>
+          <a:lstStyle/>
+          <a:p>
+            <a:r>
+              <a:rPr lang="en-US" dirty="0"/>
+              <a:t>A story about a boy…</a:t>
+            </a:r>
+          </a:p>
+        </p:txBody>
+      </p:sp>
+      <p:sp>
+        <p:nvSpPr>
+          <p:cNvPr id="3" name="Content Placeholder 2">
+            <a:extLst>
+              <a:ext uri="{FF2B5EF4-FFF2-40B4-BE49-F238E27FC236}">
+                <a16:creationId xmlns:a16="http://schemas.microsoft.com/office/drawing/2014/main" id="{D93625C8-830F-C8F0-F19E-5054C905A9DB}"/>
+              </a:ext>
+            </a:extLst>
+          </p:cNvPr>
+          <p:cNvSpPr>
+            <a:spLocks noGrp="1"/>
+          </p:cNvSpPr>
+          <p:nvPr>
+            <p:ph idx="1"/>
+          </p:nvPr>
+        </p:nvSpPr>
+        <p:spPr>
+          <a:xfrm>
+            <a:off x="758952" y="2159876"/>
+            <a:ext cx="10671048" cy="3353955"/>
+          </a:xfrm>
+        </p:spPr>
+        <p:txBody>
+          <a:bodyPr/>
+          <a:lstStyle/>
+          <a:p>
+            <a:r>
+              <a:rPr lang="en-US" dirty="0"/>
+              <a:t>Clayton Graves aged out of the foster care system in 1991. </a:t>
+            </a:r>
+          </a:p>
+          <a:p>
+            <a:r>
+              <a:rPr lang="en-US" dirty="0"/>
+              <a:t>During his early years, Clayton was a bright student who was inquisitive and engaging. </a:t>
+            </a:r>
+          </a:p>
+          <a:p>
+            <a:r>
+              <a:rPr lang="en-US" dirty="0"/>
+              <a:t>Starting his first year of high school, Clayton quickly fell behind the rest of his class. </a:t>
+            </a:r>
+          </a:p>
+          <a:p>
+            <a:r>
+              <a:rPr lang="en-US" dirty="0"/>
+              <a:t>Moving from home to home made it difficult for him to keep up with his peers as he changed schools. </a:t>
+            </a:r>
+          </a:p>
+          <a:p>
+            <a:r>
+              <a:rPr lang="en-US" dirty="0"/>
+              <a:t>By the time he turned he turned 18, Clayton was homeless and had dropped out of high school. He would remain homeless for the next 10 years. </a:t>
+            </a:r>
+          </a:p>
+        </p:txBody>
+      </p:sp>
+    </p:spTree>
+    <p:extLst>
+      <p:ext uri="{BB962C8B-B14F-4D97-AF65-F5344CB8AC3E}">
+        <p14:creationId xmlns:p14="http://schemas.microsoft.com/office/powerpoint/2010/main" val="459855756"/>
+      </p:ext>
+    </p:extLst>
+  </p:cSld>
+  <p:clrMapOvr>
+    <a:masterClrMapping/>
+  </p:clrMapOvr>
+</p:sld>
+</file>
+
+<file path=ppt/slides/slide4.xml><?xml version="1.0" encoding="utf-8"?>
+<p:sld xmlns:a="http://schemas.openxmlformats.org/drawingml/2006/main" xmlns:r="http://schemas.openxmlformats.org/officeDocument/2006/relationships" xmlns:p="http://schemas.openxmlformats.org/presentationml/2006/main">
+  <p:cSld>
+    <p:spTree>
+      <p:nvGrpSpPr>
+        <p:cNvPr id="1" name=""/>
+        <p:cNvGrpSpPr/>
+        <p:nvPr/>
+      </p:nvGrpSpPr>
+      <p:grpSpPr>
+        <a:xfrm>
+          <a:off x="0" y="0"/>
+          <a:ext cx="0" cy="0"/>
+          <a:chOff x="0" y="0"/>
+          <a:chExt cx="0" cy="0"/>
+        </a:xfrm>
+      </p:grpSpPr>
+      <p:sp>
+        <p:nvSpPr>
+          <p:cNvPr id="2" name="Title 1">
+            <a:extLst>
+              <a:ext uri="{FF2B5EF4-FFF2-40B4-BE49-F238E27FC236}">
+                <a16:creationId xmlns:a16="http://schemas.microsoft.com/office/drawing/2014/main" id="{D36E70D3-E641-1515-82CA-8247C136CB67}"/>
+              </a:ext>
+            </a:extLst>
+          </p:cNvPr>
+          <p:cNvSpPr>
+            <a:spLocks noGrp="1"/>
+          </p:cNvSpPr>
+          <p:nvPr>
+            <p:ph type="title"/>
+          </p:nvPr>
+        </p:nvSpPr>
+        <p:spPr/>
+        <p:txBody>
+          <a:bodyPr>
+            <a:noAutofit/>
+          </a:bodyPr>
+          <a:lstStyle/>
+          <a:p>
+            <a:r>
+              <a:rPr lang="en-US" sz="2800" dirty="0"/>
+              <a:t>“In Colorado, only one in four students who experience foster care during high school graduate with their class.”</a:t>
+            </a:r>
+            <a:br>
+              <a:rPr lang="en-US" sz="2800" dirty="0"/>
+            </a:br>
+            <a:br>
+              <a:rPr lang="en-US" sz="2800" dirty="0"/>
+            </a:br>
+            <a:r>
+              <a:rPr lang="en-US" sz="2800" dirty="0"/>
+              <a:t>-Colorado Department of Human Services</a:t>
+            </a:r>
+          </a:p>
+        </p:txBody>
+      </p:sp>
+      <p:sp>
+        <p:nvSpPr>
+          <p:cNvPr id="3" name="Content Placeholder 2">
+            <a:extLst>
+              <a:ext uri="{FF2B5EF4-FFF2-40B4-BE49-F238E27FC236}">
+                <a16:creationId xmlns:a16="http://schemas.microsoft.com/office/drawing/2014/main" id="{42699A2A-9F5D-A3BC-ED26-28E5E8F2118E}"/>
+              </a:ext>
+            </a:extLst>
+          </p:cNvPr>
+          <p:cNvSpPr>
+            <a:spLocks noGrp="1"/>
+          </p:cNvSpPr>
+          <p:nvPr>
+            <p:ph idx="1"/>
+          </p:nvPr>
+        </p:nvSpPr>
+        <p:spPr/>
+        <p:txBody>
+          <a:bodyPr/>
+          <a:lstStyle/>
+          <a:p>
+            <a:r>
+              <a:rPr lang="en-US" dirty="0"/>
+              <a:t>It is no secret that foster kids struggle in school.</a:t>
+            </a:r>
+          </a:p>
+          <a:p>
+            <a:pPr marL="0" indent="0">
+              <a:buNone/>
+            </a:pPr>
+            <a:endParaRPr lang="en-US" dirty="0"/>
+          </a:p>
+          <a:p>
+            <a:r>
+              <a:rPr lang="en-US" dirty="0"/>
+              <a:t>In an annual report to the Colorado Legislature, students in out-of-home placement noted significantly higher truancy rates than students in more conventional households. </a:t>
+            </a:r>
+          </a:p>
+          <a:p>
+            <a:pPr marL="0" indent="0">
+              <a:buNone/>
+            </a:pPr>
+            <a:endParaRPr lang="en-US" dirty="0"/>
+          </a:p>
+          <a:p>
+            <a:r>
+              <a:rPr lang="en-US" dirty="0"/>
+              <a:t>We decided to take a look at the problem from a national perspective in order to determine how wide-spread the problem is. </a:t>
+            </a:r>
+          </a:p>
+        </p:txBody>
+      </p:sp>
+    </p:spTree>
+    <p:extLst>
+      <p:ext uri="{BB962C8B-B14F-4D97-AF65-F5344CB8AC3E}">
+        <p14:creationId xmlns:p14="http://schemas.microsoft.com/office/powerpoint/2010/main" val="3291610367"/>
+      </p:ext>
+    </p:extLst>
+  </p:cSld>
+  <p:clrMapOvr>
+    <a:masterClrMapping/>
+  </p:clrMapOvr>
+</p:sld>
+</file>
+
+<file path=ppt/slides/slide5.xml><?xml version="1.0" encoding="utf-8"?>
+<p:sld xmlns:a="http://schemas.openxmlformats.org/drawingml/2006/main" xmlns:r="http://schemas.openxmlformats.org/officeDocument/2006/relationships" xmlns:p="http://schemas.openxmlformats.org/presentationml/2006/main">
+  <p:cSld>
+    <p:spTree>
+      <p:nvGrpSpPr>
+        <p:cNvPr id="1" name=""/>
+        <p:cNvGrpSpPr/>
+        <p:nvPr/>
+      </p:nvGrpSpPr>
+      <p:grpSpPr>
+        <a:xfrm>
+          <a:off x="0" y="0"/>
+          <a:ext cx="0" cy="0"/>
+          <a:chOff x="0" y="0"/>
+          <a:chExt cx="0" cy="0"/>
+        </a:xfrm>
+      </p:grpSpPr>
+      <p:sp>
+        <p:nvSpPr>
+          <p:cNvPr id="2" name="Title 1">
+            <a:extLst>
+              <a:ext uri="{FF2B5EF4-FFF2-40B4-BE49-F238E27FC236}">
+                <a16:creationId xmlns:a16="http://schemas.microsoft.com/office/drawing/2014/main" id="{48BBF077-D08B-9768-51AF-26A60C35BB5E}"/>
+              </a:ext>
+            </a:extLst>
+          </p:cNvPr>
+          <p:cNvSpPr>
+            <a:spLocks noGrp="1"/>
+          </p:cNvSpPr>
+          <p:nvPr>
+            <p:ph type="title"/>
+          </p:nvPr>
+        </p:nvSpPr>
+        <p:spPr>
+          <a:xfrm>
+            <a:off x="758952" y="758952"/>
+            <a:ext cx="10946945" cy="786069"/>
+          </a:xfrm>
+        </p:spPr>
+        <p:txBody>
+          <a:bodyPr>
+            <a:normAutofit fontScale="90000"/>
+          </a:bodyPr>
+          <a:lstStyle/>
+          <a:p>
+            <a:r>
+              <a:rPr lang="en-US" dirty="0"/>
+              <a:t>Hypothesis</a:t>
+            </a:r>
+          </a:p>
+        </p:txBody>
+      </p:sp>
+      <p:sp>
+        <p:nvSpPr>
+          <p:cNvPr id="3" name="Content Placeholder 2">
+            <a:extLst>
+              <a:ext uri="{FF2B5EF4-FFF2-40B4-BE49-F238E27FC236}">
+                <a16:creationId xmlns:a16="http://schemas.microsoft.com/office/drawing/2014/main" id="{DA5702B5-3424-000B-7452-F4E3A91461B7}"/>
+              </a:ext>
+            </a:extLst>
+          </p:cNvPr>
+          <p:cNvSpPr>
+            <a:spLocks noGrp="1"/>
+          </p:cNvSpPr>
+          <p:nvPr>
+            <p:ph idx="1"/>
+          </p:nvPr>
+        </p:nvSpPr>
+        <p:spPr>
+          <a:xfrm>
+            <a:off x="758952" y="1726324"/>
+            <a:ext cx="10946944" cy="4372724"/>
+          </a:xfrm>
+        </p:spPr>
+        <p:txBody>
+          <a:bodyPr/>
+          <a:lstStyle/>
+          <a:p>
+            <a:r>
+              <a:rPr lang="en-US" sz="2800" dirty="0"/>
+              <a:t>Based on Clayton’s experience, we believe that there is a direct correlation between poverty level, number of children in foster care, and the number of high school dropouts. </a:t>
+            </a:r>
+          </a:p>
+          <a:p>
+            <a:pPr marL="0" indent="0">
+              <a:buNone/>
+            </a:pPr>
+            <a:endParaRPr lang="en-US" sz="2800" dirty="0"/>
+          </a:p>
+          <a:p>
+            <a:r>
+              <a:rPr lang="en-US" sz="2800" dirty="0"/>
+              <a:t>The lower the median household income, the higher the number of children in foster care and thus the higher the number of children who do not finish high school </a:t>
+            </a:r>
+          </a:p>
+        </p:txBody>
+      </p:sp>
+    </p:spTree>
+    <p:extLst>
+      <p:ext uri="{BB962C8B-B14F-4D97-AF65-F5344CB8AC3E}">
+        <p14:creationId xmlns:p14="http://schemas.microsoft.com/office/powerpoint/2010/main" val="126401352"/>
+      </p:ext>
+    </p:extLst>
+  </p:cSld>
+  <p:clrMapOvr>
+    <a:masterClrMapping/>
+  </p:clrMapOvr>
+</p:sld>
+</file>
+
+<file path=ppt/slides/slide6.xml><?xml version="1.0" encoding="utf-8"?>
+<p:sld xmlns:a="http://schemas.openxmlformats.org/drawingml/2006/main" xmlns:r="http://schemas.openxmlformats.org/officeDocument/2006/relationships" xmlns:p="http://schemas.openxmlformats.org/presentationml/2006/main">
+  <p:cSld>
+    <p:spTree>
+      <p:nvGrpSpPr>
+        <p:cNvPr id="1" name=""/>
+        <p:cNvGrpSpPr/>
+        <p:nvPr/>
+      </p:nvGrpSpPr>
+      <p:grpSpPr>
+        <a:xfrm>
+          <a:off x="0" y="0"/>
+          <a:ext cx="0" cy="0"/>
+          <a:chOff x="0" y="0"/>
+          <a:chExt cx="0" cy="0"/>
+        </a:xfrm>
+      </p:grpSpPr>
+      <p:sp>
+        <p:nvSpPr>
+          <p:cNvPr id="2" name="Title 1">
+            <a:extLst>
+              <a:ext uri="{FF2B5EF4-FFF2-40B4-BE49-F238E27FC236}">
+                <a16:creationId xmlns:a16="http://schemas.microsoft.com/office/drawing/2014/main" id="{48BBF077-D08B-9768-51AF-26A60C35BB5E}"/>
+              </a:ext>
+            </a:extLst>
+          </p:cNvPr>
+          <p:cNvSpPr>
+            <a:spLocks noGrp="1"/>
+          </p:cNvSpPr>
+          <p:nvPr>
+            <p:ph type="title"/>
+          </p:nvPr>
+        </p:nvSpPr>
+        <p:spPr>
+          <a:xfrm>
+            <a:off x="758952" y="758952"/>
+            <a:ext cx="10946945" cy="786069"/>
+          </a:xfrm>
+        </p:spPr>
+        <p:txBody>
+          <a:bodyPr>
+            <a:normAutofit fontScale="90000"/>
+          </a:bodyPr>
+          <a:lstStyle/>
+          <a:p>
+            <a:r>
+              <a:rPr lang="en-US" dirty="0"/>
+              <a:t>Method</a:t>
+            </a:r>
+          </a:p>
+        </p:txBody>
+      </p:sp>
+      <p:sp>
+        <p:nvSpPr>
+          <p:cNvPr id="3" name="Content Placeholder 2">
+            <a:extLst>
+              <a:ext uri="{FF2B5EF4-FFF2-40B4-BE49-F238E27FC236}">
+                <a16:creationId xmlns:a16="http://schemas.microsoft.com/office/drawing/2014/main" id="{DA5702B5-3424-000B-7452-F4E3A91461B7}"/>
+              </a:ext>
+            </a:extLst>
+          </p:cNvPr>
+          <p:cNvSpPr>
+            <a:spLocks noGrp="1"/>
+          </p:cNvSpPr>
+          <p:nvPr>
+            <p:ph idx="1"/>
+          </p:nvPr>
+        </p:nvSpPr>
+        <p:spPr>
+          <a:xfrm>
+            <a:off x="758952" y="1726324"/>
+            <a:ext cx="10946944" cy="4372724"/>
+          </a:xfrm>
+        </p:spPr>
+        <p:txBody>
+          <a:bodyPr/>
+          <a:lstStyle/>
+          <a:p>
+            <a:r>
+              <a:rPr lang="en-US" dirty="0"/>
+              <a:t> In order to properly test our hypothesis, we needed to gather 3 data sets on a national level:</a:t>
+            </a:r>
+          </a:p>
+          <a:p>
+            <a:pPr marL="697230" lvl="1" indent="-514350">
+              <a:buFont typeface="+mj-lt"/>
+              <a:buAutoNum type="arabicPeriod"/>
+            </a:pPr>
+            <a:r>
+              <a:rPr lang="en-US" dirty="0"/>
+              <a:t>Median household income by state</a:t>
+            </a:r>
+          </a:p>
+          <a:p>
+            <a:pPr marL="697230" lvl="1" indent="-514350">
+              <a:buFont typeface="+mj-lt"/>
+              <a:buAutoNum type="arabicPeriod"/>
+            </a:pPr>
+            <a:r>
+              <a:rPr lang="en-US" dirty="0"/>
+              <a:t>Number of children in foster care by state</a:t>
+            </a:r>
+          </a:p>
+          <a:p>
+            <a:pPr marL="697230" lvl="1" indent="-514350">
+              <a:buFont typeface="+mj-lt"/>
+              <a:buAutoNum type="arabicPeriod"/>
+            </a:pPr>
+            <a:r>
+              <a:rPr lang="en-US" dirty="0"/>
+              <a:t>Number of foster children who successfully graduated high school and/or completed post secondary degrees</a:t>
+            </a:r>
+          </a:p>
+          <a:p>
+            <a:r>
+              <a:rPr lang="en-US" sz="2000" i="0" dirty="0"/>
+              <a:t>We were unable to find the third dataset and had to substitute in a different dataset</a:t>
+            </a:r>
+          </a:p>
+          <a:p>
+            <a:r>
+              <a:rPr lang="en-US" dirty="0"/>
+              <a:t>T</a:t>
+            </a:r>
+            <a:r>
+              <a:rPr lang="en-US" sz="2000" i="0" dirty="0"/>
+              <a:t>he number of high school drop-outs was available by state and could still potentially show a correlation. We will explore this more in later slides. </a:t>
+            </a:r>
+          </a:p>
+          <a:p>
+            <a:pPr marL="0" indent="0">
+              <a:buNone/>
+            </a:pPr>
+            <a:endParaRPr lang="en-US" dirty="0"/>
+          </a:p>
+          <a:p>
+            <a:endParaRPr lang="en-US" dirty="0"/>
+          </a:p>
+        </p:txBody>
+      </p:sp>
+    </p:spTree>
+    <p:extLst>
+      <p:ext uri="{BB962C8B-B14F-4D97-AF65-F5344CB8AC3E}">
+        <p14:creationId xmlns:p14="http://schemas.microsoft.com/office/powerpoint/2010/main" val="1421390050"/>
       </p:ext>
     </p:extLst>
   </p:cSld>
@@ -7590,7 +7940,7 @@
       </p:grpSpPr>
       <p:sp useBgFill="1">
         <p:nvSpPr>
-          <p:cNvPr id="11" name="Rectangle 10">
+          <p:cNvPr id="19" name="Rectangle 18">
             <a:extLst>
               <a:ext uri="{FF2B5EF4-FFF2-40B4-BE49-F238E27FC236}">
                 <a16:creationId xmlns:a16="http://schemas.microsoft.com/office/drawing/2014/main" id="{C5176844-69C3-4F79-BE38-EA5BDDF4FEA4}"/>
@@ -7677,15 +8027,15 @@
           <a:lstStyle/>
           <a:p>
             <a:r>
-              <a:rPr lang="en-US" sz="5100" dirty="0"/>
-              <a:t>Children In Foster Care</a:t>
+              <a:rPr lang="en-US" sz="5100"/>
+              <a:t>Median Household Income</a:t>
             </a:r>
           </a:p>
         </p:txBody>
       </p:sp>
       <p:cxnSp>
         <p:nvCxnSpPr>
-          <p:cNvPr id="13" name="Straight Connector 12">
+          <p:cNvPr id="21" name="Straight Connector 20">
             <a:extLst>
               <a:ext uri="{FF2B5EF4-FFF2-40B4-BE49-F238E27FC236}">
                 <a16:creationId xmlns:a16="http://schemas.microsoft.com/office/drawing/2014/main" id="{33862825-C012-4895-A17E-F3D1F62D89DD}"/>
@@ -7762,7 +8112,7 @@
         </p:spPr>
         <p:txBody>
           <a:bodyPr>
-            <a:normAutofit fontScale="92500"/>
+            <a:normAutofit/>
           </a:bodyPr>
           <a:lstStyle/>
           <a:p>
@@ -7780,13 +8130,7 @@
           <a:p>
             <a:r>
               <a:rPr lang="en-US" dirty="0"/>
-              <a:t>Overall numbers showed a sharp drop, followed by an increase in 2016.</a:t>
-            </a:r>
-          </a:p>
-          <a:p>
-            <a:r>
-              <a:rPr lang="en-US" dirty="0"/>
-              <a:t>The over all trend is expected to continue to decrease and is already at its lowest level in our recorded data.</a:t>
+              <a:t>Despite the impact of the 2008 housing crises, initial graph data showed a steady increase in household income from 2005 to 2021</a:t>
             </a:r>
           </a:p>
           <a:p>
@@ -7795,11 +8139,14 @@
           <a:p>
             <a:endParaRPr lang="en-US" dirty="0"/>
           </a:p>
-        </p:txBody>
-      </p:sp>
-      <p:sp>
-        <p:nvSpPr>
-          <p:cNvPr id="15" name="Freeform: Shape 14">
+          <a:p>
+            <a:endParaRPr lang="en-US" dirty="0"/>
+          </a:p>
+        </p:txBody>
+      </p:sp>
+      <p:sp>
+        <p:nvSpPr>
+          <p:cNvPr id="23" name="Freeform: Shape 22">
             <a:extLst>
               <a:ext uri="{FF2B5EF4-FFF2-40B4-BE49-F238E27FC236}">
                 <a16:creationId xmlns:a16="http://schemas.microsoft.com/office/drawing/2014/main" id="{F76C355F-28BE-46B1-9B8D-5D71A48155D3}"/>
@@ -7935,7 +8282,7 @@
       </p:sp>
       <p:sp>
         <p:nvSpPr>
-          <p:cNvPr id="17" name="Freeform 6">
+          <p:cNvPr id="25" name="Freeform 6">
             <a:extLst>
               <a:ext uri="{FF2B5EF4-FFF2-40B4-BE49-F238E27FC236}">
                 <a16:creationId xmlns:a16="http://schemas.microsoft.com/office/drawing/2014/main" id="{A101E513-AF74-4E9D-A31F-99664250722D}"/>
@@ -8159,10 +8506,10 @@
       </p:sp>
       <p:pic>
         <p:nvPicPr>
-          <p:cNvPr id="8" name="Picture 7" descr="A graph with a line graph">
-            <a:extLst>
-              <a:ext uri="{FF2B5EF4-FFF2-40B4-BE49-F238E27FC236}">
-                <a16:creationId xmlns:a16="http://schemas.microsoft.com/office/drawing/2014/main" id="{B0209A66-2EF9-2C46-4750-071644C63D70}"/>
+          <p:cNvPr id="7" name="Picture 6" descr="A graph with a line graph&#10;&#10;Description automatically generated with medium confidence">
+            <a:extLst>
+              <a:ext uri="{FF2B5EF4-FFF2-40B4-BE49-F238E27FC236}">
+                <a16:creationId xmlns:a16="http://schemas.microsoft.com/office/drawing/2014/main" id="{7BD2D744-C4B7-055B-8644-2D51A753D1F6}"/>
               </a:ext>
             </a:extLst>
           </p:cNvPr>
@@ -8185,8 +8532,8 @@
         </p:blipFill>
         <p:spPr>
           <a:xfrm>
-            <a:off x="7343411" y="2308982"/>
-            <a:ext cx="4752510" cy="2809937"/>
+            <a:off x="7449248" y="2065116"/>
+            <a:ext cx="4468774" cy="3463162"/>
           </a:xfrm>
           <a:prstGeom prst="rect">
             <a:avLst/>
@@ -8196,7 +8543,7 @@
     </p:spTree>
     <p:extLst>
       <p:ext uri="{BB962C8B-B14F-4D97-AF65-F5344CB8AC3E}">
-        <p14:creationId xmlns:p14="http://schemas.microsoft.com/office/powerpoint/2010/main" val="3577679760"/>
+        <p14:creationId xmlns:p14="http://schemas.microsoft.com/office/powerpoint/2010/main" val="4014408675"/>
       </p:ext>
     </p:extLst>
   </p:cSld>
@@ -8233,7 +8580,7 @@
       </p:grpSpPr>
       <p:sp useBgFill="1">
         <p:nvSpPr>
-          <p:cNvPr id="10" name="Rectangle 9">
+          <p:cNvPr id="11" name="Rectangle 10">
             <a:extLst>
               <a:ext uri="{FF2B5EF4-FFF2-40B4-BE49-F238E27FC236}">
                 <a16:creationId xmlns:a16="http://schemas.microsoft.com/office/drawing/2014/main" id="{C5176844-69C3-4F79-BE38-EA5BDDF4FEA4}"/>
@@ -8328,7 +8675,7 @@
       </p:sp>
       <p:cxnSp>
         <p:nvCxnSpPr>
-          <p:cNvPr id="12" name="Straight Connector 11">
+          <p:cNvPr id="13" name="Straight Connector 12">
             <a:extLst>
               <a:ext uri="{FF2B5EF4-FFF2-40B4-BE49-F238E27FC236}">
                 <a16:creationId xmlns:a16="http://schemas.microsoft.com/office/drawing/2014/main" id="{33862825-C012-4895-A17E-F3D1F62D89DD}"/>
@@ -8405,38 +8752,44 @@
         </p:spPr>
         <p:txBody>
           <a:bodyPr>
-            <a:normAutofit/>
+            <a:normAutofit fontScale="92500"/>
           </a:bodyPr>
           <a:lstStyle/>
           <a:p>
             <a:r>
-              <a:rPr lang="en-US" sz="1900" dirty="0"/>
+              <a:rPr lang="en-US" dirty="0"/>
               <a:t>We pulled the data from datacenter.aef.org.</a:t>
             </a:r>
           </a:p>
           <a:p>
             <a:r>
-              <a:rPr lang="en-US" sz="1900" dirty="0"/>
+              <a:rPr lang="en-US" dirty="0"/>
               <a:t>Data was presented by state and year. </a:t>
             </a:r>
           </a:p>
           <a:p>
             <a:r>
-              <a:rPr lang="en-US" sz="1900" dirty="0"/>
-              <a:t>Overall, the number of dropouts has decreases significantly between 2004 and 2020 and is predicted to continue this downward trend. </a:t>
-            </a:r>
-          </a:p>
-          <a:p>
-            <a:endParaRPr lang="en-US" sz="1900" dirty="0"/>
-          </a:p>
-          <a:p>
-            <a:endParaRPr lang="en-US" sz="1900" dirty="0"/>
-          </a:p>
-        </p:txBody>
-      </p:sp>
-      <p:sp>
-        <p:nvSpPr>
-          <p:cNvPr id="14" name="Freeform: Shape 13">
+              <a:rPr lang="en-US" dirty="0"/>
+              <a:t>Overall numbers showed a sharp drop, followed by an increase in 2016.</a:t>
+            </a:r>
+          </a:p>
+          <a:p>
+            <a:r>
+              <a:rPr lang="en-US" dirty="0"/>
+              <a:t>The over all trend is expected to continue to decrease and is already at its lowest level in our recorded data.</a:t>
+            </a:r>
+          </a:p>
+          <a:p>
+            <a:endParaRPr lang="en-US" dirty="0"/>
+          </a:p>
+          <a:p>
+            <a:endParaRPr lang="en-US" dirty="0"/>
+          </a:p>
+        </p:txBody>
+      </p:sp>
+      <p:sp>
+        <p:nvSpPr>
+          <p:cNvPr id="15" name="Freeform: Shape 14">
             <a:extLst>
               <a:ext uri="{FF2B5EF4-FFF2-40B4-BE49-F238E27FC236}">
                 <a16:creationId xmlns:a16="http://schemas.microsoft.com/office/drawing/2014/main" id="{F76C355F-28BE-46B1-9B8D-5D71A48155D3}"/>
@@ -8570,45 +8923,9 @@
           </a:p>
         </p:txBody>
       </p:sp>
-      <p:pic>
-        <p:nvPicPr>
-          <p:cNvPr id="5" name="Picture 4" descr="A graph with a line graph&#10;&#10;Description automatically generated with medium confidence">
-            <a:extLst>
-              <a:ext uri="{FF2B5EF4-FFF2-40B4-BE49-F238E27FC236}">
-                <a16:creationId xmlns:a16="http://schemas.microsoft.com/office/drawing/2014/main" id="{C48D21E1-3383-36A5-CF05-F05116A9D3BC}"/>
-              </a:ext>
-            </a:extLst>
-          </p:cNvPr>
-          <p:cNvPicPr>
-            <a:picLocks noChangeAspect="1"/>
-          </p:cNvPicPr>
-          <p:nvPr/>
-        </p:nvPicPr>
-        <p:blipFill>
-          <a:blip r:embed="rId2">
-            <a:extLst>
-              <a:ext uri="{28A0092B-C50C-407E-A947-70E740481C1C}">
-                <a14:useLocalDpi xmlns:a14="http://schemas.microsoft.com/office/drawing/2010/main" val="0"/>
-              </a:ext>
-            </a:extLst>
-          </a:blip>
-          <a:stretch>
-            <a:fillRect/>
-          </a:stretch>
-        </p:blipFill>
-        <p:spPr>
-          <a:xfrm>
-            <a:off x="7212039" y="2363763"/>
-            <a:ext cx="4824017" cy="2858229"/>
-          </a:xfrm>
-          <a:prstGeom prst="rect">
-            <a:avLst/>
-          </a:prstGeom>
-        </p:spPr>
-      </p:pic>
-      <p:sp>
-        <p:nvSpPr>
-          <p:cNvPr id="16" name="Freeform 6">
+      <p:sp>
+        <p:nvSpPr>
+          <p:cNvPr id="17" name="Freeform 6">
             <a:extLst>
               <a:ext uri="{FF2B5EF4-FFF2-40B4-BE49-F238E27FC236}">
                 <a16:creationId xmlns:a16="http://schemas.microsoft.com/office/drawing/2014/main" id="{A101E513-AF74-4E9D-A31F-99664250722D}"/>
@@ -8830,10 +9147,46 @@
           </a:p>
         </p:txBody>
       </p:sp>
+      <p:pic>
+        <p:nvPicPr>
+          <p:cNvPr id="8" name="Picture 7" descr="A graph with a line graph">
+            <a:extLst>
+              <a:ext uri="{FF2B5EF4-FFF2-40B4-BE49-F238E27FC236}">
+                <a16:creationId xmlns:a16="http://schemas.microsoft.com/office/drawing/2014/main" id="{B0209A66-2EF9-2C46-4750-071644C63D70}"/>
+              </a:ext>
+            </a:extLst>
+          </p:cNvPr>
+          <p:cNvPicPr>
+            <a:picLocks noChangeAspect="1"/>
+          </p:cNvPicPr>
+          <p:nvPr/>
+        </p:nvPicPr>
+        <p:blipFill>
+          <a:blip r:embed="rId2">
+            <a:extLst>
+              <a:ext uri="{28A0092B-C50C-407E-A947-70E740481C1C}">
+                <a14:useLocalDpi xmlns:a14="http://schemas.microsoft.com/office/drawing/2010/main" val="0"/>
+              </a:ext>
+            </a:extLst>
+          </a:blip>
+          <a:stretch>
+            <a:fillRect/>
+          </a:stretch>
+        </p:blipFill>
+        <p:spPr>
+          <a:xfrm>
+            <a:off x="7343411" y="2308982"/>
+            <a:ext cx="4752510" cy="2809937"/>
+          </a:xfrm>
+          <a:prstGeom prst="rect">
+            <a:avLst/>
+          </a:prstGeom>
+        </p:spPr>
+      </p:pic>
     </p:spTree>
     <p:extLst>
       <p:ext uri="{BB962C8B-B14F-4D97-AF65-F5344CB8AC3E}">
-        <p14:creationId xmlns:p14="http://schemas.microsoft.com/office/powerpoint/2010/main" val="1074360358"/>
+        <p14:creationId xmlns:p14="http://schemas.microsoft.com/office/powerpoint/2010/main" val="3577679760"/>
       </p:ext>
     </p:extLst>
   </p:cSld>
@@ -8870,7 +9223,7 @@
       </p:grpSpPr>
       <p:sp useBgFill="1">
         <p:nvSpPr>
-          <p:cNvPr id="11" name="Rectangle 10">
+          <p:cNvPr id="10" name="Rectangle 9">
             <a:extLst>
               <a:ext uri="{FF2B5EF4-FFF2-40B4-BE49-F238E27FC236}">
                 <a16:creationId xmlns:a16="http://schemas.microsoft.com/office/drawing/2014/main" id="{C5176844-69C3-4F79-BE38-EA5BDDF4FEA4}"/>
@@ -8957,15 +9310,15 @@
           <a:lstStyle/>
           <a:p>
             <a:r>
-              <a:rPr lang="en-US" dirty="0"/>
-              <a:t>Dropouts</a:t>
+              <a:rPr lang="en-US" sz="5100" dirty="0"/>
+              <a:t>Children In Foster Care</a:t>
             </a:r>
           </a:p>
         </p:txBody>
       </p:sp>
       <p:cxnSp>
         <p:nvCxnSpPr>
-          <p:cNvPr id="13" name="Straight Connector 12">
+          <p:cNvPr id="12" name="Straight Connector 11">
             <a:extLst>
               <a:ext uri="{FF2B5EF4-FFF2-40B4-BE49-F238E27FC236}">
                 <a16:creationId xmlns:a16="http://schemas.microsoft.com/office/drawing/2014/main" id="{33862825-C012-4895-A17E-F3D1F62D89DD}"/>
@@ -9047,28 +9400,33 @@
           <a:lstStyle/>
           <a:p>
             <a:r>
-              <a:rPr lang="en-US" sz="2000" dirty="0"/>
+              <a:rPr lang="en-US" sz="1900" dirty="0"/>
               <a:t>We pulled the data from datacenter.aef.org.</a:t>
             </a:r>
           </a:p>
           <a:p>
             <a:r>
-              <a:rPr lang="en-US" sz="2000" dirty="0"/>
+              <a:rPr lang="en-US" sz="1900" dirty="0"/>
               <a:t>Data was presented by state and year. </a:t>
             </a:r>
-            <a:endParaRPr lang="en-US" dirty="0"/>
-          </a:p>
-          <a:p>
-            <a:r>
-              <a:rPr lang="en-US" dirty="0"/>
-              <a:t>Dropout rates appear to be trending downward over the last 16 years and are expected to continue to do so throughout 2024.</a:t>
-            </a:r>
-          </a:p>
-        </p:txBody>
-      </p:sp>
-      <p:sp>
-        <p:nvSpPr>
-          <p:cNvPr id="15" name="Freeform: Shape 14">
+          </a:p>
+          <a:p>
+            <a:r>
+              <a:rPr lang="en-US" sz="1900" dirty="0"/>
+              <a:t>Overall, the number of dropouts has decreases significantly between 2004 and 2020 and is predicted to continue this downward trend. </a:t>
+            </a:r>
+          </a:p>
+          <a:p>
+            <a:endParaRPr lang="en-US" sz="1900" dirty="0"/>
+          </a:p>
+          <a:p>
+            <a:endParaRPr lang="en-US" sz="1900" dirty="0"/>
+          </a:p>
+        </p:txBody>
+      </p:sp>
+      <p:sp>
+        <p:nvSpPr>
+          <p:cNvPr id="14" name="Freeform: Shape 13">
             <a:extLst>
               <a:ext uri="{FF2B5EF4-FFF2-40B4-BE49-F238E27FC236}">
                 <a16:creationId xmlns:a16="http://schemas.microsoft.com/office/drawing/2014/main" id="{F76C355F-28BE-46B1-9B8D-5D71A48155D3}"/>
@@ -9204,10 +9562,10 @@
       </p:sp>
       <p:pic>
         <p:nvPicPr>
-          <p:cNvPr id="6" name="Picture 5" descr="A graph with a line graph&#10;&#10;Description automatically generated with medium confidence">
-            <a:extLst>
-              <a:ext uri="{FF2B5EF4-FFF2-40B4-BE49-F238E27FC236}">
-                <a16:creationId xmlns:a16="http://schemas.microsoft.com/office/drawing/2014/main" id="{80A92F9F-7B7A-27DC-A092-A614B43DF693}"/>
+          <p:cNvPr id="5" name="Picture 4" descr="A graph with a line graph&#10;&#10;Description automatically generated with medium confidence">
+            <a:extLst>
+              <a:ext uri="{FF2B5EF4-FFF2-40B4-BE49-F238E27FC236}">
+                <a16:creationId xmlns:a16="http://schemas.microsoft.com/office/drawing/2014/main" id="{C48D21E1-3383-36A5-CF05-F05116A9D3BC}"/>
               </a:ext>
             </a:extLst>
           </p:cNvPr>
@@ -9230,8 +9588,8 @@
         </p:blipFill>
         <p:spPr>
           <a:xfrm>
-            <a:off x="7199135" y="2363763"/>
-            <a:ext cx="4923466" cy="2917153"/>
+            <a:off x="7212039" y="2363763"/>
+            <a:ext cx="4824017" cy="2858229"/>
           </a:xfrm>
           <a:prstGeom prst="rect">
             <a:avLst/>
@@ -9240,7 +9598,7 @@
       </p:pic>
       <p:sp>
         <p:nvSpPr>
-          <p:cNvPr id="17" name="Freeform 6">
+          <p:cNvPr id="16" name="Freeform 6">
             <a:extLst>
               <a:ext uri="{FF2B5EF4-FFF2-40B4-BE49-F238E27FC236}">
                 <a16:creationId xmlns:a16="http://schemas.microsoft.com/office/drawing/2014/main" id="{A101E513-AF74-4E9D-A31F-99664250722D}"/>
@@ -9465,7 +9823,7 @@
     </p:spTree>
     <p:extLst>
       <p:ext uri="{BB962C8B-B14F-4D97-AF65-F5344CB8AC3E}">
-        <p14:creationId xmlns:p14="http://schemas.microsoft.com/office/powerpoint/2010/main" val="3127629541"/>
+        <p14:creationId xmlns:p14="http://schemas.microsoft.com/office/powerpoint/2010/main" val="1074360358"/>
       </p:ext>
     </p:extLst>
   </p:cSld>

</xml_diff>

<commit_message>
Made adjustments to PPT file
</commit_message>
<xml_diff>
--- a/Resources/Project1_Presentation.pptx
+++ b/Resources/Project1_Presentation.pptx
@@ -11,9 +11,9 @@
     <p:sldId id="257" r:id="rId5"/>
     <p:sldId id="258" r:id="rId6"/>
     <p:sldId id="260" r:id="rId7"/>
-    <p:sldId id="261" r:id="rId8"/>
-    <p:sldId id="262" r:id="rId9"/>
-    <p:sldId id="263" r:id="rId10"/>
+    <p:sldId id="272" r:id="rId8"/>
+    <p:sldId id="261" r:id="rId9"/>
+    <p:sldId id="262" r:id="rId10"/>
     <p:sldId id="266" r:id="rId11"/>
     <p:sldId id="264" r:id="rId12"/>
     <p:sldId id="265" r:id="rId13"/>
@@ -129,9 +129,225 @@
 <file path=ppt/revisionInfo.xml><?xml version="1.0" encoding="utf-8"?>
 <p1510:revInfo xmlns:a="http://schemas.openxmlformats.org/drawingml/2006/main" xmlns:r="http://schemas.openxmlformats.org/officeDocument/2006/relationships" xmlns:p1510="http://schemas.microsoft.com/office/powerpoint/2015/10/main">
   <p1510:revLst>
-    <p1510:client id="{B725A593-9317-4AC4-90F7-9DC88AA4AC22}" v="14" dt="2024-01-05T04:03:37.021"/>
+    <p1510:client id="{561EC942-CAEB-4FA9-8C6A-D1A1D87D5A05}" v="3" dt="2024-01-09T02:51:29.313"/>
   </p1510:revLst>
 </p1510:revInfo>
+</file>
+
+<file path=ppt/changesInfos/changesInfo1.xml><?xml version="1.0" encoding="utf-8"?>
+<pc:chgInfo xmlns:a="http://schemas.openxmlformats.org/drawingml/2006/main" xmlns:r="http://schemas.openxmlformats.org/officeDocument/2006/relationships" xmlns:ac="http://schemas.microsoft.com/office/drawing/2013/main/command" xmlns:pc="http://schemas.microsoft.com/office/powerpoint/2013/main/command">
+  <pc:docChgLst>
+    <pc:chgData name="Clayton Graves" userId="3223012b48fe14f7" providerId="LiveId" clId="{561EC942-CAEB-4FA9-8C6A-D1A1D87D5A05}"/>
+    <pc:docChg chg="undo custSel addSld delSld modSld sldOrd">
+      <pc:chgData name="Clayton Graves" userId="3223012b48fe14f7" providerId="LiveId" clId="{561EC942-CAEB-4FA9-8C6A-D1A1D87D5A05}" dt="2024-01-09T02:52:37.485" v="339" actId="2711"/>
+      <pc:docMkLst>
+        <pc:docMk/>
+      </pc:docMkLst>
+      <pc:sldChg chg="addSp modSp mod setBg">
+        <pc:chgData name="Clayton Graves" userId="3223012b48fe14f7" providerId="LiveId" clId="{561EC942-CAEB-4FA9-8C6A-D1A1D87D5A05}" dt="2024-01-09T02:41:45.648" v="254" actId="20577"/>
+        <pc:sldMkLst>
+          <pc:docMk/>
+          <pc:sldMk cId="1421390050" sldId="260"/>
+        </pc:sldMkLst>
+        <pc:spChg chg="mod">
+          <ac:chgData name="Clayton Graves" userId="3223012b48fe14f7" providerId="LiveId" clId="{561EC942-CAEB-4FA9-8C6A-D1A1D87D5A05}" dt="2024-01-09T02:41:09.015" v="253" actId="26606"/>
+          <ac:spMkLst>
+            <pc:docMk/>
+            <pc:sldMk cId="1421390050" sldId="260"/>
+            <ac:spMk id="2" creationId="{48BBF077-D08B-9768-51AF-26A60C35BB5E}"/>
+          </ac:spMkLst>
+        </pc:spChg>
+        <pc:spChg chg="mod">
+          <ac:chgData name="Clayton Graves" userId="3223012b48fe14f7" providerId="LiveId" clId="{561EC942-CAEB-4FA9-8C6A-D1A1D87D5A05}" dt="2024-01-09T02:41:45.648" v="254" actId="20577"/>
+          <ac:spMkLst>
+            <pc:docMk/>
+            <pc:sldMk cId="1421390050" sldId="260"/>
+            <ac:spMk id="3" creationId="{DA5702B5-3424-000B-7452-F4E3A91461B7}"/>
+          </ac:spMkLst>
+        </pc:spChg>
+        <pc:spChg chg="add">
+          <ac:chgData name="Clayton Graves" userId="3223012b48fe14f7" providerId="LiveId" clId="{561EC942-CAEB-4FA9-8C6A-D1A1D87D5A05}" dt="2024-01-09T02:41:09.015" v="253" actId="26606"/>
+          <ac:spMkLst>
+            <pc:docMk/>
+            <pc:sldMk cId="1421390050" sldId="260"/>
+            <ac:spMk id="9" creationId="{10C9A191-62EE-4A86-8FF9-6794BC3C58A7}"/>
+          </ac:spMkLst>
+        </pc:spChg>
+        <pc:spChg chg="add">
+          <ac:chgData name="Clayton Graves" userId="3223012b48fe14f7" providerId="LiveId" clId="{561EC942-CAEB-4FA9-8C6A-D1A1D87D5A05}" dt="2024-01-09T02:41:09.015" v="253" actId="26606"/>
+          <ac:spMkLst>
+            <pc:docMk/>
+            <pc:sldMk cId="1421390050" sldId="260"/>
+            <ac:spMk id="11" creationId="{6222F81D-28CB-42CB-9961-602C33F65295}"/>
+          </ac:spMkLst>
+        </pc:spChg>
+        <pc:spChg chg="add">
+          <ac:chgData name="Clayton Graves" userId="3223012b48fe14f7" providerId="LiveId" clId="{561EC942-CAEB-4FA9-8C6A-D1A1D87D5A05}" dt="2024-01-09T02:41:09.015" v="253" actId="26606"/>
+          <ac:spMkLst>
+            <pc:docMk/>
+            <pc:sldMk cId="1421390050" sldId="260"/>
+            <ac:spMk id="15" creationId="{4E75910E-4112-4447-8981-4CA7ACEF94BA}"/>
+          </ac:spMkLst>
+        </pc:spChg>
+        <pc:picChg chg="add">
+          <ac:chgData name="Clayton Graves" userId="3223012b48fe14f7" providerId="LiveId" clId="{561EC942-CAEB-4FA9-8C6A-D1A1D87D5A05}" dt="2024-01-09T02:41:09.015" v="253" actId="26606"/>
+          <ac:picMkLst>
+            <pc:docMk/>
+            <pc:sldMk cId="1421390050" sldId="260"/>
+            <ac:picMk id="5" creationId="{405118D7-9E74-37FD-940E-87807F24C9DE}"/>
+          </ac:picMkLst>
+        </pc:picChg>
+        <pc:cxnChg chg="add">
+          <ac:chgData name="Clayton Graves" userId="3223012b48fe14f7" providerId="LiveId" clId="{561EC942-CAEB-4FA9-8C6A-D1A1D87D5A05}" dt="2024-01-09T02:41:09.015" v="253" actId="26606"/>
+          <ac:cxnSpMkLst>
+            <pc:docMk/>
+            <pc:sldMk cId="1421390050" sldId="260"/>
+            <ac:cxnSpMk id="13" creationId="{081E1E49-F752-49CA-BFF6-1303B0A8AA03}"/>
+          </ac:cxnSpMkLst>
+        </pc:cxnChg>
+      </pc:sldChg>
+      <pc:sldChg chg="del">
+        <pc:chgData name="Clayton Graves" userId="3223012b48fe14f7" providerId="LiveId" clId="{561EC942-CAEB-4FA9-8C6A-D1A1D87D5A05}" dt="2024-01-09T02:18:51.211" v="0" actId="2696"/>
+        <pc:sldMkLst>
+          <pc:docMk/>
+          <pc:sldMk cId="1074360358" sldId="263"/>
+        </pc:sldMkLst>
+      </pc:sldChg>
+      <pc:sldChg chg="modSp mod">
+        <pc:chgData name="Clayton Graves" userId="3223012b48fe14f7" providerId="LiveId" clId="{561EC942-CAEB-4FA9-8C6A-D1A1D87D5A05}" dt="2024-01-09T02:51:07.912" v="334"/>
+        <pc:sldMkLst>
+          <pc:docMk/>
+          <pc:sldMk cId="101181284" sldId="270"/>
+        </pc:sldMkLst>
+        <pc:spChg chg="mod">
+          <ac:chgData name="Clayton Graves" userId="3223012b48fe14f7" providerId="LiveId" clId="{561EC942-CAEB-4FA9-8C6A-D1A1D87D5A05}" dt="2024-01-09T02:51:07.912" v="334"/>
+          <ac:spMkLst>
+            <pc:docMk/>
+            <pc:sldMk cId="101181284" sldId="270"/>
+            <ac:spMk id="8" creationId="{1C8C6BB4-B8E2-963D-AF48-BCC09660AE4C}"/>
+          </ac:spMkLst>
+        </pc:spChg>
+      </pc:sldChg>
+      <pc:sldChg chg="modSp mod">
+        <pc:chgData name="Clayton Graves" userId="3223012b48fe14f7" providerId="LiveId" clId="{561EC942-CAEB-4FA9-8C6A-D1A1D87D5A05}" dt="2024-01-09T02:52:37.485" v="339" actId="2711"/>
+        <pc:sldMkLst>
+          <pc:docMk/>
+          <pc:sldMk cId="790865366" sldId="271"/>
+        </pc:sldMkLst>
+        <pc:spChg chg="mod">
+          <ac:chgData name="Clayton Graves" userId="3223012b48fe14f7" providerId="LiveId" clId="{561EC942-CAEB-4FA9-8C6A-D1A1D87D5A05}" dt="2024-01-09T02:52:37.485" v="339" actId="2711"/>
+          <ac:spMkLst>
+            <pc:docMk/>
+            <pc:sldMk cId="790865366" sldId="271"/>
+            <ac:spMk id="4" creationId="{52E4618E-8CEA-763B-2DA8-6579EC23C36C}"/>
+          </ac:spMkLst>
+        </pc:spChg>
+      </pc:sldChg>
+      <pc:sldChg chg="addSp delSp modSp add mod setBg">
+        <pc:chgData name="Clayton Graves" userId="3223012b48fe14f7" providerId="LiveId" clId="{561EC942-CAEB-4FA9-8C6A-D1A1D87D5A05}" dt="2024-01-09T02:43:46.936" v="332" actId="20577"/>
+        <pc:sldMkLst>
+          <pc:docMk/>
+          <pc:sldMk cId="3416654329" sldId="272"/>
+        </pc:sldMkLst>
+        <pc:spChg chg="mod">
+          <ac:chgData name="Clayton Graves" userId="3223012b48fe14f7" providerId="LiveId" clId="{561EC942-CAEB-4FA9-8C6A-D1A1D87D5A05}" dt="2024-01-09T02:42:45.630" v="258" actId="26606"/>
+          <ac:spMkLst>
+            <pc:docMk/>
+            <pc:sldMk cId="3416654329" sldId="272"/>
+            <ac:spMk id="2" creationId="{48BBF077-D08B-9768-51AF-26A60C35BB5E}"/>
+          </ac:spMkLst>
+        </pc:spChg>
+        <pc:spChg chg="mod ord">
+          <ac:chgData name="Clayton Graves" userId="3223012b48fe14f7" providerId="LiveId" clId="{561EC942-CAEB-4FA9-8C6A-D1A1D87D5A05}" dt="2024-01-09T02:43:46.936" v="332" actId="20577"/>
+          <ac:spMkLst>
+            <pc:docMk/>
+            <pc:sldMk cId="3416654329" sldId="272"/>
+            <ac:spMk id="3" creationId="{DA5702B5-3424-000B-7452-F4E3A91461B7}"/>
+          </ac:spMkLst>
+        </pc:spChg>
+        <pc:spChg chg="add">
+          <ac:chgData name="Clayton Graves" userId="3223012b48fe14f7" providerId="LiveId" clId="{561EC942-CAEB-4FA9-8C6A-D1A1D87D5A05}" dt="2024-01-09T02:42:45.630" v="258" actId="26606"/>
+          <ac:spMkLst>
+            <pc:docMk/>
+            <pc:sldMk cId="3416654329" sldId="272"/>
+            <ac:spMk id="18" creationId="{C5176844-69C3-4F79-BE38-EA5BDDF4FEA4}"/>
+          </ac:spMkLst>
+        </pc:spChg>
+        <pc:spChg chg="add">
+          <ac:chgData name="Clayton Graves" userId="3223012b48fe14f7" providerId="LiveId" clId="{561EC942-CAEB-4FA9-8C6A-D1A1D87D5A05}" dt="2024-01-09T02:42:45.630" v="258" actId="26606"/>
+          <ac:spMkLst>
+            <pc:docMk/>
+            <pc:sldMk cId="3416654329" sldId="272"/>
+            <ac:spMk id="20" creationId="{16E28E80-59C7-4175-93FA-B5F52391B6EC}"/>
+          </ac:spMkLst>
+        </pc:spChg>
+        <pc:spChg chg="add">
+          <ac:chgData name="Clayton Graves" userId="3223012b48fe14f7" providerId="LiveId" clId="{561EC942-CAEB-4FA9-8C6A-D1A1D87D5A05}" dt="2024-01-09T02:42:45.630" v="258" actId="26606"/>
+          <ac:spMkLst>
+            <pc:docMk/>
+            <pc:sldMk cId="3416654329" sldId="272"/>
+            <ac:spMk id="24" creationId="{A101E513-AF74-4E9D-A31F-99664250722D}"/>
+          </ac:spMkLst>
+        </pc:spChg>
+        <pc:picChg chg="add del mod">
+          <ac:chgData name="Clayton Graves" userId="3223012b48fe14f7" providerId="LiveId" clId="{561EC942-CAEB-4FA9-8C6A-D1A1D87D5A05}" dt="2024-01-09T02:36:54.821" v="139" actId="478"/>
+          <ac:picMkLst>
+            <pc:docMk/>
+            <pc:sldMk cId="3416654329" sldId="272"/>
+            <ac:picMk id="5" creationId="{A07C8CA1-1BAE-1AED-E76F-4FB906B082A2}"/>
+          </ac:picMkLst>
+        </pc:picChg>
+        <pc:picChg chg="add del mod">
+          <ac:chgData name="Clayton Graves" userId="3223012b48fe14f7" providerId="LiveId" clId="{561EC942-CAEB-4FA9-8C6A-D1A1D87D5A05}" dt="2024-01-09T02:36:53.862" v="138" actId="478"/>
+          <ac:picMkLst>
+            <pc:docMk/>
+            <pc:sldMk cId="3416654329" sldId="272"/>
+            <ac:picMk id="7" creationId="{4AADAFC9-B279-4686-B456-A62AC8951AB5}"/>
+          </ac:picMkLst>
+        </pc:picChg>
+        <pc:picChg chg="add mod ord">
+          <ac:chgData name="Clayton Graves" userId="3223012b48fe14f7" providerId="LiveId" clId="{561EC942-CAEB-4FA9-8C6A-D1A1D87D5A05}" dt="2024-01-09T02:42:45.630" v="258" actId="26606"/>
+          <ac:picMkLst>
+            <pc:docMk/>
+            <pc:sldMk cId="3416654329" sldId="272"/>
+            <ac:picMk id="9" creationId="{30E615D4-2743-782B-B564-51BD2F438C8D}"/>
+          </ac:picMkLst>
+        </pc:picChg>
+        <pc:picChg chg="add mod ord">
+          <ac:chgData name="Clayton Graves" userId="3223012b48fe14f7" providerId="LiveId" clId="{561EC942-CAEB-4FA9-8C6A-D1A1D87D5A05}" dt="2024-01-09T02:42:45.630" v="258" actId="26606"/>
+          <ac:picMkLst>
+            <pc:docMk/>
+            <pc:sldMk cId="3416654329" sldId="272"/>
+            <ac:picMk id="11" creationId="{5D7A9F2D-BCE9-E320-40F3-7C1F0E47F8B7}"/>
+          </ac:picMkLst>
+        </pc:picChg>
+        <pc:picChg chg="add mod">
+          <ac:chgData name="Clayton Graves" userId="3223012b48fe14f7" providerId="LiveId" clId="{561EC942-CAEB-4FA9-8C6A-D1A1D87D5A05}" dt="2024-01-09T02:42:45.630" v="258" actId="26606"/>
+          <ac:picMkLst>
+            <pc:docMk/>
+            <pc:sldMk cId="3416654329" sldId="272"/>
+            <ac:picMk id="13" creationId="{329C91F2-9D29-C86B-8486-A51822F78EC2}"/>
+          </ac:picMkLst>
+        </pc:picChg>
+        <pc:cxnChg chg="add">
+          <ac:chgData name="Clayton Graves" userId="3223012b48fe14f7" providerId="LiveId" clId="{561EC942-CAEB-4FA9-8C6A-D1A1D87D5A05}" dt="2024-01-09T02:42:45.630" v="258" actId="26606"/>
+          <ac:cxnSpMkLst>
+            <pc:docMk/>
+            <pc:sldMk cId="3416654329" sldId="272"/>
+            <ac:cxnSpMk id="22" creationId="{C1FC086D-39EC-448D-97E7-FF232355AE19}"/>
+          </ac:cxnSpMkLst>
+        </pc:cxnChg>
+      </pc:sldChg>
+      <pc:sldChg chg="add del ord">
+        <pc:chgData name="Clayton Graves" userId="3223012b48fe14f7" providerId="LiveId" clId="{561EC942-CAEB-4FA9-8C6A-D1A1D87D5A05}" dt="2024-01-09T02:31:23.748" v="63" actId="47"/>
+        <pc:sldMkLst>
+          <pc:docMk/>
+          <pc:sldMk cId="1606087308" sldId="273"/>
+        </pc:sldMkLst>
+      </pc:sldChg>
+    </pc:docChg>
+  </pc:docChgLst>
+</pc:chgInfo>
 </file>
 
 <file path=ppt/slideLayouts/slideLayout1.xml><?xml version="1.0" encoding="utf-8"?>
@@ -555,7 +771,7 @@
           <a:p>
             <a:fld id="{53BEF823-48A5-43FC-BE03-E79964288B41}" type="datetimeFigureOut">
               <a:rPr lang="en-US" smtClean="0"/>
-              <a:t>1/8/24</a:t>
+              <a:t>1/8/2024</a:t>
             </a:fld>
             <a:endParaRPr lang="en-US" dirty="0"/>
           </a:p>
@@ -766,7 +982,7 @@
             <a:fld id="{53BEF823-48A5-43FC-BE03-E79964288B41}" type="datetimeFigureOut">
               <a:rPr lang="en-US" smtClean="0"/>
               <a:pPr algn="r"/>
-              <a:t>1/8/24</a:t>
+              <a:t>1/8/2024</a:t>
             </a:fld>
             <a:endParaRPr lang="en-US" dirty="0"/>
           </a:p>
@@ -981,7 +1197,7 @@
             <a:fld id="{53BEF823-48A5-43FC-BE03-E79964288B41}" type="datetimeFigureOut">
               <a:rPr lang="en-US" smtClean="0"/>
               <a:pPr algn="r"/>
-              <a:t>1/8/24</a:t>
+              <a:t>1/8/2024</a:t>
             </a:fld>
             <a:endParaRPr lang="en-US" dirty="0"/>
           </a:p>
@@ -1184,7 +1400,7 @@
             <a:fld id="{53BEF823-48A5-43FC-BE03-E79964288B41}" type="datetimeFigureOut">
               <a:rPr lang="en-US" smtClean="0"/>
               <a:pPr algn="r"/>
-              <a:t>1/8/24</a:t>
+              <a:t>1/8/2024</a:t>
             </a:fld>
             <a:endParaRPr lang="en-US" dirty="0"/>
           </a:p>
@@ -1468,7 +1684,7 @@
             <a:fld id="{53BEF823-48A5-43FC-BE03-E79964288B41}" type="datetimeFigureOut">
               <a:rPr lang="en-US" smtClean="0"/>
               <a:pPr algn="r"/>
-              <a:t>1/8/24</a:t>
+              <a:t>1/8/2024</a:t>
             </a:fld>
             <a:endParaRPr lang="en-US" dirty="0"/>
           </a:p>
@@ -1712,7 +1928,7 @@
             <a:fld id="{53BEF823-48A5-43FC-BE03-E79964288B41}" type="datetimeFigureOut">
               <a:rPr lang="en-US" smtClean="0"/>
               <a:pPr algn="r"/>
-              <a:t>1/8/24</a:t>
+              <a:t>1/8/2024</a:t>
             </a:fld>
             <a:endParaRPr lang="en-US" dirty="0"/>
           </a:p>
@@ -2155,7 +2371,7 @@
             <a:fld id="{53BEF823-48A5-43FC-BE03-E79964288B41}" type="datetimeFigureOut">
               <a:rPr lang="en-US" smtClean="0"/>
               <a:pPr algn="r"/>
-              <a:t>1/8/24</a:t>
+              <a:t>1/8/2024</a:t>
             </a:fld>
             <a:endParaRPr lang="en-US" dirty="0"/>
           </a:p>
@@ -2301,7 +2517,7 @@
             <a:fld id="{53BEF823-48A5-43FC-BE03-E79964288B41}" type="datetimeFigureOut">
               <a:rPr lang="en-US" smtClean="0"/>
               <a:pPr algn="r"/>
-              <a:t>1/8/24</a:t>
+              <a:t>1/8/2024</a:t>
             </a:fld>
             <a:endParaRPr lang="en-US" dirty="0"/>
           </a:p>
@@ -2419,7 +2635,7 @@
             <a:fld id="{53BEF823-48A5-43FC-BE03-E79964288B41}" type="datetimeFigureOut">
               <a:rPr lang="en-US" smtClean="0"/>
               <a:pPr algn="r"/>
-              <a:t>1/8/24</a:t>
+              <a:t>1/8/2024</a:t>
             </a:fld>
             <a:endParaRPr lang="en-US" dirty="0"/>
           </a:p>
@@ -2703,7 +2919,7 @@
             <a:fld id="{53BEF823-48A5-43FC-BE03-E79964288B41}" type="datetimeFigureOut">
               <a:rPr lang="en-US" smtClean="0"/>
               <a:pPr algn="r"/>
-              <a:t>1/8/24</a:t>
+              <a:t>1/8/2024</a:t>
             </a:fld>
             <a:endParaRPr lang="en-US" dirty="0"/>
           </a:p>
@@ -2998,7 +3214,7 @@
             <a:fld id="{53BEF823-48A5-43FC-BE03-E79964288B41}" type="datetimeFigureOut">
               <a:rPr lang="en-US" smtClean="0"/>
               <a:pPr algn="r"/>
-              <a:t>1/8/24</a:t>
+              <a:t>1/8/2024</a:t>
             </a:fld>
             <a:endParaRPr lang="en-US" dirty="0"/>
           </a:p>
@@ -3493,7 +3709,7 @@
             <a:fld id="{53BEF823-48A5-43FC-BE03-E79964288B41}" type="datetimeFigureOut">
               <a:rPr lang="en-US" smtClean="0"/>
               <a:pPr algn="r"/>
-              <a:t>1/8/24</a:t>
+              <a:t>1/8/2024</a:t>
             </a:fld>
             <a:endParaRPr lang="en-US" dirty="0"/>
           </a:p>
@@ -7068,18 +7284,22 @@
               <a:buAutoNum type="arabicPeriod"/>
             </a:pPr>
             <a:r>
-              <a:rPr lang="en-US" sz="1100" dirty="0"/>
+              <a:rPr lang="en-US" sz="1100" dirty="0">
+                <a:latin typeface="Helvetica Neue" panose="02000503000000020004"/>
+              </a:rPr>
               <a:t>Project </a:t>
             </a:r>
             <a:r>
               <a:rPr lang="en-GB" sz="1100" dirty="0">
                 <a:effectLst/>
-                <a:latin typeface="Helvetica Neue" panose="02000503000000020004" pitchFamily="2" charset="0"/>
+                <a:latin typeface="Helvetica Neue" panose="02000503000000020004"/>
                 <a:hlinkClick r:id="rId2"/>
               </a:rPr>
               <a:t>Github</a:t>
             </a:r>
-            <a:endParaRPr lang="en-US" sz="1100" dirty="0"/>
+            <a:endParaRPr lang="en-US" sz="1100" dirty="0">
+              <a:latin typeface="Helvetica Neue" panose="02000503000000020004"/>
+            </a:endParaRPr>
           </a:p>
           <a:p>
             <a:pPr marL="228600" indent="-228600">
@@ -7087,28 +7307,34 @@
               <a:buAutoNum type="arabicPeriod"/>
             </a:pPr>
             <a:r>
-              <a:rPr lang="en-US" sz="1100" dirty="0"/>
+              <a:rPr lang="en-US" sz="1100" dirty="0">
+                <a:latin typeface="Helvetica Neue" panose="02000503000000020004"/>
+              </a:rPr>
               <a:t>Project </a:t>
             </a:r>
             <a:r>
-              <a:rPr lang="en-US" sz="1100" dirty="0" err="1"/>
+              <a:rPr lang="en-US" sz="1100" dirty="0" err="1">
+                <a:latin typeface="Helvetica Neue" panose="02000503000000020004"/>
+              </a:rPr>
               <a:t>Github</a:t>
             </a:r>
             <a:r>
-              <a:rPr lang="en-US" sz="1100" dirty="0"/>
+              <a:rPr lang="en-US" sz="1100" dirty="0">
+                <a:latin typeface="Helvetica Neue" panose="02000503000000020004"/>
+              </a:rPr>
               <a:t> </a:t>
             </a:r>
             <a:r>
               <a:rPr lang="en-GB" sz="1100" dirty="0">
                 <a:effectLst/>
-                <a:latin typeface="Helvetica Neue" panose="02000503000000020004" pitchFamily="2" charset="0"/>
+                <a:latin typeface="Helvetica Neue" panose="02000503000000020004"/>
                 <a:hlinkClick r:id="rId3"/>
               </a:rPr>
               <a:t>README</a:t>
             </a:r>
             <a:endParaRPr lang="en-GB" sz="1100" dirty="0">
               <a:effectLst/>
-              <a:latin typeface="Helvetica Neue" panose="02000503000000020004" pitchFamily="2" charset="0"/>
+              <a:latin typeface="Helvetica Neue" panose="02000503000000020004"/>
             </a:endParaRPr>
           </a:p>
           <a:p>
@@ -7118,20 +7344,20 @@
             </a:pPr>
             <a:r>
               <a:rPr lang="en-GB" sz="1100" dirty="0">
-                <a:latin typeface="Helvetica Neue" panose="02000503000000020004" pitchFamily="2" charset="0"/>
+                <a:latin typeface="Helvetica Neue" panose="02000503000000020004"/>
               </a:rPr>
               <a:t>Quote from </a:t>
             </a:r>
             <a:r>
               <a:rPr lang="en-GB" sz="1100" dirty="0">
                 <a:effectLst/>
-                <a:latin typeface="Helvetica Neue" panose="02000503000000020004" pitchFamily="2" charset="0"/>
+                <a:latin typeface="Helvetica Neue" panose="02000503000000020004"/>
                 <a:hlinkClick r:id="rId4"/>
               </a:rPr>
               <a:t>Colorado Department of Health</a:t>
             </a:r>
             <a:endParaRPr lang="en-GB" sz="1100" dirty="0">
-              <a:latin typeface="Helvetica Neue" panose="02000503000000020004" pitchFamily="2" charset="0"/>
+              <a:latin typeface="Helvetica Neue" panose="02000503000000020004"/>
             </a:endParaRPr>
           </a:p>
           <a:p>
@@ -7141,13 +7367,13 @@
             </a:pPr>
             <a:r>
               <a:rPr lang="en-GB" sz="1100" dirty="0">
-                <a:latin typeface="Helvetica Neue" panose="02000503000000020004" pitchFamily="2" charset="0"/>
+                <a:latin typeface="Helvetica Neue" panose="02000503000000020004"/>
                 <a:hlinkClick r:id="rId5"/>
               </a:rPr>
               <a:t>Median Household Income Data </a:t>
             </a:r>
             <a:endParaRPr lang="en-GB" sz="1100" dirty="0">
-              <a:latin typeface="Helvetica Neue" panose="02000503000000020004" pitchFamily="2" charset="0"/>
+              <a:latin typeface="Helvetica Neue" panose="02000503000000020004"/>
             </a:endParaRPr>
           </a:p>
           <a:p>
@@ -7157,13 +7383,13 @@
             </a:pPr>
             <a:r>
               <a:rPr lang="en-GB" sz="1100" dirty="0">
-                <a:latin typeface="Helvetica Neue" panose="02000503000000020004" pitchFamily="2" charset="0"/>
+                <a:latin typeface="Helvetica Neue" panose="02000503000000020004"/>
                 <a:hlinkClick r:id="rId6"/>
               </a:rPr>
               <a:t>Children in Foster Care Data Source </a:t>
             </a:r>
             <a:endParaRPr lang="en-GB" sz="1100" dirty="0">
-              <a:latin typeface="Helvetica Neue" panose="02000503000000020004" pitchFamily="2" charset="0"/>
+              <a:latin typeface="Helvetica Neue" panose="02000503000000020004"/>
             </a:endParaRPr>
           </a:p>
           <a:p>
@@ -7173,14 +7399,14 @@
             </a:pPr>
             <a:r>
               <a:rPr lang="en-GB" sz="1100" dirty="0">
-                <a:latin typeface="Helvetica Neue" panose="02000503000000020004" pitchFamily="2" charset="0"/>
+                <a:latin typeface="Helvetica Neue" panose="02000503000000020004"/>
                 <a:hlinkClick r:id="rId7"/>
               </a:rPr>
               <a:t>Dropouts Data</a:t>
             </a:r>
             <a:endParaRPr lang="en-GB" sz="1100" dirty="0">
               <a:effectLst/>
-              <a:latin typeface="Helvetica Neue" panose="02000503000000020004" pitchFamily="2" charset="0"/>
+              <a:latin typeface="Helvetica Neue" panose="02000503000000020004"/>
             </a:endParaRPr>
           </a:p>
           <a:p>
@@ -7258,7 +7484,7 @@
         <p:spPr>
           <a:xfrm>
             <a:off x="716692" y="630195"/>
-            <a:ext cx="10997513" cy="3416320"/>
+            <a:ext cx="10997513" cy="3693319"/>
           </a:xfrm>
           <a:prstGeom prst="rect">
             <a:avLst/>
@@ -7323,7 +7549,7 @@
               <a:rPr lang="en-US" dirty="0">
                 <a:hlinkClick r:id="rId5" action="ppaction://hlinksldjump"/>
               </a:rPr>
-              <a:t>Median Household Income</a:t>
+              <a:t>Method-Gathering the Data</a:t>
             </a:r>
             <a:endParaRPr lang="en-US" dirty="0"/>
           </a:p>
@@ -7335,7 +7561,7 @@
               <a:rPr lang="en-US" dirty="0">
                 <a:hlinkClick r:id="rId6" action="ppaction://hlinksldjump"/>
               </a:rPr>
-              <a:t>Children in Foster Care</a:t>
+              <a:t>Median Household Income</a:t>
             </a:r>
             <a:endParaRPr lang="en-US" dirty="0"/>
           </a:p>
@@ -7347,7 +7573,7 @@
               <a:rPr lang="en-US" dirty="0">
                 <a:hlinkClick r:id="rId7" action="ppaction://hlinksldjump"/>
               </a:rPr>
-              <a:t>Dropouts</a:t>
+              <a:t>Children in Foster Care</a:t>
             </a:r>
             <a:endParaRPr lang="en-US" dirty="0"/>
           </a:p>
@@ -7359,7 +7585,7 @@
               <a:rPr lang="en-US" dirty="0">
                 <a:hlinkClick r:id="rId8" action="ppaction://hlinksldjump"/>
               </a:rPr>
-              <a:t>Analysis</a:t>
+              <a:t>Dropouts</a:t>
             </a:r>
             <a:endParaRPr lang="en-US" dirty="0"/>
           </a:p>
@@ -7371,7 +7597,7 @@
               <a:rPr lang="en-US" dirty="0">
                 <a:hlinkClick r:id="rId9" action="ppaction://hlinksldjump"/>
               </a:rPr>
-              <a:t>Conclusion</a:t>
+              <a:t>Analysis</a:t>
             </a:r>
             <a:endParaRPr lang="en-US" dirty="0"/>
           </a:p>
@@ -7382,6 +7608,18 @@
             <a:r>
               <a:rPr lang="en-US" dirty="0">
                 <a:hlinkClick r:id="rId10" action="ppaction://hlinksldjump"/>
+              </a:rPr>
+              <a:t>Conclusion</a:t>
+            </a:r>
+            <a:endParaRPr lang="en-US" dirty="0"/>
+          </a:p>
+          <a:p>
+            <a:pPr marL="342900" indent="-342900">
+              <a:buAutoNum type="arabicPeriod"/>
+            </a:pPr>
+            <a:r>
+              <a:rPr lang="en-US" dirty="0">
+                <a:hlinkClick r:id="rId11" action="ppaction://hlinksldjump"/>
               </a:rPr>
               <a:t>Sources</a:t>
             </a:r>
@@ -7763,6 +8001,14 @@
 <file path=ppt/slides/slide6.xml><?xml version="1.0" encoding="utf-8"?>
 <p:sld xmlns:a="http://schemas.openxmlformats.org/drawingml/2006/main" xmlns:r="http://schemas.openxmlformats.org/officeDocument/2006/relationships" xmlns:p="http://schemas.openxmlformats.org/presentationml/2006/main">
   <p:cSld>
+    <p:bg>
+      <p:bgPr>
+        <a:solidFill>
+          <a:schemeClr val="bg2"/>
+        </a:solidFill>
+        <a:effectLst/>
+      </p:bgPr>
+    </p:bg>
     <p:spTree>
       <p:nvGrpSpPr>
         <p:cNvPr id="1" name=""/>
@@ -7777,31 +8023,194 @@
           <a:chExt cx="0" cy="0"/>
         </a:xfrm>
       </p:grpSpPr>
-      <p:sp>
-        <p:nvSpPr>
-          <p:cNvPr id="2" name="Title 1">
-            <a:extLst>
-              <a:ext uri="{FF2B5EF4-FFF2-40B4-BE49-F238E27FC236}">
-                <a16:creationId xmlns:a16="http://schemas.microsoft.com/office/drawing/2014/main" id="{48BBF077-D08B-9768-51AF-26A60C35BB5E}"/>
-              </a:ext>
-            </a:extLst>
-          </p:cNvPr>
-          <p:cNvSpPr>
-            <a:spLocks noGrp="1"/>
-          </p:cNvSpPr>
-          <p:nvPr>
-            <p:ph type="title"/>
+      <p:sp useBgFill="1">
+        <p:nvSpPr>
+          <p:cNvPr id="9" name="Rectangle 8">
+            <a:extLst>
+              <a:ext uri="{FF2B5EF4-FFF2-40B4-BE49-F238E27FC236}">
+                <a16:creationId xmlns:a16="http://schemas.microsoft.com/office/drawing/2014/main" id="{10C9A191-62EE-4A86-8FF9-6794BC3C58A7}"/>
+              </a:ext>
+              <a:ext uri="{C183D7F6-B498-43B3-948B-1728B52AA6E4}">
+                <adec:decorative xmlns:adec="http://schemas.microsoft.com/office/drawing/2017/decorative" val="1"/>
+              </a:ext>
+            </a:extLst>
+          </p:cNvPr>
+          <p:cNvSpPr>
+            <a:spLocks noGrp="1" noRot="1" noChangeAspect="1" noMove="1" noResize="1" noEditPoints="1" noAdjustHandles="1" noChangeArrowheads="1" noChangeShapeType="1" noTextEdit="1"/>
+          </p:cNvSpPr>
+          <p:nvPr>
+            <p:extLst>
+              <p:ext uri="{386F3935-93C4-4BCD-93E2-E3B085C9AB24}">
+                <p16:designElem xmlns:p16="http://schemas.microsoft.com/office/powerpoint/2015/main" val="1"/>
+              </p:ext>
+            </p:extLst>
           </p:nvPr>
         </p:nvSpPr>
         <p:spPr>
           <a:xfrm>
-            <a:off x="758952" y="758952"/>
-            <a:ext cx="10946945" cy="786069"/>
+            <a:off x="1" y="0"/>
+            <a:ext cx="12191999" cy="6858000"/>
+          </a:xfrm>
+          <a:prstGeom prst="rect">
+            <a:avLst/>
+          </a:prstGeom>
+          <a:ln>
+            <a:noFill/>
+          </a:ln>
+        </p:spPr>
+        <p:style>
+          <a:lnRef idx="2">
+            <a:schemeClr val="accent1">
+              <a:shade val="50000"/>
+            </a:schemeClr>
+          </a:lnRef>
+          <a:fillRef idx="1">
+            <a:schemeClr val="accent1"/>
+          </a:fillRef>
+          <a:effectRef idx="0">
+            <a:schemeClr val="accent1"/>
+          </a:effectRef>
+          <a:fontRef idx="minor">
+            <a:schemeClr val="lt1"/>
+          </a:fontRef>
+        </p:style>
+        <p:txBody>
+          <a:bodyPr rtlCol="0" anchor="ctr"/>
+          <a:lstStyle/>
+          <a:p>
+            <a:pPr algn="ctr"/>
+            <a:endParaRPr lang="en-US"/>
+          </a:p>
+        </p:txBody>
+      </p:sp>
+      <p:sp>
+        <p:nvSpPr>
+          <p:cNvPr id="11" name="Rectangle 10">
+            <a:extLst>
+              <a:ext uri="{FF2B5EF4-FFF2-40B4-BE49-F238E27FC236}">
+                <a16:creationId xmlns:a16="http://schemas.microsoft.com/office/drawing/2014/main" id="{6222F81D-28CB-42CB-9961-602C33F65295}"/>
+              </a:ext>
+              <a:ext uri="{C183D7F6-B498-43B3-948B-1728B52AA6E4}">
+                <adec:decorative xmlns:adec="http://schemas.microsoft.com/office/drawing/2017/decorative" val="1"/>
+              </a:ext>
+            </a:extLst>
+          </p:cNvPr>
+          <p:cNvSpPr>
+            <a:spLocks noGrp="1" noRot="1" noChangeAspect="1" noMove="1" noResize="1" noEditPoints="1" noAdjustHandles="1" noChangeArrowheads="1" noChangeShapeType="1" noTextEdit="1"/>
+          </p:cNvSpPr>
+          <p:nvPr>
+            <p:extLst>
+              <p:ext uri="{386F3935-93C4-4BCD-93E2-E3B085C9AB24}">
+                <p16:designElem xmlns:p16="http://schemas.microsoft.com/office/powerpoint/2015/main" val="1"/>
+              </p:ext>
+            </p:extLst>
+          </p:nvPr>
+        </p:nvSpPr>
+        <p:spPr bwMode="grayWhite">
+          <a:xfrm>
+            <a:off x="1" y="0"/>
+            <a:ext cx="12191999" cy="6858000"/>
+          </a:xfrm>
+          <a:prstGeom prst="rect">
+            <a:avLst/>
+          </a:prstGeom>
+          <a:solidFill>
+            <a:schemeClr val="bg2">
+              <a:alpha val="60000"/>
+            </a:schemeClr>
+          </a:solidFill>
+          <a:ln>
+            <a:noFill/>
+          </a:ln>
+        </p:spPr>
+        <p:style>
+          <a:lnRef idx="2">
+            <a:schemeClr val="accent1">
+              <a:shade val="50000"/>
+            </a:schemeClr>
+          </a:lnRef>
+          <a:fillRef idx="1">
+            <a:schemeClr val="accent1"/>
+          </a:fillRef>
+          <a:effectRef idx="0">
+            <a:schemeClr val="accent1"/>
+          </a:effectRef>
+          <a:fontRef idx="minor">
+            <a:schemeClr val="lt1"/>
+          </a:fontRef>
+        </p:style>
+        <p:txBody>
+          <a:bodyPr rtlCol="0" anchor="ctr"/>
+          <a:lstStyle/>
+          <a:p>
+            <a:pPr algn="ctr"/>
+            <a:endParaRPr lang="en-US"/>
+          </a:p>
+        </p:txBody>
+      </p:sp>
+      <p:pic>
+        <p:nvPicPr>
+          <p:cNvPr id="5" name="Picture 4" descr="Toy plastic numbers">
+            <a:extLst>
+              <a:ext uri="{FF2B5EF4-FFF2-40B4-BE49-F238E27FC236}">
+                <a16:creationId xmlns:a16="http://schemas.microsoft.com/office/drawing/2014/main" id="{405118D7-9E74-37FD-940E-87807F24C9DE}"/>
+              </a:ext>
+            </a:extLst>
+          </p:cNvPr>
+          <p:cNvPicPr>
+            <a:picLocks noChangeAspect="1"/>
+          </p:cNvPicPr>
+          <p:nvPr/>
+        </p:nvPicPr>
+        <p:blipFill rotWithShape="1">
+          <a:blip r:embed="rId2">
+            <a:duotone>
+              <a:schemeClr val="bg2">
+                <a:shade val="45000"/>
+                <a:satMod val="135000"/>
+              </a:schemeClr>
+              <a:prstClr val="white"/>
+            </a:duotone>
+            <a:alphaModFix amt="30000"/>
+          </a:blip>
+          <a:srcRect t="9380" b="6350"/>
+          <a:stretch/>
+        </p:blipFill>
+        <p:spPr>
+          <a:xfrm>
+            <a:off x="8701" y="10"/>
+            <a:ext cx="12192000" cy="6857990"/>
+          </a:xfrm>
+          <a:prstGeom prst="rect">
+            <a:avLst/>
+          </a:prstGeom>
+        </p:spPr>
+      </p:pic>
+      <p:sp>
+        <p:nvSpPr>
+          <p:cNvPr id="2" name="Title 1">
+            <a:extLst>
+              <a:ext uri="{FF2B5EF4-FFF2-40B4-BE49-F238E27FC236}">
+                <a16:creationId xmlns:a16="http://schemas.microsoft.com/office/drawing/2014/main" id="{48BBF077-D08B-9768-51AF-26A60C35BB5E}"/>
+              </a:ext>
+            </a:extLst>
+          </p:cNvPr>
+          <p:cNvSpPr>
+            <a:spLocks noGrp="1"/>
+          </p:cNvSpPr>
+          <p:nvPr>
+            <p:ph type="title"/>
+          </p:nvPr>
+        </p:nvSpPr>
+        <p:spPr>
+          <a:xfrm>
+            <a:off x="758952" y="1201002"/>
+            <a:ext cx="3831335" cy="4312829"/>
           </a:xfrm>
         </p:spPr>
         <p:txBody>
           <a:bodyPr>
-            <a:normAutofit fontScale="90000"/>
+            <a:normAutofit/>
           </a:bodyPr>
           <a:lstStyle/>
           <a:p>
@@ -7812,34 +8221,88 @@
           </a:p>
         </p:txBody>
       </p:sp>
-      <p:sp>
-        <p:nvSpPr>
-          <p:cNvPr id="3" name="Content Placeholder 2">
-            <a:extLst>
-              <a:ext uri="{FF2B5EF4-FFF2-40B4-BE49-F238E27FC236}">
-                <a16:creationId xmlns:a16="http://schemas.microsoft.com/office/drawing/2014/main" id="{DA5702B5-3424-000B-7452-F4E3A91461B7}"/>
-              </a:ext>
-            </a:extLst>
-          </p:cNvPr>
-          <p:cNvSpPr>
-            <a:spLocks noGrp="1"/>
-          </p:cNvSpPr>
-          <p:nvPr>
-            <p:ph idx="1"/>
-          </p:nvPr>
-        </p:nvSpPr>
+      <p:cxnSp>
+        <p:nvCxnSpPr>
+          <p:cNvPr id="13" name="Straight Connector 12">
+            <a:extLst>
+              <a:ext uri="{FF2B5EF4-FFF2-40B4-BE49-F238E27FC236}">
+                <a16:creationId xmlns:a16="http://schemas.microsoft.com/office/drawing/2014/main" id="{081E1E49-F752-49CA-BFF6-1303B0A8AA03}"/>
+              </a:ext>
+              <a:ext uri="{C183D7F6-B498-43B3-948B-1728B52AA6E4}">
+                <adec:decorative xmlns:adec="http://schemas.microsoft.com/office/drawing/2017/decorative" val="1"/>
+              </a:ext>
+            </a:extLst>
+          </p:cNvPr>
+          <p:cNvCxnSpPr>
+            <a:cxnSpLocks noGrp="1" noRot="1" noChangeAspect="1" noMove="1" noResize="1" noEditPoints="1" noAdjustHandles="1" noChangeArrowheads="1" noChangeShapeType="1"/>
+          </p:cNvCxnSpPr>
+          <p:nvPr>
+            <p:extLst>
+              <p:ext uri="{386F3935-93C4-4BCD-93E2-E3B085C9AB24}">
+                <p16:designElem xmlns:p16="http://schemas.microsoft.com/office/powerpoint/2015/main" val="1"/>
+              </p:ext>
+            </p:extLst>
+          </p:nvPr>
+        </p:nvCxnSpPr>
         <p:spPr>
           <a:xfrm>
-            <a:off x="758952" y="1726324"/>
-            <a:ext cx="10946944" cy="4372724"/>
+            <a:off x="4912021" y="1143293"/>
+            <a:ext cx="0" cy="5714707"/>
+          </a:xfrm>
+          <a:prstGeom prst="line">
+            <a:avLst/>
+          </a:prstGeom>
+          <a:ln w="19050">
+            <a:solidFill>
+              <a:schemeClr val="tx1"/>
+            </a:solidFill>
+          </a:ln>
+        </p:spPr>
+        <p:style>
+          <a:lnRef idx="1">
+            <a:schemeClr val="accent1"/>
+          </a:lnRef>
+          <a:fillRef idx="0">
+            <a:schemeClr val="accent1"/>
+          </a:fillRef>
+          <a:effectRef idx="0">
+            <a:schemeClr val="accent1"/>
+          </a:effectRef>
+          <a:fontRef idx="minor">
+            <a:schemeClr val="tx1"/>
+          </a:fontRef>
+        </p:style>
+      </p:cxnSp>
+      <p:sp>
+        <p:nvSpPr>
+          <p:cNvPr id="3" name="Content Placeholder 2">
+            <a:extLst>
+              <a:ext uri="{FF2B5EF4-FFF2-40B4-BE49-F238E27FC236}">
+                <a16:creationId xmlns:a16="http://schemas.microsoft.com/office/drawing/2014/main" id="{DA5702B5-3424-000B-7452-F4E3A91461B7}"/>
+              </a:ext>
+            </a:extLst>
+          </p:cNvPr>
+          <p:cNvSpPr>
+            <a:spLocks noGrp="1"/>
+          </p:cNvSpPr>
+          <p:nvPr>
+            <p:ph idx="1"/>
+          </p:nvPr>
+        </p:nvSpPr>
+        <p:spPr>
+          <a:xfrm>
+            <a:off x="5232992" y="1201002"/>
+            <a:ext cx="6197007" cy="4312829"/>
           </a:xfrm>
         </p:spPr>
         <p:txBody>
-          <a:bodyPr/>
+          <a:bodyPr>
+            <a:normAutofit/>
+          </a:bodyPr>
           <a:lstStyle/>
           <a:p>
             <a:r>
-              <a:rPr lang="en-US" dirty="0"/>
+              <a:rPr lang="en-US" sz="1700" dirty="0"/>
               <a:t> In order to properly test our hypothesis, we needed to gather 3 data sets on a national level:</a:t>
             </a:r>
           </a:p>
@@ -7849,7 +8312,7 @@
               <a:buAutoNum type="arabicPeriod"/>
             </a:pPr>
             <a:r>
-              <a:rPr lang="en-US" dirty="0"/>
+              <a:rPr lang="en-US" sz="1700" dirty="0"/>
               <a:t>Median household income by state</a:t>
             </a:r>
           </a:p>
@@ -7859,7 +8322,7 @@
               <a:buAutoNum type="arabicPeriod"/>
             </a:pPr>
             <a:r>
-              <a:rPr lang="en-US" dirty="0"/>
+              <a:rPr lang="en-US" sz="1700" dirty="0"/>
               <a:t>Number of children in foster care by state</a:t>
             </a:r>
           </a:p>
@@ -7869,23 +8332,24 @@
               <a:buAutoNum type="arabicPeriod"/>
             </a:pPr>
             <a:r>
-              <a:rPr lang="en-US" dirty="0"/>
+              <a:rPr lang="en-US" sz="1700" dirty="0"/>
               <a:t>Number of foster children who successfully graduated high school and/or completed post secondary degrees</a:t>
             </a:r>
           </a:p>
           <a:p>
             <a:r>
-              <a:rPr lang="en-US" sz="2000" i="0" dirty="0"/>
-              <a:t>We were unable to find the third dataset and had to substitute in a different dataset</a:t>
-            </a:r>
-          </a:p>
-          <a:p>
-            <a:r>
-              <a:rPr lang="en-US" dirty="0"/>
+              <a:rPr lang="en-US" sz="1700" dirty="0"/>
+              <a:t>The third data set was not formatted in a way we could use so we had to find a substitute.</a:t>
+            </a:r>
+            <a:endParaRPr lang="en-US" sz="1700" i="0" dirty="0"/>
+          </a:p>
+          <a:p>
+            <a:r>
+              <a:rPr lang="en-US" sz="1700" dirty="0"/>
               <a:t>T</a:t>
             </a:r>
             <a:r>
-              <a:rPr lang="en-US" sz="2000" i="0" dirty="0"/>
+              <a:rPr lang="en-US" sz="1700" i="0" dirty="0"/>
               <a:t>he number of high school drop-outs was available by state and could still potentially show a correlation. We will explore this more in later slides. </a:t>
             </a:r>
           </a:p>
@@ -7893,10 +8357,234 @@
             <a:pPr marL="0" indent="0">
               <a:buNone/>
             </a:pPr>
-            <a:endParaRPr lang="en-US" dirty="0"/>
-          </a:p>
-          <a:p>
-            <a:endParaRPr lang="en-US" dirty="0"/>
+            <a:endParaRPr lang="en-US" sz="1700" dirty="0"/>
+          </a:p>
+          <a:p>
+            <a:endParaRPr lang="en-US" sz="1700" dirty="0"/>
+          </a:p>
+        </p:txBody>
+      </p:sp>
+      <p:sp>
+        <p:nvSpPr>
+          <p:cNvPr id="15" name="Freeform 6">
+            <a:extLst>
+              <a:ext uri="{FF2B5EF4-FFF2-40B4-BE49-F238E27FC236}">
+                <a16:creationId xmlns:a16="http://schemas.microsoft.com/office/drawing/2014/main" id="{4E75910E-4112-4447-8981-4CA7ACEF94BA}"/>
+              </a:ext>
+              <a:ext uri="{C183D7F6-B498-43B3-948B-1728B52AA6E4}">
+                <adec:decorative xmlns:adec="http://schemas.microsoft.com/office/drawing/2017/decorative" val="1"/>
+              </a:ext>
+            </a:extLst>
+          </p:cNvPr>
+          <p:cNvSpPr>
+            <a:spLocks noGrp="1" noRot="1" noChangeAspect="1" noMove="1" noResize="1" noEditPoints="1" noAdjustHandles="1" noChangeArrowheads="1" noChangeShapeType="1" noTextEdit="1"/>
+          </p:cNvSpPr>
+          <p:nvPr>
+            <p:extLst>
+              <p:ext uri="{386F3935-93C4-4BCD-93E2-E3B085C9AB24}">
+                <p16:designElem xmlns:p16="http://schemas.microsoft.com/office/powerpoint/2015/main" val="1"/>
+              </p:ext>
+            </p:extLst>
+          </p:nvPr>
+        </p:nvSpPr>
+        <p:spPr bwMode="auto">
+          <a:xfrm>
+            <a:off x="11784011" y="5783564"/>
+            <a:ext cx="407988" cy="819150"/>
+          </a:xfrm>
+          <a:custGeom>
+            <a:avLst/>
+            <a:gdLst/>
+            <a:ahLst/>
+            <a:cxnLst/>
+            <a:rect l="0" t="0" r="r" b="b"/>
+            <a:pathLst>
+              <a:path w="1799" h="3612">
+                <a:moveTo>
+                  <a:pt x="1799" y="0"/>
+                </a:moveTo>
+                <a:lnTo>
+                  <a:pt x="1799" y="3612"/>
+                </a:lnTo>
+                <a:lnTo>
+                  <a:pt x="1686" y="3609"/>
+                </a:lnTo>
+                <a:lnTo>
+                  <a:pt x="1574" y="3598"/>
+                </a:lnTo>
+                <a:lnTo>
+                  <a:pt x="1464" y="3581"/>
+                </a:lnTo>
+                <a:lnTo>
+                  <a:pt x="1357" y="3557"/>
+                </a:lnTo>
+                <a:lnTo>
+                  <a:pt x="1251" y="3527"/>
+                </a:lnTo>
+                <a:lnTo>
+                  <a:pt x="1150" y="3490"/>
+                </a:lnTo>
+                <a:lnTo>
+                  <a:pt x="1050" y="3448"/>
+                </a:lnTo>
+                <a:lnTo>
+                  <a:pt x="953" y="3401"/>
+                </a:lnTo>
+                <a:lnTo>
+                  <a:pt x="860" y="3347"/>
+                </a:lnTo>
+                <a:lnTo>
+                  <a:pt x="771" y="3289"/>
+                </a:lnTo>
+                <a:lnTo>
+                  <a:pt x="686" y="3224"/>
+                </a:lnTo>
+                <a:lnTo>
+                  <a:pt x="604" y="3156"/>
+                </a:lnTo>
+                <a:lnTo>
+                  <a:pt x="527" y="3083"/>
+                </a:lnTo>
+                <a:lnTo>
+                  <a:pt x="454" y="3005"/>
+                </a:lnTo>
+                <a:lnTo>
+                  <a:pt x="386" y="2923"/>
+                </a:lnTo>
+                <a:lnTo>
+                  <a:pt x="323" y="2838"/>
+                </a:lnTo>
+                <a:lnTo>
+                  <a:pt x="265" y="2748"/>
+                </a:lnTo>
+                <a:lnTo>
+                  <a:pt x="211" y="2655"/>
+                </a:lnTo>
+                <a:lnTo>
+                  <a:pt x="163" y="2559"/>
+                </a:lnTo>
+                <a:lnTo>
+                  <a:pt x="121" y="2459"/>
+                </a:lnTo>
+                <a:lnTo>
+                  <a:pt x="85" y="2356"/>
+                </a:lnTo>
+                <a:lnTo>
+                  <a:pt x="55" y="2251"/>
+                </a:lnTo>
+                <a:lnTo>
+                  <a:pt x="32" y="2143"/>
+                </a:lnTo>
+                <a:lnTo>
+                  <a:pt x="14" y="2033"/>
+                </a:lnTo>
+                <a:lnTo>
+                  <a:pt x="4" y="1920"/>
+                </a:lnTo>
+                <a:lnTo>
+                  <a:pt x="0" y="1806"/>
+                </a:lnTo>
+                <a:lnTo>
+                  <a:pt x="4" y="1692"/>
+                </a:lnTo>
+                <a:lnTo>
+                  <a:pt x="14" y="1580"/>
+                </a:lnTo>
+                <a:lnTo>
+                  <a:pt x="32" y="1469"/>
+                </a:lnTo>
+                <a:lnTo>
+                  <a:pt x="55" y="1362"/>
+                </a:lnTo>
+                <a:lnTo>
+                  <a:pt x="85" y="1256"/>
+                </a:lnTo>
+                <a:lnTo>
+                  <a:pt x="121" y="1154"/>
+                </a:lnTo>
+                <a:lnTo>
+                  <a:pt x="163" y="1054"/>
+                </a:lnTo>
+                <a:lnTo>
+                  <a:pt x="211" y="958"/>
+                </a:lnTo>
+                <a:lnTo>
+                  <a:pt x="265" y="864"/>
+                </a:lnTo>
+                <a:lnTo>
+                  <a:pt x="323" y="774"/>
+                </a:lnTo>
+                <a:lnTo>
+                  <a:pt x="386" y="689"/>
+                </a:lnTo>
+                <a:lnTo>
+                  <a:pt x="454" y="607"/>
+                </a:lnTo>
+                <a:lnTo>
+                  <a:pt x="527" y="529"/>
+                </a:lnTo>
+                <a:lnTo>
+                  <a:pt x="604" y="456"/>
+                </a:lnTo>
+                <a:lnTo>
+                  <a:pt x="686" y="388"/>
+                </a:lnTo>
+                <a:lnTo>
+                  <a:pt x="771" y="325"/>
+                </a:lnTo>
+                <a:lnTo>
+                  <a:pt x="860" y="266"/>
+                </a:lnTo>
+                <a:lnTo>
+                  <a:pt x="953" y="212"/>
+                </a:lnTo>
+                <a:lnTo>
+                  <a:pt x="1050" y="164"/>
+                </a:lnTo>
+                <a:lnTo>
+                  <a:pt x="1150" y="122"/>
+                </a:lnTo>
+                <a:lnTo>
+                  <a:pt x="1251" y="85"/>
+                </a:lnTo>
+                <a:lnTo>
+                  <a:pt x="1357" y="55"/>
+                </a:lnTo>
+                <a:lnTo>
+                  <a:pt x="1464" y="32"/>
+                </a:lnTo>
+                <a:lnTo>
+                  <a:pt x="1574" y="14"/>
+                </a:lnTo>
+                <a:lnTo>
+                  <a:pt x="1686" y="5"/>
+                </a:lnTo>
+                <a:lnTo>
+                  <a:pt x="1799" y="0"/>
+                </a:lnTo>
+                <a:close/>
+              </a:path>
+            </a:pathLst>
+          </a:custGeom>
+          <a:solidFill>
+            <a:schemeClr val="tx1">
+              <a:lumMod val="85000"/>
+              <a:lumOff val="15000"/>
+            </a:schemeClr>
+          </a:solidFill>
+          <a:ln w="0">
+            <a:noFill/>
+            <a:prstDash val="solid"/>
+            <a:round/>
+            <a:headEnd/>
+            <a:tailEnd/>
+          </a:ln>
+        </p:spPr>
+        <p:txBody>
+          <a:bodyPr anchor="ctr"/>
+          <a:lstStyle/>
+          <a:p>
+            <a:endParaRPr lang="en-US"/>
           </a:p>
         </p:txBody>
       </p:sp>
@@ -7914,6 +8602,685 @@
 </file>
 
 <file path=ppt/slides/slide7.xml><?xml version="1.0" encoding="utf-8"?>
+<p:sld xmlns:a="http://schemas.openxmlformats.org/drawingml/2006/main" xmlns:r="http://schemas.openxmlformats.org/officeDocument/2006/relationships" xmlns:p="http://schemas.openxmlformats.org/presentationml/2006/main">
+  <p:cSld>
+    <p:bg>
+      <p:bgPr>
+        <a:solidFill>
+          <a:schemeClr val="bg2"/>
+        </a:solidFill>
+        <a:effectLst/>
+      </p:bgPr>
+    </p:bg>
+    <p:spTree>
+      <p:nvGrpSpPr>
+        <p:cNvPr id="1" name=""/>
+        <p:cNvGrpSpPr/>
+        <p:nvPr/>
+      </p:nvGrpSpPr>
+      <p:grpSpPr>
+        <a:xfrm>
+          <a:off x="0" y="0"/>
+          <a:ext cx="0" cy="0"/>
+          <a:chOff x="0" y="0"/>
+          <a:chExt cx="0" cy="0"/>
+        </a:xfrm>
+      </p:grpSpPr>
+      <p:sp useBgFill="1">
+        <p:nvSpPr>
+          <p:cNvPr id="18" name="Rectangle 17">
+            <a:extLst>
+              <a:ext uri="{FF2B5EF4-FFF2-40B4-BE49-F238E27FC236}">
+                <a16:creationId xmlns:a16="http://schemas.microsoft.com/office/drawing/2014/main" id="{C5176844-69C3-4F79-BE38-EA5BDDF4FEA4}"/>
+              </a:ext>
+              <a:ext uri="{C183D7F6-B498-43B3-948B-1728B52AA6E4}">
+                <adec:decorative xmlns:adec="http://schemas.microsoft.com/office/drawing/2017/decorative" val="1"/>
+              </a:ext>
+            </a:extLst>
+          </p:cNvPr>
+          <p:cNvSpPr>
+            <a:spLocks noGrp="1" noRot="1" noChangeAspect="1" noMove="1" noResize="1" noEditPoints="1" noAdjustHandles="1" noChangeArrowheads="1" noChangeShapeType="1" noTextEdit="1"/>
+          </p:cNvSpPr>
+          <p:nvPr>
+            <p:extLst>
+              <p:ext uri="{386F3935-93C4-4BCD-93E2-E3B085C9AB24}">
+                <p16:designElem xmlns:p16="http://schemas.microsoft.com/office/powerpoint/2015/main" val="1"/>
+              </p:ext>
+            </p:extLst>
+          </p:nvPr>
+        </p:nvSpPr>
+        <p:spPr>
+          <a:xfrm>
+            <a:off x="0" y="0"/>
+            <a:ext cx="12192000" cy="6858000"/>
+          </a:xfrm>
+          <a:prstGeom prst="rect">
+            <a:avLst/>
+          </a:prstGeom>
+          <a:ln>
+            <a:noFill/>
+          </a:ln>
+        </p:spPr>
+        <p:style>
+          <a:lnRef idx="2">
+            <a:schemeClr val="accent1">
+              <a:shade val="50000"/>
+            </a:schemeClr>
+          </a:lnRef>
+          <a:fillRef idx="1">
+            <a:schemeClr val="accent1"/>
+          </a:fillRef>
+          <a:effectRef idx="0">
+            <a:schemeClr val="accent1"/>
+          </a:effectRef>
+          <a:fontRef idx="minor">
+            <a:schemeClr val="lt1"/>
+          </a:fontRef>
+        </p:style>
+        <p:txBody>
+          <a:bodyPr rtlCol="0" anchor="ctr"/>
+          <a:lstStyle/>
+          <a:p>
+            <a:pPr algn="ctr"/>
+            <a:endParaRPr lang="en-US"/>
+          </a:p>
+        </p:txBody>
+      </p:sp>
+      <p:sp>
+        <p:nvSpPr>
+          <p:cNvPr id="2" name="Title 1">
+            <a:extLst>
+              <a:ext uri="{FF2B5EF4-FFF2-40B4-BE49-F238E27FC236}">
+                <a16:creationId xmlns:a16="http://schemas.microsoft.com/office/drawing/2014/main" id="{48BBF077-D08B-9768-51AF-26A60C35BB5E}"/>
+              </a:ext>
+            </a:extLst>
+          </p:cNvPr>
+          <p:cNvSpPr>
+            <a:spLocks noGrp="1"/>
+          </p:cNvSpPr>
+          <p:nvPr>
+            <p:ph type="title"/>
+          </p:nvPr>
+        </p:nvSpPr>
+        <p:spPr>
+          <a:xfrm>
+            <a:off x="5877532" y="1063255"/>
+            <a:ext cx="5312254" cy="1806727"/>
+          </a:xfrm>
+        </p:spPr>
+        <p:txBody>
+          <a:bodyPr>
+            <a:normAutofit/>
+          </a:bodyPr>
+          <a:lstStyle/>
+          <a:p>
+            <a:r>
+              <a:rPr lang="en-US" sz="5100" dirty="0"/>
+              <a:t>Method-Gathering the Data</a:t>
+            </a:r>
+          </a:p>
+        </p:txBody>
+      </p:sp>
+      <p:sp>
+        <p:nvSpPr>
+          <p:cNvPr id="20" name="Freeform: Shape 19">
+            <a:extLst>
+              <a:ext uri="{FF2B5EF4-FFF2-40B4-BE49-F238E27FC236}">
+                <a16:creationId xmlns:a16="http://schemas.microsoft.com/office/drawing/2014/main" id="{16E28E80-59C7-4175-93FA-B5F52391B6EC}"/>
+              </a:ext>
+              <a:ext uri="{C183D7F6-B498-43B3-948B-1728B52AA6E4}">
+                <adec:decorative xmlns:adec="http://schemas.microsoft.com/office/drawing/2017/decorative" val="1"/>
+              </a:ext>
+            </a:extLst>
+          </p:cNvPr>
+          <p:cNvSpPr>
+            <a:spLocks noGrp="1" noRot="1" noChangeAspect="1" noMove="1" noResize="1" noEditPoints="1" noAdjustHandles="1" noChangeArrowheads="1" noChangeShapeType="1" noTextEdit="1"/>
+          </p:cNvSpPr>
+          <p:nvPr>
+            <p:extLst>
+              <p:ext uri="{386F3935-93C4-4BCD-93E2-E3B085C9AB24}">
+                <p16:designElem xmlns:p16="http://schemas.microsoft.com/office/powerpoint/2015/main" val="1"/>
+              </p:ext>
+            </p:extLst>
+          </p:nvPr>
+        </p:nvSpPr>
+        <p:spPr>
+          <a:xfrm flipH="1">
+            <a:off x="0" y="0"/>
+            <a:ext cx="5215066" cy="6858000"/>
+          </a:xfrm>
+          <a:custGeom>
+            <a:avLst/>
+            <a:gdLst>
+              <a:gd name="connsiteX0" fmla="*/ 2017353 w 5215066"/>
+              <a:gd name="connsiteY0" fmla="*/ 0 h 6858000"/>
+              <a:gd name="connsiteX1" fmla="*/ 5215066 w 5215066"/>
+              <a:gd name="connsiteY1" fmla="*/ 0 h 6858000"/>
+              <a:gd name="connsiteX2" fmla="*/ 5215066 w 5215066"/>
+              <a:gd name="connsiteY2" fmla="*/ 6858000 h 6858000"/>
+              <a:gd name="connsiteX3" fmla="*/ 1292431 w 5215066"/>
+              <a:gd name="connsiteY3" fmla="*/ 6858000 h 6858000"/>
+              <a:gd name="connsiteX4" fmla="*/ 1012702 w 5215066"/>
+              <a:gd name="connsiteY4" fmla="*/ 6549681 h 6858000"/>
+              <a:gd name="connsiteX5" fmla="*/ 0 w 5215066"/>
+              <a:gd name="connsiteY5" fmla="*/ 3723759 h 6858000"/>
+              <a:gd name="connsiteX6" fmla="*/ 1955279 w 5215066"/>
+              <a:gd name="connsiteY6" fmla="*/ 39865 h 6858000"/>
+            </a:gdLst>
+            <a:ahLst/>
+            <a:cxnLst>
+              <a:cxn ang="0">
+                <a:pos x="connsiteX0" y="connsiteY0"/>
+              </a:cxn>
+              <a:cxn ang="0">
+                <a:pos x="connsiteX1" y="connsiteY1"/>
+              </a:cxn>
+              <a:cxn ang="0">
+                <a:pos x="connsiteX2" y="connsiteY2"/>
+              </a:cxn>
+              <a:cxn ang="0">
+                <a:pos x="connsiteX3" y="connsiteY3"/>
+              </a:cxn>
+              <a:cxn ang="0">
+                <a:pos x="connsiteX4" y="connsiteY4"/>
+              </a:cxn>
+              <a:cxn ang="0">
+                <a:pos x="connsiteX5" y="connsiteY5"/>
+              </a:cxn>
+              <a:cxn ang="0">
+                <a:pos x="connsiteX6" y="connsiteY6"/>
+              </a:cxn>
+            </a:cxnLst>
+            <a:rect l="l" t="t" r="r" b="b"/>
+            <a:pathLst>
+              <a:path w="5215066" h="6858000">
+                <a:moveTo>
+                  <a:pt x="2017353" y="0"/>
+                </a:moveTo>
+                <a:lnTo>
+                  <a:pt x="5215066" y="0"/>
+                </a:lnTo>
+                <a:lnTo>
+                  <a:pt x="5215066" y="6858000"/>
+                </a:lnTo>
+                <a:lnTo>
+                  <a:pt x="1292431" y="6858000"/>
+                </a:lnTo>
+                <a:lnTo>
+                  <a:pt x="1012702" y="6549681"/>
+                </a:lnTo>
+                <a:cubicBezTo>
+                  <a:pt x="380046" y="5781733"/>
+                  <a:pt x="0" y="4797206"/>
+                  <a:pt x="0" y="3723759"/>
+                </a:cubicBezTo>
+                <a:cubicBezTo>
+                  <a:pt x="0" y="2190263"/>
+                  <a:pt x="775604" y="838237"/>
+                  <a:pt x="1955279" y="39865"/>
+                </a:cubicBezTo>
+                <a:close/>
+              </a:path>
+            </a:pathLst>
+          </a:custGeom>
+          <a:solidFill>
+            <a:srgbClr val="FFFFFF"/>
+          </a:solidFill>
+          <a:ln>
+            <a:noFill/>
+          </a:ln>
+        </p:spPr>
+        <p:style>
+          <a:lnRef idx="2">
+            <a:schemeClr val="accent1">
+              <a:shade val="50000"/>
+            </a:schemeClr>
+          </a:lnRef>
+          <a:fillRef idx="1">
+            <a:schemeClr val="accent1"/>
+          </a:fillRef>
+          <a:effectRef idx="0">
+            <a:schemeClr val="accent1"/>
+          </a:effectRef>
+          <a:fontRef idx="minor">
+            <a:schemeClr val="lt1"/>
+          </a:fontRef>
+        </p:style>
+        <p:txBody>
+          <a:bodyPr wrap="square" rtlCol="0" anchor="ctr">
+            <a:noAutofit/>
+          </a:bodyPr>
+          <a:lstStyle/>
+          <a:p>
+            <a:pPr algn="ctr"/>
+            <a:endParaRPr lang="en-US"/>
+          </a:p>
+        </p:txBody>
+      </p:sp>
+      <p:pic>
+        <p:nvPicPr>
+          <p:cNvPr id="13" name="Picture 12">
+            <a:extLst>
+              <a:ext uri="{FF2B5EF4-FFF2-40B4-BE49-F238E27FC236}">
+                <a16:creationId xmlns:a16="http://schemas.microsoft.com/office/drawing/2014/main" id="{329C91F2-9D29-C86B-8486-A51822F78EC2}"/>
+              </a:ext>
+            </a:extLst>
+          </p:cNvPr>
+          <p:cNvPicPr>
+            <a:picLocks noChangeAspect="1"/>
+          </p:cNvPicPr>
+          <p:nvPr/>
+        </p:nvPicPr>
+        <p:blipFill>
+          <a:blip r:embed="rId2"/>
+          <a:stretch>
+            <a:fillRect/>
+          </a:stretch>
+        </p:blipFill>
+        <p:spPr>
+          <a:xfrm>
+            <a:off x="839835" y="756954"/>
+            <a:ext cx="2520195" cy="1606624"/>
+          </a:xfrm>
+          <a:prstGeom prst="rect">
+            <a:avLst/>
+          </a:prstGeom>
+        </p:spPr>
+      </p:pic>
+      <p:pic>
+        <p:nvPicPr>
+          <p:cNvPr id="11" name="Picture 10">
+            <a:extLst>
+              <a:ext uri="{FF2B5EF4-FFF2-40B4-BE49-F238E27FC236}">
+                <a16:creationId xmlns:a16="http://schemas.microsoft.com/office/drawing/2014/main" id="{5D7A9F2D-BCE9-E320-40F3-7C1F0E47F8B7}"/>
+              </a:ext>
+            </a:extLst>
+          </p:cNvPr>
+          <p:cNvPicPr>
+            <a:picLocks noChangeAspect="1"/>
+          </p:cNvPicPr>
+          <p:nvPr/>
+        </p:nvPicPr>
+        <p:blipFill>
+          <a:blip r:embed="rId3"/>
+          <a:stretch>
+            <a:fillRect/>
+          </a:stretch>
+        </p:blipFill>
+        <p:spPr>
+          <a:xfrm>
+            <a:off x="788405" y="2558817"/>
+            <a:ext cx="2623059" cy="1606624"/>
+          </a:xfrm>
+          <a:prstGeom prst="rect">
+            <a:avLst/>
+          </a:prstGeom>
+        </p:spPr>
+      </p:pic>
+      <p:cxnSp>
+        <p:nvCxnSpPr>
+          <p:cNvPr id="22" name="Straight Connector 21">
+            <a:extLst>
+              <a:ext uri="{FF2B5EF4-FFF2-40B4-BE49-F238E27FC236}">
+                <a16:creationId xmlns:a16="http://schemas.microsoft.com/office/drawing/2014/main" id="{C1FC086D-39EC-448D-97E7-FF232355AE19}"/>
+              </a:ext>
+              <a:ext uri="{C183D7F6-B498-43B3-948B-1728B52AA6E4}">
+                <adec:decorative xmlns:adec="http://schemas.microsoft.com/office/drawing/2017/decorative" val="1"/>
+              </a:ext>
+            </a:extLst>
+          </p:cNvPr>
+          <p:cNvCxnSpPr>
+            <a:cxnSpLocks noGrp="1" noRot="1" noChangeAspect="1" noMove="1" noResize="1" noEditPoints="1" noAdjustHandles="1" noChangeArrowheads="1" noChangeShapeType="1"/>
+          </p:cNvCxnSpPr>
+          <p:nvPr>
+            <p:extLst>
+              <p:ext uri="{386F3935-93C4-4BCD-93E2-E3B085C9AB24}">
+                <p16:designElem xmlns:p16="http://schemas.microsoft.com/office/powerpoint/2015/main" val="1"/>
+              </p:ext>
+            </p:extLst>
+          </p:nvPr>
+        </p:nvCxnSpPr>
+        <p:spPr>
+          <a:xfrm flipH="1">
+            <a:off x="5986332" y="3088919"/>
+            <a:ext cx="5212080" cy="0"/>
+          </a:xfrm>
+          <a:prstGeom prst="line">
+            <a:avLst/>
+          </a:prstGeom>
+          <a:ln w="19050">
+            <a:solidFill>
+              <a:schemeClr val="tx1">
+                <a:lumMod val="85000"/>
+                <a:lumOff val="15000"/>
+              </a:schemeClr>
+            </a:solidFill>
+          </a:ln>
+        </p:spPr>
+        <p:style>
+          <a:lnRef idx="1">
+            <a:schemeClr val="accent1"/>
+          </a:lnRef>
+          <a:fillRef idx="0">
+            <a:schemeClr val="accent1"/>
+          </a:fillRef>
+          <a:effectRef idx="0">
+            <a:schemeClr val="accent1"/>
+          </a:effectRef>
+          <a:fontRef idx="minor">
+            <a:schemeClr val="tx1"/>
+          </a:fontRef>
+        </p:style>
+      </p:cxnSp>
+      <p:pic>
+        <p:nvPicPr>
+          <p:cNvPr id="9" name="Picture 8">
+            <a:extLst>
+              <a:ext uri="{FF2B5EF4-FFF2-40B4-BE49-F238E27FC236}">
+                <a16:creationId xmlns:a16="http://schemas.microsoft.com/office/drawing/2014/main" id="{30E615D4-2743-782B-B564-51BD2F438C8D}"/>
+              </a:ext>
+            </a:extLst>
+          </p:cNvPr>
+          <p:cNvPicPr>
+            <a:picLocks noChangeAspect="1"/>
+          </p:cNvPicPr>
+          <p:nvPr/>
+        </p:nvPicPr>
+        <p:blipFill>
+          <a:blip r:embed="rId4"/>
+          <a:stretch>
+            <a:fillRect/>
+          </a:stretch>
+        </p:blipFill>
+        <p:spPr>
+          <a:xfrm>
+            <a:off x="777609" y="4360681"/>
+            <a:ext cx="2644649" cy="1606624"/>
+          </a:xfrm>
+          <a:prstGeom prst="rect">
+            <a:avLst/>
+          </a:prstGeom>
+        </p:spPr>
+      </p:pic>
+      <p:sp>
+        <p:nvSpPr>
+          <p:cNvPr id="3" name="Content Placeholder 2">
+            <a:extLst>
+              <a:ext uri="{FF2B5EF4-FFF2-40B4-BE49-F238E27FC236}">
+                <a16:creationId xmlns:a16="http://schemas.microsoft.com/office/drawing/2014/main" id="{DA5702B5-3424-000B-7452-F4E3A91461B7}"/>
+              </a:ext>
+            </a:extLst>
+          </p:cNvPr>
+          <p:cNvSpPr>
+            <a:spLocks noGrp="1"/>
+          </p:cNvSpPr>
+          <p:nvPr>
+            <p:ph idx="1"/>
+          </p:nvPr>
+        </p:nvSpPr>
+        <p:spPr>
+          <a:xfrm>
+            <a:off x="5877532" y="3309582"/>
+            <a:ext cx="5312254" cy="2485157"/>
+          </a:xfrm>
+        </p:spPr>
+        <p:txBody>
+          <a:bodyPr>
+            <a:normAutofit/>
+          </a:bodyPr>
+          <a:lstStyle/>
+          <a:p>
+            <a:pPr marL="0" indent="0">
+              <a:buNone/>
+            </a:pPr>
+            <a:endParaRPr lang="en-US" dirty="0"/>
+          </a:p>
+          <a:p>
+            <a:r>
+              <a:rPr lang="en-US" dirty="0"/>
+              <a:t>Initial data by state was too hard to read with 52 states represented.</a:t>
+            </a:r>
+          </a:p>
+        </p:txBody>
+      </p:sp>
+      <p:sp>
+        <p:nvSpPr>
+          <p:cNvPr id="24" name="Freeform 6">
+            <a:extLst>
+              <a:ext uri="{FF2B5EF4-FFF2-40B4-BE49-F238E27FC236}">
+                <a16:creationId xmlns:a16="http://schemas.microsoft.com/office/drawing/2014/main" id="{A101E513-AF74-4E9D-A31F-99664250722D}"/>
+              </a:ext>
+              <a:ext uri="{C183D7F6-B498-43B3-948B-1728B52AA6E4}">
+                <adec:decorative xmlns:adec="http://schemas.microsoft.com/office/drawing/2017/decorative" val="1"/>
+              </a:ext>
+            </a:extLst>
+          </p:cNvPr>
+          <p:cNvSpPr>
+            <a:spLocks noGrp="1" noRot="1" noChangeAspect="1" noMove="1" noResize="1" noEditPoints="1" noAdjustHandles="1" noChangeArrowheads="1" noChangeShapeType="1" noTextEdit="1"/>
+          </p:cNvSpPr>
+          <p:nvPr>
+            <p:extLst>
+              <p:ext uri="{386F3935-93C4-4BCD-93E2-E3B085C9AB24}">
+                <p16:designElem xmlns:p16="http://schemas.microsoft.com/office/powerpoint/2015/main" val="1"/>
+              </p:ext>
+            </p:extLst>
+          </p:nvPr>
+        </p:nvSpPr>
+        <p:spPr bwMode="auto">
+          <a:xfrm>
+            <a:off x="11784011" y="5783564"/>
+            <a:ext cx="407988" cy="819150"/>
+          </a:xfrm>
+          <a:custGeom>
+            <a:avLst/>
+            <a:gdLst/>
+            <a:ahLst/>
+            <a:cxnLst/>
+            <a:rect l="0" t="0" r="r" b="b"/>
+            <a:pathLst>
+              <a:path w="1799" h="3612">
+                <a:moveTo>
+                  <a:pt x="1799" y="0"/>
+                </a:moveTo>
+                <a:lnTo>
+                  <a:pt x="1799" y="3612"/>
+                </a:lnTo>
+                <a:lnTo>
+                  <a:pt x="1686" y="3609"/>
+                </a:lnTo>
+                <a:lnTo>
+                  <a:pt x="1574" y="3598"/>
+                </a:lnTo>
+                <a:lnTo>
+                  <a:pt x="1464" y="3581"/>
+                </a:lnTo>
+                <a:lnTo>
+                  <a:pt x="1357" y="3557"/>
+                </a:lnTo>
+                <a:lnTo>
+                  <a:pt x="1251" y="3527"/>
+                </a:lnTo>
+                <a:lnTo>
+                  <a:pt x="1150" y="3490"/>
+                </a:lnTo>
+                <a:lnTo>
+                  <a:pt x="1050" y="3448"/>
+                </a:lnTo>
+                <a:lnTo>
+                  <a:pt x="953" y="3401"/>
+                </a:lnTo>
+                <a:lnTo>
+                  <a:pt x="860" y="3347"/>
+                </a:lnTo>
+                <a:lnTo>
+                  <a:pt x="771" y="3289"/>
+                </a:lnTo>
+                <a:lnTo>
+                  <a:pt x="686" y="3224"/>
+                </a:lnTo>
+                <a:lnTo>
+                  <a:pt x="604" y="3156"/>
+                </a:lnTo>
+                <a:lnTo>
+                  <a:pt x="527" y="3083"/>
+                </a:lnTo>
+                <a:lnTo>
+                  <a:pt x="454" y="3005"/>
+                </a:lnTo>
+                <a:lnTo>
+                  <a:pt x="386" y="2923"/>
+                </a:lnTo>
+                <a:lnTo>
+                  <a:pt x="323" y="2838"/>
+                </a:lnTo>
+                <a:lnTo>
+                  <a:pt x="265" y="2748"/>
+                </a:lnTo>
+                <a:lnTo>
+                  <a:pt x="211" y="2655"/>
+                </a:lnTo>
+                <a:lnTo>
+                  <a:pt x="163" y="2559"/>
+                </a:lnTo>
+                <a:lnTo>
+                  <a:pt x="121" y="2459"/>
+                </a:lnTo>
+                <a:lnTo>
+                  <a:pt x="85" y="2356"/>
+                </a:lnTo>
+                <a:lnTo>
+                  <a:pt x="55" y="2251"/>
+                </a:lnTo>
+                <a:lnTo>
+                  <a:pt x="32" y="2143"/>
+                </a:lnTo>
+                <a:lnTo>
+                  <a:pt x="14" y="2033"/>
+                </a:lnTo>
+                <a:lnTo>
+                  <a:pt x="4" y="1920"/>
+                </a:lnTo>
+                <a:lnTo>
+                  <a:pt x="0" y="1806"/>
+                </a:lnTo>
+                <a:lnTo>
+                  <a:pt x="4" y="1692"/>
+                </a:lnTo>
+                <a:lnTo>
+                  <a:pt x="14" y="1580"/>
+                </a:lnTo>
+                <a:lnTo>
+                  <a:pt x="32" y="1469"/>
+                </a:lnTo>
+                <a:lnTo>
+                  <a:pt x="55" y="1362"/>
+                </a:lnTo>
+                <a:lnTo>
+                  <a:pt x="85" y="1256"/>
+                </a:lnTo>
+                <a:lnTo>
+                  <a:pt x="121" y="1154"/>
+                </a:lnTo>
+                <a:lnTo>
+                  <a:pt x="163" y="1054"/>
+                </a:lnTo>
+                <a:lnTo>
+                  <a:pt x="211" y="958"/>
+                </a:lnTo>
+                <a:lnTo>
+                  <a:pt x="265" y="864"/>
+                </a:lnTo>
+                <a:lnTo>
+                  <a:pt x="323" y="774"/>
+                </a:lnTo>
+                <a:lnTo>
+                  <a:pt x="386" y="689"/>
+                </a:lnTo>
+                <a:lnTo>
+                  <a:pt x="454" y="607"/>
+                </a:lnTo>
+                <a:lnTo>
+                  <a:pt x="527" y="529"/>
+                </a:lnTo>
+                <a:lnTo>
+                  <a:pt x="604" y="456"/>
+                </a:lnTo>
+                <a:lnTo>
+                  <a:pt x="686" y="388"/>
+                </a:lnTo>
+                <a:lnTo>
+                  <a:pt x="771" y="325"/>
+                </a:lnTo>
+                <a:lnTo>
+                  <a:pt x="860" y="266"/>
+                </a:lnTo>
+                <a:lnTo>
+                  <a:pt x="953" y="212"/>
+                </a:lnTo>
+                <a:lnTo>
+                  <a:pt x="1050" y="164"/>
+                </a:lnTo>
+                <a:lnTo>
+                  <a:pt x="1150" y="122"/>
+                </a:lnTo>
+                <a:lnTo>
+                  <a:pt x="1251" y="85"/>
+                </a:lnTo>
+                <a:lnTo>
+                  <a:pt x="1357" y="55"/>
+                </a:lnTo>
+                <a:lnTo>
+                  <a:pt x="1464" y="32"/>
+                </a:lnTo>
+                <a:lnTo>
+                  <a:pt x="1574" y="14"/>
+                </a:lnTo>
+                <a:lnTo>
+                  <a:pt x="1686" y="5"/>
+                </a:lnTo>
+                <a:lnTo>
+                  <a:pt x="1799" y="0"/>
+                </a:lnTo>
+                <a:close/>
+              </a:path>
+            </a:pathLst>
+          </a:custGeom>
+          <a:solidFill>
+            <a:schemeClr val="tx1">
+              <a:lumMod val="85000"/>
+              <a:lumOff val="15000"/>
+            </a:schemeClr>
+          </a:solidFill>
+          <a:ln w="0">
+            <a:noFill/>
+            <a:prstDash val="solid"/>
+            <a:round/>
+            <a:headEnd/>
+            <a:tailEnd/>
+          </a:ln>
+        </p:spPr>
+        <p:txBody>
+          <a:bodyPr anchor="ctr"/>
+          <a:lstStyle/>
+          <a:p>
+            <a:endParaRPr lang="en-US"/>
+          </a:p>
+        </p:txBody>
+      </p:sp>
+    </p:spTree>
+    <p:extLst>
+      <p:ext uri="{BB962C8B-B14F-4D97-AF65-F5344CB8AC3E}">
+        <p14:creationId xmlns:p14="http://schemas.microsoft.com/office/powerpoint/2010/main" val="3416654329"/>
+      </p:ext>
+    </p:extLst>
+  </p:cSld>
+  <p:clrMapOvr>
+    <a:masterClrMapping/>
+  </p:clrMapOvr>
+</p:sld>
+</file>
+
+<file path=ppt/slides/slide8.xml><?xml version="1.0" encoding="utf-8"?>
 <p:sld xmlns:a="http://schemas.openxmlformats.org/drawingml/2006/main" xmlns:r="http://schemas.openxmlformats.org/officeDocument/2006/relationships" xmlns:p="http://schemas.openxmlformats.org/presentationml/2006/main">
   <p:cSld>
     <p:bg>
@@ -8553,7 +9920,7 @@
 </p:sld>
 </file>
 
-<file path=ppt/slides/slide8.xml><?xml version="1.0" encoding="utf-8"?>
+<file path=ppt/slides/slide9.xml><?xml version="1.0" encoding="utf-8"?>
 <p:sld xmlns:a="http://schemas.openxmlformats.org/drawingml/2006/main" xmlns:r="http://schemas.openxmlformats.org/officeDocument/2006/relationships" xmlns:p="http://schemas.openxmlformats.org/presentationml/2006/main">
   <p:cSld>
     <p:bg>
@@ -9187,643 +10554,6 @@
     <p:extLst>
       <p:ext uri="{BB962C8B-B14F-4D97-AF65-F5344CB8AC3E}">
         <p14:creationId xmlns:p14="http://schemas.microsoft.com/office/powerpoint/2010/main" val="3577679760"/>
-      </p:ext>
-    </p:extLst>
-  </p:cSld>
-  <p:clrMapOvr>
-    <a:masterClrMapping/>
-  </p:clrMapOvr>
-</p:sld>
-</file>
-
-<file path=ppt/slides/slide9.xml><?xml version="1.0" encoding="utf-8"?>
-<p:sld xmlns:a="http://schemas.openxmlformats.org/drawingml/2006/main" xmlns:r="http://schemas.openxmlformats.org/officeDocument/2006/relationships" xmlns:p="http://schemas.openxmlformats.org/presentationml/2006/main">
-  <p:cSld>
-    <p:bg>
-      <p:bgPr>
-        <a:solidFill>
-          <a:schemeClr val="bg2"/>
-        </a:solidFill>
-        <a:effectLst/>
-      </p:bgPr>
-    </p:bg>
-    <p:spTree>
-      <p:nvGrpSpPr>
-        <p:cNvPr id="1" name=""/>
-        <p:cNvGrpSpPr/>
-        <p:nvPr/>
-      </p:nvGrpSpPr>
-      <p:grpSpPr>
-        <a:xfrm>
-          <a:off x="0" y="0"/>
-          <a:ext cx="0" cy="0"/>
-          <a:chOff x="0" y="0"/>
-          <a:chExt cx="0" cy="0"/>
-        </a:xfrm>
-      </p:grpSpPr>
-      <p:sp useBgFill="1">
-        <p:nvSpPr>
-          <p:cNvPr id="10" name="Rectangle 9">
-            <a:extLst>
-              <a:ext uri="{FF2B5EF4-FFF2-40B4-BE49-F238E27FC236}">
-                <a16:creationId xmlns:a16="http://schemas.microsoft.com/office/drawing/2014/main" id="{C5176844-69C3-4F79-BE38-EA5BDDF4FEA4}"/>
-              </a:ext>
-              <a:ext uri="{C183D7F6-B498-43B3-948B-1728B52AA6E4}">
-                <adec:decorative xmlns:adec="http://schemas.microsoft.com/office/drawing/2017/decorative" val="1"/>
-              </a:ext>
-            </a:extLst>
-          </p:cNvPr>
-          <p:cNvSpPr>
-            <a:spLocks noGrp="1" noRot="1" noChangeAspect="1" noMove="1" noResize="1" noEditPoints="1" noAdjustHandles="1" noChangeArrowheads="1" noChangeShapeType="1" noTextEdit="1"/>
-          </p:cNvSpPr>
-          <p:nvPr>
-            <p:extLst>
-              <p:ext uri="{386F3935-93C4-4BCD-93E2-E3B085C9AB24}">
-                <p16:designElem xmlns:p16="http://schemas.microsoft.com/office/powerpoint/2015/main" val="1"/>
-              </p:ext>
-            </p:extLst>
-          </p:nvPr>
-        </p:nvSpPr>
-        <p:spPr>
-          <a:xfrm>
-            <a:off x="0" y="0"/>
-            <a:ext cx="12192000" cy="6858000"/>
-          </a:xfrm>
-          <a:prstGeom prst="rect">
-            <a:avLst/>
-          </a:prstGeom>
-          <a:ln>
-            <a:noFill/>
-          </a:ln>
-        </p:spPr>
-        <p:style>
-          <a:lnRef idx="2">
-            <a:schemeClr val="accent1">
-              <a:shade val="50000"/>
-            </a:schemeClr>
-          </a:lnRef>
-          <a:fillRef idx="1">
-            <a:schemeClr val="accent1"/>
-          </a:fillRef>
-          <a:effectRef idx="0">
-            <a:schemeClr val="accent1"/>
-          </a:effectRef>
-          <a:fontRef idx="minor">
-            <a:schemeClr val="lt1"/>
-          </a:fontRef>
-        </p:style>
-        <p:txBody>
-          <a:bodyPr rtlCol="0" anchor="ctr"/>
-          <a:lstStyle/>
-          <a:p>
-            <a:pPr algn="ctr"/>
-            <a:endParaRPr lang="en-US"/>
-          </a:p>
-        </p:txBody>
-      </p:sp>
-      <p:sp>
-        <p:nvSpPr>
-          <p:cNvPr id="2" name="Title 1">
-            <a:extLst>
-              <a:ext uri="{FF2B5EF4-FFF2-40B4-BE49-F238E27FC236}">
-                <a16:creationId xmlns:a16="http://schemas.microsoft.com/office/drawing/2014/main" id="{48BBF077-D08B-9768-51AF-26A60C35BB5E}"/>
-              </a:ext>
-            </a:extLst>
-          </p:cNvPr>
-          <p:cNvSpPr>
-            <a:spLocks noGrp="1"/>
-          </p:cNvSpPr>
-          <p:nvPr>
-            <p:ph type="title"/>
-          </p:nvPr>
-        </p:nvSpPr>
-        <p:spPr>
-          <a:xfrm>
-            <a:off x="1068497" y="1063256"/>
-            <a:ext cx="5312254" cy="1540106"/>
-          </a:xfrm>
-        </p:spPr>
-        <p:txBody>
-          <a:bodyPr>
-            <a:normAutofit/>
-          </a:bodyPr>
-          <a:lstStyle/>
-          <a:p>
-            <a:r>
-              <a:rPr lang="en-US" sz="5100" dirty="0"/>
-              <a:t>Children In Foster Care</a:t>
-            </a:r>
-          </a:p>
-        </p:txBody>
-      </p:sp>
-      <p:cxnSp>
-        <p:nvCxnSpPr>
-          <p:cNvPr id="12" name="Straight Connector 11">
-            <a:extLst>
-              <a:ext uri="{FF2B5EF4-FFF2-40B4-BE49-F238E27FC236}">
-                <a16:creationId xmlns:a16="http://schemas.microsoft.com/office/drawing/2014/main" id="{33862825-C012-4895-A17E-F3D1F62D89DD}"/>
-              </a:ext>
-              <a:ext uri="{C183D7F6-B498-43B3-948B-1728B52AA6E4}">
-                <adec:decorative xmlns:adec="http://schemas.microsoft.com/office/drawing/2017/decorative" val="1"/>
-              </a:ext>
-            </a:extLst>
-          </p:cNvPr>
-          <p:cNvCxnSpPr>
-            <a:cxnSpLocks noGrp="1" noRot="1" noChangeAspect="1" noMove="1" noResize="1" noEditPoints="1" noAdjustHandles="1" noChangeArrowheads="1" noChangeShapeType="1"/>
-          </p:cNvCxnSpPr>
-          <p:nvPr>
-            <p:extLst>
-              <p:ext uri="{386F3935-93C4-4BCD-93E2-E3B085C9AB24}">
-                <p16:designElem xmlns:p16="http://schemas.microsoft.com/office/powerpoint/2015/main" val="1"/>
-              </p:ext>
-            </p:extLst>
-          </p:nvPr>
-        </p:nvCxnSpPr>
-        <p:spPr>
-          <a:xfrm>
-            <a:off x="758952" y="1143293"/>
-            <a:ext cx="0" cy="5714707"/>
-          </a:xfrm>
-          <a:prstGeom prst="line">
-            <a:avLst/>
-          </a:prstGeom>
-          <a:ln w="19050">
-            <a:solidFill>
-              <a:schemeClr val="tx1">
-                <a:lumMod val="85000"/>
-                <a:lumOff val="15000"/>
-              </a:schemeClr>
-            </a:solidFill>
-          </a:ln>
-        </p:spPr>
-        <p:style>
-          <a:lnRef idx="1">
-            <a:schemeClr val="accent1"/>
-          </a:lnRef>
-          <a:fillRef idx="0">
-            <a:schemeClr val="accent1"/>
-          </a:fillRef>
-          <a:effectRef idx="0">
-            <a:schemeClr val="accent1"/>
-          </a:effectRef>
-          <a:fontRef idx="minor">
-            <a:schemeClr val="tx1"/>
-          </a:fontRef>
-        </p:style>
-      </p:cxnSp>
-      <p:sp>
-        <p:nvSpPr>
-          <p:cNvPr id="3" name="Content Placeholder 2">
-            <a:extLst>
-              <a:ext uri="{FF2B5EF4-FFF2-40B4-BE49-F238E27FC236}">
-                <a16:creationId xmlns:a16="http://schemas.microsoft.com/office/drawing/2014/main" id="{DA5702B5-3424-000B-7452-F4E3A91461B7}"/>
-              </a:ext>
-            </a:extLst>
-          </p:cNvPr>
-          <p:cNvSpPr>
-            <a:spLocks noGrp="1"/>
-          </p:cNvSpPr>
-          <p:nvPr>
-            <p:ph idx="1"/>
-          </p:nvPr>
-        </p:nvSpPr>
-        <p:spPr>
-          <a:xfrm>
-            <a:off x="1068497" y="2933390"/>
-            <a:ext cx="5312254" cy="2861349"/>
-          </a:xfrm>
-        </p:spPr>
-        <p:txBody>
-          <a:bodyPr>
-            <a:normAutofit/>
-          </a:bodyPr>
-          <a:lstStyle/>
-          <a:p>
-            <a:r>
-              <a:rPr lang="en-US" sz="1900" dirty="0"/>
-              <a:t>We pulled the data from datacenter.aef.org.</a:t>
-            </a:r>
-          </a:p>
-          <a:p>
-            <a:r>
-              <a:rPr lang="en-US" sz="1900" dirty="0"/>
-              <a:t>Data was presented by state and year. </a:t>
-            </a:r>
-          </a:p>
-          <a:p>
-            <a:r>
-              <a:rPr lang="en-US" sz="1900" dirty="0"/>
-              <a:t>Overall, the number of dropouts has decreases significantly between 2004 and 2020 and is predicted to continue this downward trend. </a:t>
-            </a:r>
-          </a:p>
-          <a:p>
-            <a:endParaRPr lang="en-US" sz="1900" dirty="0"/>
-          </a:p>
-          <a:p>
-            <a:endParaRPr lang="en-US" sz="1900" dirty="0"/>
-          </a:p>
-        </p:txBody>
-      </p:sp>
-      <p:sp>
-        <p:nvSpPr>
-          <p:cNvPr id="14" name="Freeform: Shape 13">
-            <a:extLst>
-              <a:ext uri="{FF2B5EF4-FFF2-40B4-BE49-F238E27FC236}">
-                <a16:creationId xmlns:a16="http://schemas.microsoft.com/office/drawing/2014/main" id="{F76C355F-28BE-46B1-9B8D-5D71A48155D3}"/>
-              </a:ext>
-              <a:ext uri="{C183D7F6-B498-43B3-948B-1728B52AA6E4}">
-                <adec:decorative xmlns:adec="http://schemas.microsoft.com/office/drawing/2017/decorative" val="1"/>
-              </a:ext>
-            </a:extLst>
-          </p:cNvPr>
-          <p:cNvSpPr>
-            <a:spLocks noGrp="1" noRot="1" noChangeAspect="1" noMove="1" noResize="1" noEditPoints="1" noAdjustHandles="1" noChangeArrowheads="1" noChangeShapeType="1" noTextEdit="1"/>
-          </p:cNvSpPr>
-          <p:nvPr>
-            <p:extLst>
-              <p:ext uri="{386F3935-93C4-4BCD-93E2-E3B085C9AB24}">
-                <p16:designElem xmlns:p16="http://schemas.microsoft.com/office/powerpoint/2015/main" val="1"/>
-              </p:ext>
-            </p:extLst>
-          </p:nvPr>
-        </p:nvSpPr>
-        <p:spPr>
-          <a:xfrm>
-            <a:off x="6976934" y="0"/>
-            <a:ext cx="5215066" cy="6858000"/>
-          </a:xfrm>
-          <a:custGeom>
-            <a:avLst/>
-            <a:gdLst>
-              <a:gd name="connsiteX0" fmla="*/ 2017353 w 5215066"/>
-              <a:gd name="connsiteY0" fmla="*/ 0 h 6858000"/>
-              <a:gd name="connsiteX1" fmla="*/ 5215066 w 5215066"/>
-              <a:gd name="connsiteY1" fmla="*/ 0 h 6858000"/>
-              <a:gd name="connsiteX2" fmla="*/ 5215066 w 5215066"/>
-              <a:gd name="connsiteY2" fmla="*/ 6858000 h 6858000"/>
-              <a:gd name="connsiteX3" fmla="*/ 1292431 w 5215066"/>
-              <a:gd name="connsiteY3" fmla="*/ 6858000 h 6858000"/>
-              <a:gd name="connsiteX4" fmla="*/ 1012702 w 5215066"/>
-              <a:gd name="connsiteY4" fmla="*/ 6549681 h 6858000"/>
-              <a:gd name="connsiteX5" fmla="*/ 0 w 5215066"/>
-              <a:gd name="connsiteY5" fmla="*/ 3723759 h 6858000"/>
-              <a:gd name="connsiteX6" fmla="*/ 1955279 w 5215066"/>
-              <a:gd name="connsiteY6" fmla="*/ 39865 h 6858000"/>
-            </a:gdLst>
-            <a:ahLst/>
-            <a:cxnLst>
-              <a:cxn ang="0">
-                <a:pos x="connsiteX0" y="connsiteY0"/>
-              </a:cxn>
-              <a:cxn ang="0">
-                <a:pos x="connsiteX1" y="connsiteY1"/>
-              </a:cxn>
-              <a:cxn ang="0">
-                <a:pos x="connsiteX2" y="connsiteY2"/>
-              </a:cxn>
-              <a:cxn ang="0">
-                <a:pos x="connsiteX3" y="connsiteY3"/>
-              </a:cxn>
-              <a:cxn ang="0">
-                <a:pos x="connsiteX4" y="connsiteY4"/>
-              </a:cxn>
-              <a:cxn ang="0">
-                <a:pos x="connsiteX5" y="connsiteY5"/>
-              </a:cxn>
-              <a:cxn ang="0">
-                <a:pos x="connsiteX6" y="connsiteY6"/>
-              </a:cxn>
-            </a:cxnLst>
-            <a:rect l="l" t="t" r="r" b="b"/>
-            <a:pathLst>
-              <a:path w="5215066" h="6858000">
-                <a:moveTo>
-                  <a:pt x="2017353" y="0"/>
-                </a:moveTo>
-                <a:lnTo>
-                  <a:pt x="5215066" y="0"/>
-                </a:lnTo>
-                <a:lnTo>
-                  <a:pt x="5215066" y="6858000"/>
-                </a:lnTo>
-                <a:lnTo>
-                  <a:pt x="1292431" y="6858000"/>
-                </a:lnTo>
-                <a:lnTo>
-                  <a:pt x="1012702" y="6549681"/>
-                </a:lnTo>
-                <a:cubicBezTo>
-                  <a:pt x="380046" y="5781733"/>
-                  <a:pt x="0" y="4797206"/>
-                  <a:pt x="0" y="3723759"/>
-                </a:cubicBezTo>
-                <a:cubicBezTo>
-                  <a:pt x="0" y="2190263"/>
-                  <a:pt x="775604" y="838237"/>
-                  <a:pt x="1955279" y="39865"/>
-                </a:cubicBezTo>
-                <a:close/>
-              </a:path>
-            </a:pathLst>
-          </a:custGeom>
-          <a:solidFill>
-            <a:schemeClr val="bg1"/>
-          </a:solidFill>
-          <a:ln>
-            <a:noFill/>
-          </a:ln>
-        </p:spPr>
-        <p:style>
-          <a:lnRef idx="2">
-            <a:schemeClr val="accent1">
-              <a:shade val="50000"/>
-            </a:schemeClr>
-          </a:lnRef>
-          <a:fillRef idx="1">
-            <a:schemeClr val="accent1"/>
-          </a:fillRef>
-          <a:effectRef idx="0">
-            <a:schemeClr val="accent1"/>
-          </a:effectRef>
-          <a:fontRef idx="minor">
-            <a:schemeClr val="lt1"/>
-          </a:fontRef>
-        </p:style>
-        <p:txBody>
-          <a:bodyPr wrap="square" rtlCol="0" anchor="ctr">
-            <a:noAutofit/>
-          </a:bodyPr>
-          <a:lstStyle/>
-          <a:p>
-            <a:pPr algn="ctr"/>
-            <a:endParaRPr lang="en-US"/>
-          </a:p>
-        </p:txBody>
-      </p:sp>
-      <p:pic>
-        <p:nvPicPr>
-          <p:cNvPr id="5" name="Picture 4" descr="A graph with a line graph&#10;&#10;Description automatically generated with medium confidence">
-            <a:extLst>
-              <a:ext uri="{FF2B5EF4-FFF2-40B4-BE49-F238E27FC236}">
-                <a16:creationId xmlns:a16="http://schemas.microsoft.com/office/drawing/2014/main" id="{C48D21E1-3383-36A5-CF05-F05116A9D3BC}"/>
-              </a:ext>
-            </a:extLst>
-          </p:cNvPr>
-          <p:cNvPicPr>
-            <a:picLocks noChangeAspect="1"/>
-          </p:cNvPicPr>
-          <p:nvPr/>
-        </p:nvPicPr>
-        <p:blipFill>
-          <a:blip r:embed="rId2">
-            <a:extLst>
-              <a:ext uri="{28A0092B-C50C-407E-A947-70E740481C1C}">
-                <a14:useLocalDpi xmlns:a14="http://schemas.microsoft.com/office/drawing/2010/main" val="0"/>
-              </a:ext>
-            </a:extLst>
-          </a:blip>
-          <a:stretch>
-            <a:fillRect/>
-          </a:stretch>
-        </p:blipFill>
-        <p:spPr>
-          <a:xfrm>
-            <a:off x="7212039" y="2363763"/>
-            <a:ext cx="4824017" cy="2858229"/>
-          </a:xfrm>
-          <a:prstGeom prst="rect">
-            <a:avLst/>
-          </a:prstGeom>
-        </p:spPr>
-      </p:pic>
-      <p:sp>
-        <p:nvSpPr>
-          <p:cNvPr id="16" name="Freeform 6">
-            <a:extLst>
-              <a:ext uri="{FF2B5EF4-FFF2-40B4-BE49-F238E27FC236}">
-                <a16:creationId xmlns:a16="http://schemas.microsoft.com/office/drawing/2014/main" id="{A101E513-AF74-4E9D-A31F-99664250722D}"/>
-              </a:ext>
-              <a:ext uri="{C183D7F6-B498-43B3-948B-1728B52AA6E4}">
-                <adec:decorative xmlns:adec="http://schemas.microsoft.com/office/drawing/2017/decorative" val="1"/>
-              </a:ext>
-            </a:extLst>
-          </p:cNvPr>
-          <p:cNvSpPr>
-            <a:spLocks noGrp="1" noRot="1" noChangeAspect="1" noMove="1" noResize="1" noEditPoints="1" noAdjustHandles="1" noChangeArrowheads="1" noChangeShapeType="1" noTextEdit="1"/>
-          </p:cNvSpPr>
-          <p:nvPr>
-            <p:extLst>
-              <p:ext uri="{386F3935-93C4-4BCD-93E2-E3B085C9AB24}">
-                <p16:designElem xmlns:p16="http://schemas.microsoft.com/office/powerpoint/2015/main" val="1"/>
-              </p:ext>
-            </p:extLst>
-          </p:nvPr>
-        </p:nvSpPr>
-        <p:spPr bwMode="auto">
-          <a:xfrm>
-            <a:off x="11784011" y="5783564"/>
-            <a:ext cx="407988" cy="819150"/>
-          </a:xfrm>
-          <a:custGeom>
-            <a:avLst/>
-            <a:gdLst/>
-            <a:ahLst/>
-            <a:cxnLst/>
-            <a:rect l="0" t="0" r="r" b="b"/>
-            <a:pathLst>
-              <a:path w="1799" h="3612">
-                <a:moveTo>
-                  <a:pt x="1799" y="0"/>
-                </a:moveTo>
-                <a:lnTo>
-                  <a:pt x="1799" y="3612"/>
-                </a:lnTo>
-                <a:lnTo>
-                  <a:pt x="1686" y="3609"/>
-                </a:lnTo>
-                <a:lnTo>
-                  <a:pt x="1574" y="3598"/>
-                </a:lnTo>
-                <a:lnTo>
-                  <a:pt x="1464" y="3581"/>
-                </a:lnTo>
-                <a:lnTo>
-                  <a:pt x="1357" y="3557"/>
-                </a:lnTo>
-                <a:lnTo>
-                  <a:pt x="1251" y="3527"/>
-                </a:lnTo>
-                <a:lnTo>
-                  <a:pt x="1150" y="3490"/>
-                </a:lnTo>
-                <a:lnTo>
-                  <a:pt x="1050" y="3448"/>
-                </a:lnTo>
-                <a:lnTo>
-                  <a:pt x="953" y="3401"/>
-                </a:lnTo>
-                <a:lnTo>
-                  <a:pt x="860" y="3347"/>
-                </a:lnTo>
-                <a:lnTo>
-                  <a:pt x="771" y="3289"/>
-                </a:lnTo>
-                <a:lnTo>
-                  <a:pt x="686" y="3224"/>
-                </a:lnTo>
-                <a:lnTo>
-                  <a:pt x="604" y="3156"/>
-                </a:lnTo>
-                <a:lnTo>
-                  <a:pt x="527" y="3083"/>
-                </a:lnTo>
-                <a:lnTo>
-                  <a:pt x="454" y="3005"/>
-                </a:lnTo>
-                <a:lnTo>
-                  <a:pt x="386" y="2923"/>
-                </a:lnTo>
-                <a:lnTo>
-                  <a:pt x="323" y="2838"/>
-                </a:lnTo>
-                <a:lnTo>
-                  <a:pt x="265" y="2748"/>
-                </a:lnTo>
-                <a:lnTo>
-                  <a:pt x="211" y="2655"/>
-                </a:lnTo>
-                <a:lnTo>
-                  <a:pt x="163" y="2559"/>
-                </a:lnTo>
-                <a:lnTo>
-                  <a:pt x="121" y="2459"/>
-                </a:lnTo>
-                <a:lnTo>
-                  <a:pt x="85" y="2356"/>
-                </a:lnTo>
-                <a:lnTo>
-                  <a:pt x="55" y="2251"/>
-                </a:lnTo>
-                <a:lnTo>
-                  <a:pt x="32" y="2143"/>
-                </a:lnTo>
-                <a:lnTo>
-                  <a:pt x="14" y="2033"/>
-                </a:lnTo>
-                <a:lnTo>
-                  <a:pt x="4" y="1920"/>
-                </a:lnTo>
-                <a:lnTo>
-                  <a:pt x="0" y="1806"/>
-                </a:lnTo>
-                <a:lnTo>
-                  <a:pt x="4" y="1692"/>
-                </a:lnTo>
-                <a:lnTo>
-                  <a:pt x="14" y="1580"/>
-                </a:lnTo>
-                <a:lnTo>
-                  <a:pt x="32" y="1469"/>
-                </a:lnTo>
-                <a:lnTo>
-                  <a:pt x="55" y="1362"/>
-                </a:lnTo>
-                <a:lnTo>
-                  <a:pt x="85" y="1256"/>
-                </a:lnTo>
-                <a:lnTo>
-                  <a:pt x="121" y="1154"/>
-                </a:lnTo>
-                <a:lnTo>
-                  <a:pt x="163" y="1054"/>
-                </a:lnTo>
-                <a:lnTo>
-                  <a:pt x="211" y="958"/>
-                </a:lnTo>
-                <a:lnTo>
-                  <a:pt x="265" y="864"/>
-                </a:lnTo>
-                <a:lnTo>
-                  <a:pt x="323" y="774"/>
-                </a:lnTo>
-                <a:lnTo>
-                  <a:pt x="386" y="689"/>
-                </a:lnTo>
-                <a:lnTo>
-                  <a:pt x="454" y="607"/>
-                </a:lnTo>
-                <a:lnTo>
-                  <a:pt x="527" y="529"/>
-                </a:lnTo>
-                <a:lnTo>
-                  <a:pt x="604" y="456"/>
-                </a:lnTo>
-                <a:lnTo>
-                  <a:pt x="686" y="388"/>
-                </a:lnTo>
-                <a:lnTo>
-                  <a:pt x="771" y="325"/>
-                </a:lnTo>
-                <a:lnTo>
-                  <a:pt x="860" y="266"/>
-                </a:lnTo>
-                <a:lnTo>
-                  <a:pt x="953" y="212"/>
-                </a:lnTo>
-                <a:lnTo>
-                  <a:pt x="1050" y="164"/>
-                </a:lnTo>
-                <a:lnTo>
-                  <a:pt x="1150" y="122"/>
-                </a:lnTo>
-                <a:lnTo>
-                  <a:pt x="1251" y="85"/>
-                </a:lnTo>
-                <a:lnTo>
-                  <a:pt x="1357" y="55"/>
-                </a:lnTo>
-                <a:lnTo>
-                  <a:pt x="1464" y="32"/>
-                </a:lnTo>
-                <a:lnTo>
-                  <a:pt x="1574" y="14"/>
-                </a:lnTo>
-                <a:lnTo>
-                  <a:pt x="1686" y="5"/>
-                </a:lnTo>
-                <a:lnTo>
-                  <a:pt x="1799" y="0"/>
-                </a:lnTo>
-                <a:close/>
-              </a:path>
-            </a:pathLst>
-          </a:custGeom>
-          <a:solidFill>
-            <a:schemeClr val="tx1">
-              <a:lumMod val="85000"/>
-              <a:lumOff val="15000"/>
-            </a:schemeClr>
-          </a:solidFill>
-          <a:ln w="0">
-            <a:noFill/>
-            <a:prstDash val="solid"/>
-            <a:round/>
-            <a:headEnd/>
-            <a:tailEnd/>
-          </a:ln>
-        </p:spPr>
-        <p:txBody>
-          <a:bodyPr anchor="ctr"/>
-          <a:lstStyle/>
-          <a:p>
-            <a:endParaRPr lang="en-US"/>
-          </a:p>
-        </p:txBody>
-      </p:sp>
-    </p:spTree>
-    <p:extLst>
-      <p:ext uri="{BB962C8B-B14F-4D97-AF65-F5344CB8AC3E}">
-        <p14:creationId xmlns:p14="http://schemas.microsoft.com/office/powerpoint/2010/main" val="1074360358"/>
       </p:ext>
     </p:extLst>
   </p:cSld>

</xml_diff>

<commit_message>
Added screenshot of initial dataframe
</commit_message>
<xml_diff>
--- a/Resources/Project1_Presentation.pptx
+++ b/Resources/Project1_Presentation.pptx
@@ -139,7 +139,7 @@
   <pc:docChgLst>
     <pc:chgData name="Clayton Graves" userId="3223012b48fe14f7" providerId="LiveId" clId="{561EC942-CAEB-4FA9-8C6A-D1A1D87D5A05}"/>
     <pc:docChg chg="undo custSel addSld delSld modSld sldOrd">
-      <pc:chgData name="Clayton Graves" userId="3223012b48fe14f7" providerId="LiveId" clId="{561EC942-CAEB-4FA9-8C6A-D1A1D87D5A05}" dt="2024-01-09T03:32:45.917" v="374" actId="27614"/>
+      <pc:chgData name="Clayton Graves" userId="3223012b48fe14f7" providerId="LiveId" clId="{561EC942-CAEB-4FA9-8C6A-D1A1D87D5A05}" dt="2024-01-11T01:47:40.077" v="377" actId="26606"/>
       <pc:docMkLst>
         <pc:docMk/>
       </pc:docMkLst>
@@ -404,7 +404,7 @@
         </pc:cxnChg>
       </pc:sldChg>
       <pc:sldChg chg="addSp delSp modSp mod modTransition setBg">
-        <pc:chgData name="Clayton Graves" userId="3223012b48fe14f7" providerId="LiveId" clId="{561EC942-CAEB-4FA9-8C6A-D1A1D87D5A05}" dt="2024-01-09T03:08:38.945" v="355"/>
+        <pc:chgData name="Clayton Graves" userId="3223012b48fe14f7" providerId="LiveId" clId="{561EC942-CAEB-4FA9-8C6A-D1A1D87D5A05}" dt="2024-01-11T01:47:40.077" v="377" actId="26606"/>
         <pc:sldMkLst>
           <pc:docMk/>
           <pc:sldMk cId="1421390050" sldId="260"/>
@@ -449,28 +449,52 @@
             <ac:spMk id="15" creationId="{4E75910E-4112-4447-8981-4CA7ACEF94BA}"/>
           </ac:spMkLst>
         </pc:spChg>
-        <pc:spChg chg="add">
-          <ac:chgData name="Clayton Graves" userId="3223012b48fe14f7" providerId="LiveId" clId="{561EC942-CAEB-4FA9-8C6A-D1A1D87D5A05}" dt="2024-01-09T03:05:46.902" v="345" actId="26606"/>
+        <pc:spChg chg="add del">
+          <ac:chgData name="Clayton Graves" userId="3223012b48fe14f7" providerId="LiveId" clId="{561EC942-CAEB-4FA9-8C6A-D1A1D87D5A05}" dt="2024-01-11T01:47:40.077" v="377" actId="26606"/>
           <ac:spMkLst>
             <pc:docMk/>
             <pc:sldMk cId="1421390050" sldId="260"/>
             <ac:spMk id="20" creationId="{C5176844-69C3-4F79-BE38-EA5BDDF4FEA4}"/>
           </ac:spMkLst>
         </pc:spChg>
-        <pc:spChg chg="add">
-          <ac:chgData name="Clayton Graves" userId="3223012b48fe14f7" providerId="LiveId" clId="{561EC942-CAEB-4FA9-8C6A-D1A1D87D5A05}" dt="2024-01-09T03:05:46.902" v="345" actId="26606"/>
+        <pc:spChg chg="add del">
+          <ac:chgData name="Clayton Graves" userId="3223012b48fe14f7" providerId="LiveId" clId="{561EC942-CAEB-4FA9-8C6A-D1A1D87D5A05}" dt="2024-01-11T01:47:40.077" v="377" actId="26606"/>
           <ac:spMkLst>
             <pc:docMk/>
             <pc:sldMk cId="1421390050" sldId="260"/>
             <ac:spMk id="24" creationId="{A101E513-AF74-4E9D-A31F-99664250722D}"/>
           </ac:spMkLst>
         </pc:spChg>
-        <pc:picChg chg="add mod ord">
-          <ac:chgData name="Clayton Graves" userId="3223012b48fe14f7" providerId="LiveId" clId="{561EC942-CAEB-4FA9-8C6A-D1A1D87D5A05}" dt="2024-01-09T03:05:46.902" v="345" actId="26606"/>
+        <pc:spChg chg="add">
+          <ac:chgData name="Clayton Graves" userId="3223012b48fe14f7" providerId="LiveId" clId="{561EC942-CAEB-4FA9-8C6A-D1A1D87D5A05}" dt="2024-01-11T01:47:40.077" v="377" actId="26606"/>
+          <ac:spMkLst>
+            <pc:docMk/>
+            <pc:sldMk cId="1421390050" sldId="260"/>
+            <ac:spMk id="29" creationId="{C5176844-69C3-4F79-BE38-EA5BDDF4FEA4}"/>
+          </ac:spMkLst>
+        </pc:spChg>
+        <pc:spChg chg="add">
+          <ac:chgData name="Clayton Graves" userId="3223012b48fe14f7" providerId="LiveId" clId="{561EC942-CAEB-4FA9-8C6A-D1A1D87D5A05}" dt="2024-01-11T01:47:40.077" v="377" actId="26606"/>
+          <ac:spMkLst>
+            <pc:docMk/>
+            <pc:sldMk cId="1421390050" sldId="260"/>
+            <ac:spMk id="33" creationId="{A101E513-AF74-4E9D-A31F-99664250722D}"/>
+          </ac:spMkLst>
+        </pc:spChg>
+        <pc:picChg chg="add del mod ord">
+          <ac:chgData name="Clayton Graves" userId="3223012b48fe14f7" providerId="LiveId" clId="{561EC942-CAEB-4FA9-8C6A-D1A1D87D5A05}" dt="2024-01-11T01:47:35.054" v="376" actId="478"/>
           <ac:picMkLst>
             <pc:docMk/>
             <pc:sldMk cId="1421390050" sldId="260"/>
             <ac:picMk id="5" creationId="{405118D7-9E74-37FD-940E-87807F24C9DE}"/>
+          </ac:picMkLst>
+        </pc:picChg>
+        <pc:picChg chg="add mod">
+          <ac:chgData name="Clayton Graves" userId="3223012b48fe14f7" providerId="LiveId" clId="{561EC942-CAEB-4FA9-8C6A-D1A1D87D5A05}" dt="2024-01-11T01:47:40.077" v="377" actId="26606"/>
+          <ac:picMkLst>
+            <pc:docMk/>
+            <pc:sldMk cId="1421390050" sldId="260"/>
+            <ac:picMk id="6" creationId="{D8AC45CB-B224-B90A-07A3-FF9DEDC5051A}"/>
           </ac:picMkLst>
         </pc:picChg>
         <pc:cxnChg chg="add del">
@@ -481,12 +505,20 @@
             <ac:cxnSpMk id="13" creationId="{081E1E49-F752-49CA-BFF6-1303B0A8AA03}"/>
           </ac:cxnSpMkLst>
         </pc:cxnChg>
-        <pc:cxnChg chg="add">
-          <ac:chgData name="Clayton Graves" userId="3223012b48fe14f7" providerId="LiveId" clId="{561EC942-CAEB-4FA9-8C6A-D1A1D87D5A05}" dt="2024-01-09T03:05:46.902" v="345" actId="26606"/>
+        <pc:cxnChg chg="add del">
+          <ac:chgData name="Clayton Graves" userId="3223012b48fe14f7" providerId="LiveId" clId="{561EC942-CAEB-4FA9-8C6A-D1A1D87D5A05}" dt="2024-01-11T01:47:40.077" v="377" actId="26606"/>
           <ac:cxnSpMkLst>
             <pc:docMk/>
             <pc:sldMk cId="1421390050" sldId="260"/>
             <ac:cxnSpMk id="22" creationId="{33862825-C012-4895-A17E-F3D1F62D89DD}"/>
+          </ac:cxnSpMkLst>
+        </pc:cxnChg>
+        <pc:cxnChg chg="add">
+          <ac:chgData name="Clayton Graves" userId="3223012b48fe14f7" providerId="LiveId" clId="{561EC942-CAEB-4FA9-8C6A-D1A1D87D5A05}" dt="2024-01-11T01:47:40.077" v="377" actId="26606"/>
+          <ac:cxnSpMkLst>
+            <pc:docMk/>
+            <pc:sldMk cId="1421390050" sldId="260"/>
+            <ac:cxnSpMk id="31" creationId="{33862825-C012-4895-A17E-F3D1F62D89DD}"/>
           </ac:cxnSpMkLst>
         </pc:cxnChg>
       </pc:sldChg>
@@ -13230,7 +13262,7 @@
           <a:p>
             <a:fld id="{53BEF823-48A5-43FC-BE03-E79964288B41}" type="datetimeFigureOut">
               <a:rPr lang="en-US" smtClean="0"/>
-              <a:t>1/8/2024</a:t>
+              <a:t>1/10/2024</a:t>
             </a:fld>
             <a:endParaRPr lang="en-US" dirty="0"/>
           </a:p>
@@ -13441,7 +13473,7 @@
             <a:fld id="{53BEF823-48A5-43FC-BE03-E79964288B41}" type="datetimeFigureOut">
               <a:rPr lang="en-US" smtClean="0"/>
               <a:pPr algn="r"/>
-              <a:t>1/8/2024</a:t>
+              <a:t>1/10/2024</a:t>
             </a:fld>
             <a:endParaRPr lang="en-US" dirty="0"/>
           </a:p>
@@ -13656,7 +13688,7 @@
             <a:fld id="{53BEF823-48A5-43FC-BE03-E79964288B41}" type="datetimeFigureOut">
               <a:rPr lang="en-US" smtClean="0"/>
               <a:pPr algn="r"/>
-              <a:t>1/8/2024</a:t>
+              <a:t>1/10/2024</a:t>
             </a:fld>
             <a:endParaRPr lang="en-US" dirty="0"/>
           </a:p>
@@ -13859,7 +13891,7 @@
             <a:fld id="{53BEF823-48A5-43FC-BE03-E79964288B41}" type="datetimeFigureOut">
               <a:rPr lang="en-US" smtClean="0"/>
               <a:pPr algn="r"/>
-              <a:t>1/8/2024</a:t>
+              <a:t>1/10/2024</a:t>
             </a:fld>
             <a:endParaRPr lang="en-US" dirty="0"/>
           </a:p>
@@ -14143,7 +14175,7 @@
             <a:fld id="{53BEF823-48A5-43FC-BE03-E79964288B41}" type="datetimeFigureOut">
               <a:rPr lang="en-US" smtClean="0"/>
               <a:pPr algn="r"/>
-              <a:t>1/8/2024</a:t>
+              <a:t>1/10/2024</a:t>
             </a:fld>
             <a:endParaRPr lang="en-US" dirty="0"/>
           </a:p>
@@ -14387,7 +14419,7 @@
             <a:fld id="{53BEF823-48A5-43FC-BE03-E79964288B41}" type="datetimeFigureOut">
               <a:rPr lang="en-US" smtClean="0"/>
               <a:pPr algn="r"/>
-              <a:t>1/8/2024</a:t>
+              <a:t>1/10/2024</a:t>
             </a:fld>
             <a:endParaRPr lang="en-US" dirty="0"/>
           </a:p>
@@ -14830,7 +14862,7 @@
             <a:fld id="{53BEF823-48A5-43FC-BE03-E79964288B41}" type="datetimeFigureOut">
               <a:rPr lang="en-US" smtClean="0"/>
               <a:pPr algn="r"/>
-              <a:t>1/8/2024</a:t>
+              <a:t>1/10/2024</a:t>
             </a:fld>
             <a:endParaRPr lang="en-US" dirty="0"/>
           </a:p>
@@ -14976,7 +15008,7 @@
             <a:fld id="{53BEF823-48A5-43FC-BE03-E79964288B41}" type="datetimeFigureOut">
               <a:rPr lang="en-US" smtClean="0"/>
               <a:pPr algn="r"/>
-              <a:t>1/8/2024</a:t>
+              <a:t>1/10/2024</a:t>
             </a:fld>
             <a:endParaRPr lang="en-US" dirty="0"/>
           </a:p>
@@ -15094,7 +15126,7 @@
             <a:fld id="{53BEF823-48A5-43FC-BE03-E79964288B41}" type="datetimeFigureOut">
               <a:rPr lang="en-US" smtClean="0"/>
               <a:pPr algn="r"/>
-              <a:t>1/8/2024</a:t>
+              <a:t>1/10/2024</a:t>
             </a:fld>
             <a:endParaRPr lang="en-US" dirty="0"/>
           </a:p>
@@ -15378,7 +15410,7 @@
             <a:fld id="{53BEF823-48A5-43FC-BE03-E79964288B41}" type="datetimeFigureOut">
               <a:rPr lang="en-US" smtClean="0"/>
               <a:pPr algn="r"/>
-              <a:t>1/8/2024</a:t>
+              <a:t>1/10/2024</a:t>
             </a:fld>
             <a:endParaRPr lang="en-US" dirty="0"/>
           </a:p>
@@ -15673,7 +15705,7 @@
             <a:fld id="{53BEF823-48A5-43FC-BE03-E79964288B41}" type="datetimeFigureOut">
               <a:rPr lang="en-US" smtClean="0"/>
               <a:pPr algn="r"/>
-              <a:t>1/8/2024</a:t>
+              <a:t>1/10/2024</a:t>
             </a:fld>
             <a:endParaRPr lang="en-US" dirty="0"/>
           </a:p>
@@ -16168,7 +16200,7 @@
             <a:fld id="{53BEF823-48A5-43FC-BE03-E79964288B41}" type="datetimeFigureOut">
               <a:rPr lang="en-US" smtClean="0"/>
               <a:pPr algn="r"/>
-              <a:t>1/8/2024</a:t>
+              <a:t>1/10/2024</a:t>
             </a:fld>
             <a:endParaRPr lang="en-US" dirty="0"/>
           </a:p>
@@ -17182,13 +17214,13 @@
   <p:clrMapOvr>
     <a:masterClrMapping/>
   </p:clrMapOvr>
-  <mc:AlternateContent xmlns:mc="http://schemas.openxmlformats.org/markup-compatibility/2006">
-    <mc:Choice xmlns:p14="http://schemas.microsoft.com/office/powerpoint/2010/main" Requires="p14">
+  <mc:AlternateContent xmlns:mc="http://schemas.openxmlformats.org/markup-compatibility/2006" xmlns:p14="http://schemas.microsoft.com/office/powerpoint/2010/main">
+    <mc:Choice Requires="p14">
       <p:transition spd="med" p14:dur="700">
         <p:fade/>
       </p:transition>
     </mc:Choice>
-    <mc:Fallback>
+    <mc:Fallback xmlns="">
       <p:transition spd="med">
         <p:fade/>
       </p:transition>
@@ -17826,13 +17858,13 @@
   <p:clrMapOvr>
     <a:masterClrMapping/>
   </p:clrMapOvr>
-  <mc:AlternateContent xmlns:mc="http://schemas.openxmlformats.org/markup-compatibility/2006">
-    <mc:Choice xmlns:p14="http://schemas.microsoft.com/office/powerpoint/2010/main" Requires="p14">
+  <mc:AlternateContent xmlns:mc="http://schemas.openxmlformats.org/markup-compatibility/2006" xmlns:p14="http://schemas.microsoft.com/office/powerpoint/2010/main">
+    <mc:Choice Requires="p14">
       <p:transition spd="med" p14:dur="700">
         <p:fade/>
       </p:transition>
     </mc:Choice>
-    <mc:Fallback>
+    <mc:Fallback xmlns="">
       <p:transition spd="med">
         <p:fade/>
       </p:transition>
@@ -18460,13 +18492,13 @@
   <p:clrMapOvr>
     <a:masterClrMapping/>
   </p:clrMapOvr>
-  <mc:AlternateContent xmlns:mc="http://schemas.openxmlformats.org/markup-compatibility/2006">
-    <mc:Choice xmlns:p14="http://schemas.microsoft.com/office/powerpoint/2010/main" Requires="p14">
+  <mc:AlternateContent xmlns:mc="http://schemas.openxmlformats.org/markup-compatibility/2006" xmlns:p14="http://schemas.microsoft.com/office/powerpoint/2010/main">
+    <mc:Choice Requires="p14">
       <p:transition spd="med" p14:dur="700">
         <p:fade/>
       </p:transition>
     </mc:Choice>
-    <mc:Fallback>
+    <mc:Fallback xmlns="">
       <p:transition spd="med">
         <p:fade/>
       </p:transition>
@@ -19091,13 +19123,13 @@
   <p:clrMapOvr>
     <a:masterClrMapping/>
   </p:clrMapOvr>
-  <mc:AlternateContent xmlns:mc="http://schemas.openxmlformats.org/markup-compatibility/2006">
-    <mc:Choice xmlns:p14="http://schemas.microsoft.com/office/powerpoint/2010/main" Requires="p14">
+  <mc:AlternateContent xmlns:mc="http://schemas.openxmlformats.org/markup-compatibility/2006" xmlns:p14="http://schemas.microsoft.com/office/powerpoint/2010/main">
+    <mc:Choice Requires="p14">
       <p:transition spd="med" p14:dur="700">
         <p:fade/>
       </p:transition>
     </mc:Choice>
-    <mc:Fallback>
+    <mc:Fallback xmlns="">
       <p:transition spd="med">
         <p:fade/>
       </p:transition>
@@ -19746,13 +19778,13 @@
   <p:clrMapOvr>
     <a:masterClrMapping/>
   </p:clrMapOvr>
-  <mc:AlternateContent xmlns:mc="http://schemas.openxmlformats.org/markup-compatibility/2006">
-    <mc:Choice xmlns:p14="http://schemas.microsoft.com/office/powerpoint/2010/main" Requires="p14">
+  <mc:AlternateContent xmlns:mc="http://schemas.openxmlformats.org/markup-compatibility/2006" xmlns:p14="http://schemas.microsoft.com/office/powerpoint/2010/main">
+    <mc:Choice Requires="p14">
       <p:transition spd="med" p14:dur="700">
         <p:fade/>
       </p:transition>
     </mc:Choice>
-    <mc:Fallback>
+    <mc:Fallback xmlns="">
       <p:transition spd="med">
         <p:fade/>
       </p:transition>
@@ -20295,13 +20327,13 @@
   <p:clrMapOvr>
     <a:masterClrMapping/>
   </p:clrMapOvr>
-  <mc:AlternateContent xmlns:mc="http://schemas.openxmlformats.org/markup-compatibility/2006">
-    <mc:Choice xmlns:p14="http://schemas.microsoft.com/office/powerpoint/2010/main" Requires="p14">
+  <mc:AlternateContent xmlns:mc="http://schemas.openxmlformats.org/markup-compatibility/2006" xmlns:p14="http://schemas.microsoft.com/office/powerpoint/2010/main">
+    <mc:Choice Requires="p14">
       <p:transition spd="med" p14:dur="700">
         <p:fade/>
       </p:transition>
     </mc:Choice>
-    <mc:Fallback>
+    <mc:Fallback xmlns="">
       <p:transition spd="med">
         <p:fade/>
       </p:transition>
@@ -21104,13 +21136,13 @@
   <p:clrMapOvr>
     <a:masterClrMapping/>
   </p:clrMapOvr>
-  <mc:AlternateContent xmlns:mc="http://schemas.openxmlformats.org/markup-compatibility/2006">
-    <mc:Choice xmlns:p14="http://schemas.microsoft.com/office/powerpoint/2010/main" Requires="p14">
+  <mc:AlternateContent xmlns:mc="http://schemas.openxmlformats.org/markup-compatibility/2006" xmlns:p14="http://schemas.microsoft.com/office/powerpoint/2010/main">
+    <mc:Choice Requires="p14">
       <p:transition spd="med" p14:dur="700">
         <p:fade/>
       </p:transition>
     </mc:Choice>
-    <mc:Fallback>
+    <mc:Fallback xmlns="">
       <p:transition spd="med">
         <p:fade/>
       </p:transition>
@@ -21913,13 +21945,13 @@
   <p:clrMapOvr>
     <a:masterClrMapping/>
   </p:clrMapOvr>
-  <mc:AlternateContent xmlns:mc="http://schemas.openxmlformats.org/markup-compatibility/2006">
-    <mc:Choice xmlns:p14="http://schemas.microsoft.com/office/powerpoint/2010/main" Requires="p14">
+  <mc:AlternateContent xmlns:mc="http://schemas.openxmlformats.org/markup-compatibility/2006" xmlns:p14="http://schemas.microsoft.com/office/powerpoint/2010/main">
+    <mc:Choice Requires="p14">
       <p:transition spd="med" p14:dur="700">
         <p:fade/>
       </p:transition>
     </mc:Choice>
-    <mc:Fallback>
+    <mc:Fallback xmlns="">
       <p:transition spd="med">
         <p:fade/>
       </p:transition>
@@ -22484,13 +22516,13 @@
   <p:clrMapOvr>
     <a:masterClrMapping/>
   </p:clrMapOvr>
-  <mc:AlternateContent xmlns:mc="http://schemas.openxmlformats.org/markup-compatibility/2006">
-    <mc:Choice xmlns:p14="http://schemas.microsoft.com/office/powerpoint/2010/main" Requires="p14">
+  <mc:AlternateContent xmlns:mc="http://schemas.openxmlformats.org/markup-compatibility/2006" xmlns:p14="http://schemas.microsoft.com/office/powerpoint/2010/main">
+    <mc:Choice Requires="p14">
       <p:transition spd="med" p14:dur="700">
         <p:fade/>
       </p:transition>
     </mc:Choice>
-    <mc:Fallback>
+    <mc:Fallback xmlns="">
       <p:transition spd="med">
         <p:fade/>
       </p:transition>
@@ -23117,13 +23149,13 @@
   <p:clrMapOvr>
     <a:masterClrMapping/>
   </p:clrMapOvr>
-  <mc:AlternateContent xmlns:mc="http://schemas.openxmlformats.org/markup-compatibility/2006">
-    <mc:Choice xmlns:p14="http://schemas.microsoft.com/office/powerpoint/2010/main" Requires="p14">
+  <mc:AlternateContent xmlns:mc="http://schemas.openxmlformats.org/markup-compatibility/2006" xmlns:p14="http://schemas.microsoft.com/office/powerpoint/2010/main">
+    <mc:Choice Requires="p14">
       <p:transition spd="med" p14:dur="700">
         <p:fade/>
       </p:transition>
     </mc:Choice>
-    <mc:Fallback>
+    <mc:Fallback xmlns="">
       <p:transition spd="med">
         <p:fade/>
       </p:transition>
@@ -23740,13 +23772,13 @@
   <p:clrMapOvr>
     <a:masterClrMapping/>
   </p:clrMapOvr>
-  <mc:AlternateContent xmlns:mc="http://schemas.openxmlformats.org/markup-compatibility/2006">
-    <mc:Choice xmlns:p14="http://schemas.microsoft.com/office/powerpoint/2010/main" Requires="p14">
+  <mc:AlternateContent xmlns:mc="http://schemas.openxmlformats.org/markup-compatibility/2006" xmlns:p14="http://schemas.microsoft.com/office/powerpoint/2010/main">
+    <mc:Choice Requires="p14">
       <p:transition spd="med" p14:dur="700">
         <p:fade/>
       </p:transition>
     </mc:Choice>
-    <mc:Fallback>
+    <mc:Fallback xmlns="">
       <p:transition spd="med">
         <p:fade/>
       </p:transition>
@@ -23782,7 +23814,7 @@
       </p:grpSpPr>
       <p:sp useBgFill="1">
         <p:nvSpPr>
-          <p:cNvPr id="20" name="Rectangle 19">
+          <p:cNvPr id="29" name="Rectangle 28">
             <a:extLst>
               <a:ext uri="{FF2B5EF4-FFF2-40B4-BE49-F238E27FC236}">
                 <a16:creationId xmlns:a16="http://schemas.microsoft.com/office/drawing/2014/main" id="{C5176844-69C3-4F79-BE38-EA5BDDF4FEA4}"/>
@@ -23877,7 +23909,7 @@
       </p:sp>
       <p:cxnSp>
         <p:nvCxnSpPr>
-          <p:cNvPr id="22" name="Straight Connector 21">
+          <p:cNvPr id="31" name="Straight Connector 30">
             <a:extLst>
               <a:ext uri="{FF2B5EF4-FFF2-40B4-BE49-F238E27FC236}">
                 <a16:creationId xmlns:a16="http://schemas.microsoft.com/office/drawing/2014/main" id="{33862825-C012-4895-A17E-F3D1F62D89DD}"/>
@@ -24055,10 +24087,10 @@
       </p:sp>
       <p:pic>
         <p:nvPicPr>
-          <p:cNvPr id="5" name="Picture 4" descr="Toy plastic numbers">
+          <p:cNvPr id="6" name="Picture 5">
             <a:extLst>
               <a:ext uri="{FF2B5EF4-FFF2-40B4-BE49-F238E27FC236}">
-                <a16:creationId xmlns:a16="http://schemas.microsoft.com/office/drawing/2014/main" id="{405118D7-9E74-37FD-940E-87807F24C9DE}"/>
+                <a16:creationId xmlns:a16="http://schemas.microsoft.com/office/drawing/2014/main" id="{D8AC45CB-B224-B90A-07A3-FF9DEDC5051A}"/>
               </a:ext>
             </a:extLst>
           </p:cNvPr>
@@ -24069,7 +24101,7 @@
         </p:nvPicPr>
         <p:blipFill rotWithShape="1">
           <a:blip r:embed="rId2"/>
-          <a:srcRect l="21691" r="27549" b="-1"/>
+          <a:srcRect r="20164"/>
           <a:stretch/>
         </p:blipFill>
         <p:spPr>
@@ -24118,7 +24150,7 @@
       </p:pic>
       <p:sp>
         <p:nvSpPr>
-          <p:cNvPr id="24" name="Freeform 6">
+          <p:cNvPr id="33" name="Freeform 6">
             <a:extLst>
               <a:ext uri="{FF2B5EF4-FFF2-40B4-BE49-F238E27FC236}">
                 <a16:creationId xmlns:a16="http://schemas.microsoft.com/office/drawing/2014/main" id="{A101E513-AF74-4E9D-A31F-99664250722D}"/>
@@ -24350,13 +24382,13 @@
   <p:clrMapOvr>
     <a:masterClrMapping/>
   </p:clrMapOvr>
-  <mc:AlternateContent xmlns:mc="http://schemas.openxmlformats.org/markup-compatibility/2006">
-    <mc:Choice xmlns:p14="http://schemas.microsoft.com/office/powerpoint/2010/main" Requires="p14">
+  <mc:AlternateContent xmlns:mc="http://schemas.openxmlformats.org/markup-compatibility/2006" xmlns:p14="http://schemas.microsoft.com/office/powerpoint/2010/main">
+    <mc:Choice Requires="p14">
       <p:transition spd="med" p14:dur="700">
         <p:fade/>
       </p:transition>
     </mc:Choice>
-    <mc:Fallback>
+    <mc:Fallback xmlns="">
       <p:transition spd="med">
         <p:fade/>
       </p:transition>
@@ -25041,13 +25073,13 @@
   <p:clrMapOvr>
     <a:masterClrMapping/>
   </p:clrMapOvr>
-  <mc:AlternateContent xmlns:mc="http://schemas.openxmlformats.org/markup-compatibility/2006">
-    <mc:Choice xmlns:p14="http://schemas.microsoft.com/office/powerpoint/2010/main" Requires="p14">
+  <mc:AlternateContent xmlns:mc="http://schemas.openxmlformats.org/markup-compatibility/2006" xmlns:p14="http://schemas.microsoft.com/office/powerpoint/2010/main">
+    <mc:Choice Requires="p14">
       <p:transition spd="med" p14:dur="700">
         <p:fade/>
       </p:transition>
     </mc:Choice>
-    <mc:Fallback>
+    <mc:Fallback xmlns="">
       <p:transition spd="med">
         <p:fade/>
       </p:transition>
@@ -25693,13 +25725,13 @@
   <p:clrMapOvr>
     <a:masterClrMapping/>
   </p:clrMapOvr>
-  <mc:AlternateContent xmlns:mc="http://schemas.openxmlformats.org/markup-compatibility/2006">
-    <mc:Choice xmlns:p14="http://schemas.microsoft.com/office/powerpoint/2010/main" Requires="p14">
+  <mc:AlternateContent xmlns:mc="http://schemas.openxmlformats.org/markup-compatibility/2006" xmlns:p14="http://schemas.microsoft.com/office/powerpoint/2010/main">
+    <mc:Choice Requires="p14">
       <p:transition spd="med" p14:dur="700">
         <p:fade/>
       </p:transition>
     </mc:Choice>
-    <mc:Fallback>
+    <mc:Fallback xmlns="">
       <p:transition spd="med">
         <p:fade/>
       </p:transition>
@@ -26348,13 +26380,13 @@
   <p:clrMapOvr>
     <a:masterClrMapping/>
   </p:clrMapOvr>
-  <mc:AlternateContent xmlns:mc="http://schemas.openxmlformats.org/markup-compatibility/2006">
-    <mc:Choice xmlns:p14="http://schemas.microsoft.com/office/powerpoint/2010/main" Requires="p14">
+  <mc:AlternateContent xmlns:mc="http://schemas.openxmlformats.org/markup-compatibility/2006" xmlns:p14="http://schemas.microsoft.com/office/powerpoint/2010/main">
+    <mc:Choice Requires="p14">
       <p:transition spd="med" p14:dur="700">
         <p:fade/>
       </p:transition>
     </mc:Choice>
-    <mc:Fallback>
+    <mc:Fallback xmlns="">
       <p:transition spd="med">
         <p:fade/>
       </p:transition>

</xml_diff>